<commit_message>
working on madjs presentation 2
</commit_message>
<xml_diff>
--- a/docs/madjs/MADJS-Mountebank.pptx
+++ b/docs/madjs/MADJS-Mountebank.pptx
@@ -5,7 +5,7 @@
     <p:sldMasterId id="2147483660" r:id="rId1"/>
   </p:sldMasterIdLst>
   <p:notesMasterIdLst>
-    <p:notesMasterId r:id="rId7"/>
+    <p:notesMasterId r:id="rId9"/>
   </p:notesMasterIdLst>
   <p:sldIdLst>
     <p:sldId id="256" r:id="rId2"/>
@@ -13,6 +13,8 @@
     <p:sldId id="260" r:id="rId4"/>
     <p:sldId id="257" r:id="rId5"/>
     <p:sldId id="259" r:id="rId6"/>
+    <p:sldId id="261" r:id="rId7"/>
+    <p:sldId id="262" r:id="rId8"/>
   </p:sldIdLst>
   <p:sldSz cx="9144000" cy="6858000" type="screen4x3"/>
   <p:notesSz cx="6858000" cy="9144000"/>
@@ -620,11 +622,7 @@
           <a:p>
             <a:r>
               <a:rPr lang="en-US" baseline="0" dirty="0" smtClean="0"/>
-              <a:t>Use postman to </a:t>
-            </a:r>
-            <a:r>
-              <a:rPr lang="en-US" baseline="0" smtClean="0"/>
-              <a:t>test it</a:t>
+              <a:t>Use postman to test it</a:t>
             </a:r>
             <a:endParaRPr lang="en-US" dirty="0"/>
           </a:p>
@@ -648,6 +646,234 @@
             <a:fld id="{B98EA67F-C197-E74D-9FDA-9E55EF59A78D}" type="slidenum">
               <a:rPr lang="en-US" smtClean="0"/>
               <a:t>5</a:t>
+            </a:fld>
+            <a:endParaRPr lang="en-US"/>
+          </a:p>
+        </p:txBody>
+      </p:sp>
+    </p:spTree>
+    <p:extLst>
+      <p:ext uri="{BB962C8B-B14F-4D97-AF65-F5344CB8AC3E}">
+        <p14:creationId xmlns:p14="http://schemas.microsoft.com/office/powerpoint/2010/main" val="2842145168"/>
+      </p:ext>
+    </p:extLst>
+  </p:cSld>
+  <p:clrMapOvr>
+    <a:masterClrMapping/>
+  </p:clrMapOvr>
+</p:notes>
+</file>
+
+<file path=ppt/notesSlides/notesSlide3.xml><?xml version="1.0" encoding="utf-8"?>
+<p:notes xmlns:a="http://schemas.openxmlformats.org/drawingml/2006/main" xmlns:r="http://schemas.openxmlformats.org/officeDocument/2006/relationships" xmlns:p="http://schemas.openxmlformats.org/presentationml/2006/main">
+  <p:cSld>
+    <p:spTree>
+      <p:nvGrpSpPr>
+        <p:cNvPr id="1" name=""/>
+        <p:cNvGrpSpPr/>
+        <p:nvPr/>
+      </p:nvGrpSpPr>
+      <p:grpSpPr>
+        <a:xfrm>
+          <a:off x="0" y="0"/>
+          <a:ext cx="0" cy="0"/>
+          <a:chOff x="0" y="0"/>
+          <a:chExt cx="0" cy="0"/>
+        </a:xfrm>
+      </p:grpSpPr>
+      <p:sp>
+        <p:nvSpPr>
+          <p:cNvPr id="2" name="Slide Image Placeholder 1"/>
+          <p:cNvSpPr>
+            <a:spLocks noGrp="1" noRot="1" noChangeAspect="1"/>
+          </p:cNvSpPr>
+          <p:nvPr>
+            <p:ph type="sldImg"/>
+          </p:nvPr>
+        </p:nvSpPr>
+        <p:spPr/>
+      </p:sp>
+      <p:sp>
+        <p:nvSpPr>
+          <p:cNvPr id="3" name="Notes Placeholder 2"/>
+          <p:cNvSpPr>
+            <a:spLocks noGrp="1"/>
+          </p:cNvSpPr>
+          <p:nvPr>
+            <p:ph type="body" idx="1"/>
+          </p:nvPr>
+        </p:nvSpPr>
+        <p:spPr/>
+        <p:txBody>
+          <a:bodyPr/>
+          <a:lstStyle/>
+          <a:p>
+            <a:r>
+              <a:rPr lang="en-US" dirty="0" smtClean="0"/>
+              <a:t>Launch</a:t>
+            </a:r>
+            <a:r>
+              <a:rPr lang="en-US" baseline="0" dirty="0" smtClean="0"/>
+              <a:t> postman</a:t>
+            </a:r>
+          </a:p>
+          <a:p>
+            <a:r>
+              <a:rPr lang="en-US" baseline="0" dirty="0" smtClean="0"/>
+              <a:t>Launch </a:t>
+            </a:r>
+            <a:r>
+              <a:rPr lang="en-US" baseline="0" dirty="0" smtClean="0"/>
+              <a:t>mountebank</a:t>
+            </a:r>
+          </a:p>
+          <a:p>
+            <a:r>
+              <a:rPr lang="en-US" baseline="0" dirty="0" smtClean="0"/>
+              <a:t>Use postman to load it</a:t>
+            </a:r>
+          </a:p>
+          <a:p>
+            <a:r>
+              <a:rPr lang="en-US" baseline="0" dirty="0" smtClean="0"/>
+              <a:t>Use postman to test it</a:t>
+            </a:r>
+            <a:endParaRPr lang="en-US" dirty="0"/>
+          </a:p>
+        </p:txBody>
+      </p:sp>
+      <p:sp>
+        <p:nvSpPr>
+          <p:cNvPr id="4" name="Slide Number Placeholder 3"/>
+          <p:cNvSpPr>
+            <a:spLocks noGrp="1"/>
+          </p:cNvSpPr>
+          <p:nvPr>
+            <p:ph type="sldNum" sz="quarter" idx="10"/>
+          </p:nvPr>
+        </p:nvSpPr>
+        <p:spPr/>
+        <p:txBody>
+          <a:bodyPr/>
+          <a:lstStyle/>
+          <a:p>
+            <a:fld id="{B98EA67F-C197-E74D-9FDA-9E55EF59A78D}" type="slidenum">
+              <a:rPr lang="en-US" smtClean="0"/>
+              <a:t>6</a:t>
+            </a:fld>
+            <a:endParaRPr lang="en-US"/>
+          </a:p>
+        </p:txBody>
+      </p:sp>
+    </p:spTree>
+    <p:extLst>
+      <p:ext uri="{BB962C8B-B14F-4D97-AF65-F5344CB8AC3E}">
+        <p14:creationId xmlns:p14="http://schemas.microsoft.com/office/powerpoint/2010/main" val="2842145168"/>
+      </p:ext>
+    </p:extLst>
+  </p:cSld>
+  <p:clrMapOvr>
+    <a:masterClrMapping/>
+  </p:clrMapOvr>
+</p:notes>
+</file>
+
+<file path=ppt/notesSlides/notesSlide4.xml><?xml version="1.0" encoding="utf-8"?>
+<p:notes xmlns:a="http://schemas.openxmlformats.org/drawingml/2006/main" xmlns:r="http://schemas.openxmlformats.org/officeDocument/2006/relationships" xmlns:p="http://schemas.openxmlformats.org/presentationml/2006/main">
+  <p:cSld>
+    <p:spTree>
+      <p:nvGrpSpPr>
+        <p:cNvPr id="1" name=""/>
+        <p:cNvGrpSpPr/>
+        <p:nvPr/>
+      </p:nvGrpSpPr>
+      <p:grpSpPr>
+        <a:xfrm>
+          <a:off x="0" y="0"/>
+          <a:ext cx="0" cy="0"/>
+          <a:chOff x="0" y="0"/>
+          <a:chExt cx="0" cy="0"/>
+        </a:xfrm>
+      </p:grpSpPr>
+      <p:sp>
+        <p:nvSpPr>
+          <p:cNvPr id="2" name="Slide Image Placeholder 1"/>
+          <p:cNvSpPr>
+            <a:spLocks noGrp="1" noRot="1" noChangeAspect="1"/>
+          </p:cNvSpPr>
+          <p:nvPr>
+            <p:ph type="sldImg"/>
+          </p:nvPr>
+        </p:nvSpPr>
+        <p:spPr/>
+      </p:sp>
+      <p:sp>
+        <p:nvSpPr>
+          <p:cNvPr id="3" name="Notes Placeholder 2"/>
+          <p:cNvSpPr>
+            <a:spLocks noGrp="1"/>
+          </p:cNvSpPr>
+          <p:nvPr>
+            <p:ph type="body" idx="1"/>
+          </p:nvPr>
+        </p:nvSpPr>
+        <p:spPr/>
+        <p:txBody>
+          <a:bodyPr/>
+          <a:lstStyle/>
+          <a:p>
+            <a:r>
+              <a:rPr lang="en-US" dirty="0" smtClean="0"/>
+              <a:t>Launch</a:t>
+            </a:r>
+            <a:r>
+              <a:rPr lang="en-US" baseline="0" dirty="0" smtClean="0"/>
+              <a:t> postman</a:t>
+            </a:r>
+          </a:p>
+          <a:p>
+            <a:r>
+              <a:rPr lang="en-US" baseline="0" dirty="0" smtClean="0"/>
+              <a:t>Launch </a:t>
+            </a:r>
+            <a:r>
+              <a:rPr lang="en-US" baseline="0" dirty="0" smtClean="0"/>
+              <a:t>mountebank</a:t>
+            </a:r>
+          </a:p>
+          <a:p>
+            <a:r>
+              <a:rPr lang="en-US" baseline="0" dirty="0" smtClean="0"/>
+              <a:t>Use postman to load it</a:t>
+            </a:r>
+          </a:p>
+          <a:p>
+            <a:r>
+              <a:rPr lang="en-US" baseline="0" dirty="0" smtClean="0"/>
+              <a:t>Use postman to test it</a:t>
+            </a:r>
+            <a:endParaRPr lang="en-US" dirty="0"/>
+          </a:p>
+        </p:txBody>
+      </p:sp>
+      <p:sp>
+        <p:nvSpPr>
+          <p:cNvPr id="4" name="Slide Number Placeholder 3"/>
+          <p:cNvSpPr>
+            <a:spLocks noGrp="1"/>
+          </p:cNvSpPr>
+          <p:nvPr>
+            <p:ph type="sldNum" sz="quarter" idx="10"/>
+          </p:nvPr>
+        </p:nvSpPr>
+        <p:spPr/>
+        <p:txBody>
+          <a:bodyPr/>
+          <a:lstStyle/>
+          <a:p>
+            <a:fld id="{B98EA67F-C197-E74D-9FDA-9E55EF59A78D}" type="slidenum">
+              <a:rPr lang="en-US" smtClean="0"/>
+              <a:t>7</a:t>
             </a:fld>
             <a:endParaRPr lang="en-US"/>
           </a:p>
@@ -6663,6 +6889,276 @@
     <p:extLst>
       <p:ext uri="{BB962C8B-B14F-4D97-AF65-F5344CB8AC3E}">
         <p14:creationId xmlns:p14="http://schemas.microsoft.com/office/powerpoint/2010/main" val="4142261974"/>
+      </p:ext>
+    </p:extLst>
+  </p:cSld>
+  <p:clrMapOvr>
+    <a:masterClrMapping/>
+  </p:clrMapOvr>
+  <p:timing>
+    <p:tnLst>
+      <p:par>
+        <p:cTn xmlns:p14="http://schemas.microsoft.com/office/powerpoint/2010/main" id="1" dur="indefinite" restart="never" nodeType="tmRoot"/>
+      </p:par>
+    </p:tnLst>
+  </p:timing>
+</p:sld>
+</file>
+
+<file path=ppt/slides/slide6.xml><?xml version="1.0" encoding="utf-8"?>
+<p:sld xmlns:a="http://schemas.openxmlformats.org/drawingml/2006/main" xmlns:r="http://schemas.openxmlformats.org/officeDocument/2006/relationships" xmlns:p="http://schemas.openxmlformats.org/presentationml/2006/main">
+  <p:cSld>
+    <p:spTree>
+      <p:nvGrpSpPr>
+        <p:cNvPr id="1" name=""/>
+        <p:cNvGrpSpPr/>
+        <p:nvPr/>
+      </p:nvGrpSpPr>
+      <p:grpSpPr>
+        <a:xfrm>
+          <a:off x="0" y="0"/>
+          <a:ext cx="0" cy="0"/>
+          <a:chOff x="0" y="0"/>
+          <a:chExt cx="0" cy="0"/>
+        </a:xfrm>
+      </p:grpSpPr>
+      <p:sp>
+        <p:nvSpPr>
+          <p:cNvPr id="2" name="Title 1"/>
+          <p:cNvSpPr>
+            <a:spLocks noGrp="1"/>
+          </p:cNvSpPr>
+          <p:nvPr>
+            <p:ph type="title"/>
+          </p:nvPr>
+        </p:nvSpPr>
+        <p:spPr/>
+        <p:txBody>
+          <a:bodyPr/>
+          <a:lstStyle/>
+          <a:p>
+            <a:r>
+              <a:rPr lang="en-US" dirty="0" smtClean="0"/>
+              <a:t>Mountebank Installation</a:t>
+            </a:r>
+            <a:endParaRPr lang="en-US" dirty="0"/>
+          </a:p>
+        </p:txBody>
+      </p:sp>
+      <p:sp>
+        <p:nvSpPr>
+          <p:cNvPr id="3" name="Content Placeholder 2"/>
+          <p:cNvSpPr>
+            <a:spLocks noGrp="1"/>
+          </p:cNvSpPr>
+          <p:nvPr>
+            <p:ph idx="1"/>
+          </p:nvPr>
+        </p:nvSpPr>
+        <p:spPr/>
+        <p:txBody>
+          <a:bodyPr/>
+          <a:lstStyle/>
+          <a:p>
+            <a:r>
+              <a:rPr lang="en-US" dirty="0" smtClean="0"/>
+              <a:t>Postman (chrome plugin)</a:t>
+            </a:r>
+          </a:p>
+          <a:p>
+            <a:r>
+              <a:rPr lang="en-US" dirty="0" smtClean="0"/>
+              <a:t>Mountebank</a:t>
+            </a:r>
+          </a:p>
+          <a:p>
+            <a:r>
+              <a:rPr lang="en-US" dirty="0"/>
+              <a:t>Mountebank-UI </a:t>
+            </a:r>
+            <a:r>
+              <a:rPr lang="en-US" dirty="0" smtClean="0"/>
+              <a:t>(http</a:t>
+            </a:r>
+            <a:r>
+              <a:rPr lang="en-US" dirty="0"/>
+              <a:t>://</a:t>
+            </a:r>
+            <a:r>
+              <a:rPr lang="en-US" dirty="0" err="1"/>
+              <a:t>donhenton.github.io</a:t>
+            </a:r>
+            <a:r>
+              <a:rPr lang="en-US" dirty="0"/>
+              <a:t>/mountebank-UI/</a:t>
+            </a:r>
+            <a:r>
+              <a:rPr lang="en-US" dirty="0" err="1"/>
+              <a:t>public_html</a:t>
+            </a:r>
+            <a:r>
+              <a:rPr lang="en-US" dirty="0"/>
+              <a:t>/</a:t>
+            </a:r>
+            <a:r>
+              <a:rPr lang="en-US" dirty="0" err="1"/>
+              <a:t>index.html</a:t>
+            </a:r>
+            <a:r>
+              <a:rPr lang="en-US" dirty="0"/>
+              <a:t>#</a:t>
+            </a:r>
+            <a:r>
+              <a:rPr lang="en-US" dirty="0" smtClean="0"/>
+              <a:t>/)</a:t>
+            </a:r>
+            <a:endParaRPr lang="en-US" dirty="0"/>
+          </a:p>
+          <a:p>
+            <a:pPr marL="282575" lvl="1" indent="0">
+              <a:buNone/>
+            </a:pPr>
+            <a:endParaRPr lang="en-US" dirty="0" smtClean="0"/>
+          </a:p>
+        </p:txBody>
+      </p:sp>
+    </p:spTree>
+    <p:extLst>
+      <p:ext uri="{BB962C8B-B14F-4D97-AF65-F5344CB8AC3E}">
+        <p14:creationId xmlns:p14="http://schemas.microsoft.com/office/powerpoint/2010/main" val="1991744321"/>
+      </p:ext>
+    </p:extLst>
+  </p:cSld>
+  <p:clrMapOvr>
+    <a:masterClrMapping/>
+  </p:clrMapOvr>
+  <p:timing>
+    <p:tnLst>
+      <p:par>
+        <p:cTn xmlns:p14="http://schemas.microsoft.com/office/powerpoint/2010/main" id="1" dur="indefinite" restart="never" nodeType="tmRoot"/>
+      </p:par>
+    </p:tnLst>
+  </p:timing>
+</p:sld>
+</file>
+
+<file path=ppt/slides/slide7.xml><?xml version="1.0" encoding="utf-8"?>
+<p:sld xmlns:a="http://schemas.openxmlformats.org/drawingml/2006/main" xmlns:r="http://schemas.openxmlformats.org/officeDocument/2006/relationships" xmlns:p="http://schemas.openxmlformats.org/presentationml/2006/main">
+  <p:cSld>
+    <p:spTree>
+      <p:nvGrpSpPr>
+        <p:cNvPr id="1" name=""/>
+        <p:cNvGrpSpPr/>
+        <p:nvPr/>
+      </p:nvGrpSpPr>
+      <p:grpSpPr>
+        <a:xfrm>
+          <a:off x="0" y="0"/>
+          <a:ext cx="0" cy="0"/>
+          <a:chOff x="0" y="0"/>
+          <a:chExt cx="0" cy="0"/>
+        </a:xfrm>
+      </p:grpSpPr>
+      <p:sp>
+        <p:nvSpPr>
+          <p:cNvPr id="2" name="Title 1"/>
+          <p:cNvSpPr>
+            <a:spLocks noGrp="1"/>
+          </p:cNvSpPr>
+          <p:nvPr>
+            <p:ph type="title"/>
+          </p:nvPr>
+        </p:nvSpPr>
+        <p:spPr/>
+        <p:txBody>
+          <a:bodyPr/>
+          <a:lstStyle/>
+          <a:p>
+            <a:r>
+              <a:rPr lang="en-US" dirty="0" smtClean="0"/>
+              <a:t>Examples</a:t>
+            </a:r>
+            <a:endParaRPr lang="en-US" dirty="0"/>
+          </a:p>
+        </p:txBody>
+      </p:sp>
+      <p:sp>
+        <p:nvSpPr>
+          <p:cNvPr id="3" name="Content Placeholder 2"/>
+          <p:cNvSpPr>
+            <a:spLocks noGrp="1"/>
+          </p:cNvSpPr>
+          <p:nvPr>
+            <p:ph idx="1"/>
+          </p:nvPr>
+        </p:nvSpPr>
+        <p:spPr/>
+        <p:txBody>
+          <a:bodyPr/>
+          <a:lstStyle/>
+          <a:p>
+            <a:r>
+              <a:rPr lang="en-US" dirty="0" smtClean="0"/>
+              <a:t>Postman (chrome plugin)</a:t>
+            </a:r>
+          </a:p>
+          <a:p>
+            <a:r>
+              <a:rPr lang="en-US" dirty="0">
+                <a:hlinkClick r:id="rId3"/>
+              </a:rPr>
+              <a:t>http://www.mbtest.org/docs/</a:t>
+            </a:r>
+            <a:r>
+              <a:rPr lang="en-US" dirty="0" smtClean="0">
+                <a:hlinkClick r:id="rId3"/>
+              </a:rPr>
+              <a:t>install</a:t>
+            </a:r>
+            <a:endParaRPr lang="en-US" dirty="0" smtClean="0"/>
+          </a:p>
+          <a:p>
+            <a:pPr lvl="1"/>
+            <a:r>
+              <a:rPr lang="en-US" dirty="0" smtClean="0"/>
+              <a:t>Provides various options</a:t>
+            </a:r>
+          </a:p>
+          <a:p>
+            <a:pPr lvl="1"/>
+            <a:r>
+              <a:rPr lang="en-US" dirty="0" err="1" smtClean="0"/>
+              <a:t>npm</a:t>
+            </a:r>
+            <a:endParaRPr lang="en-US" dirty="0" smtClean="0"/>
+          </a:p>
+          <a:p>
+            <a:r>
+              <a:rPr lang="en-US" dirty="0" err="1"/>
+              <a:t>n</a:t>
+            </a:r>
+            <a:r>
+              <a:rPr lang="en-US" dirty="0" err="1" smtClean="0"/>
+              <a:t>pm</a:t>
+            </a:r>
+            <a:r>
+              <a:rPr lang="en-US" smtClean="0"/>
+              <a:t> mountebank -g</a:t>
+            </a:r>
+            <a:endParaRPr lang="en-US" dirty="0"/>
+          </a:p>
+          <a:p>
+            <a:pPr marL="282575" lvl="1" indent="0">
+              <a:buNone/>
+            </a:pPr>
+            <a:endParaRPr lang="en-US" dirty="0" smtClean="0"/>
+          </a:p>
+        </p:txBody>
+      </p:sp>
+    </p:spTree>
+    <p:extLst>
+      <p:ext uri="{BB962C8B-B14F-4D97-AF65-F5344CB8AC3E}">
+        <p14:creationId xmlns:p14="http://schemas.microsoft.com/office/powerpoint/2010/main" val="1991744321"/>
       </p:ext>
     </p:extLst>
   </p:cSld>

</xml_diff>

<commit_message>
working on madjs presentation 4
</commit_message>
<xml_diff>
--- a/docs/madjs/MADJS-Mountebank.pptx
+++ b/docs/madjs/MADJS-Mountebank.pptx
@@ -5,16 +5,18 @@
     <p:sldMasterId id="2147483660" r:id="rId1"/>
   </p:sldMasterIdLst>
   <p:notesMasterIdLst>
-    <p:notesMasterId r:id="rId9"/>
+    <p:notesMasterId r:id="rId11"/>
   </p:notesMasterIdLst>
   <p:sldIdLst>
     <p:sldId id="256" r:id="rId2"/>
     <p:sldId id="258" r:id="rId3"/>
     <p:sldId id="260" r:id="rId4"/>
-    <p:sldId id="257" r:id="rId5"/>
-    <p:sldId id="259" r:id="rId6"/>
-    <p:sldId id="261" r:id="rId7"/>
-    <p:sldId id="262" r:id="rId8"/>
+    <p:sldId id="263" r:id="rId5"/>
+    <p:sldId id="257" r:id="rId6"/>
+    <p:sldId id="259" r:id="rId7"/>
+    <p:sldId id="261" r:id="rId8"/>
+    <p:sldId id="262" r:id="rId9"/>
+    <p:sldId id="264" r:id="rId10"/>
   </p:sldIdLst>
   <p:sldSz cx="9144000" cy="6858000" type="screen4x3"/>
   <p:notesSz cx="6858000" cy="9144000"/>
@@ -198,7 +200,7 @@
           <a:p>
             <a:fld id="{A40F087D-155A-CC49-803F-ADA5E87CC64A}" type="datetimeFigureOut">
               <a:rPr lang="en-US" smtClean="0"/>
-              <a:t>1/3/16</a:t>
+              <a:t>1/4/16</a:t>
             </a:fld>
             <a:endParaRPr lang="en-US"/>
           </a:p>
@@ -606,11 +608,7 @@
           <a:p>
             <a:r>
               <a:rPr lang="en-US" baseline="0" dirty="0" smtClean="0"/>
-              <a:t>Launch </a:t>
-            </a:r>
-            <a:r>
-              <a:rPr lang="en-US" baseline="0" dirty="0" smtClean="0"/>
-              <a:t>mountebank</a:t>
+              <a:t>Launch mountebank</a:t>
             </a:r>
           </a:p>
           <a:p>
@@ -645,7 +643,7 @@
           <a:p>
             <a:fld id="{B98EA67F-C197-E74D-9FDA-9E55EF59A78D}" type="slidenum">
               <a:rPr lang="en-US" smtClean="0"/>
-              <a:t>5</a:t>
+              <a:t>6</a:t>
             </a:fld>
             <a:endParaRPr lang="en-US"/>
           </a:p>
@@ -720,11 +718,7 @@
           <a:p>
             <a:r>
               <a:rPr lang="en-US" baseline="0" dirty="0" smtClean="0"/>
-              <a:t>Launch </a:t>
-            </a:r>
-            <a:r>
-              <a:rPr lang="en-US" baseline="0" dirty="0" smtClean="0"/>
-              <a:t>mountebank</a:t>
+              <a:t>Launch mountebank</a:t>
             </a:r>
           </a:p>
           <a:p>
@@ -759,7 +753,7 @@
           <a:p>
             <a:fld id="{B98EA67F-C197-E74D-9FDA-9E55EF59A78D}" type="slidenum">
               <a:rPr lang="en-US" smtClean="0"/>
-              <a:t>6</a:t>
+              <a:t>7</a:t>
             </a:fld>
             <a:endParaRPr lang="en-US"/>
           </a:p>
@@ -834,11 +828,7 @@
           <a:p>
             <a:r>
               <a:rPr lang="en-US" baseline="0" dirty="0" smtClean="0"/>
-              <a:t>Launch </a:t>
-            </a:r>
-            <a:r>
-              <a:rPr lang="en-US" baseline="0" dirty="0" smtClean="0"/>
-              <a:t>mountebank</a:t>
+              <a:t>Launch mountebank</a:t>
             </a:r>
           </a:p>
           <a:p>
@@ -873,7 +863,117 @@
           <a:p>
             <a:fld id="{B98EA67F-C197-E74D-9FDA-9E55EF59A78D}" type="slidenum">
               <a:rPr lang="en-US" smtClean="0"/>
-              <a:t>7</a:t>
+              <a:t>8</a:t>
+            </a:fld>
+            <a:endParaRPr lang="en-US"/>
+          </a:p>
+        </p:txBody>
+      </p:sp>
+    </p:spTree>
+    <p:extLst>
+      <p:ext uri="{BB962C8B-B14F-4D97-AF65-F5344CB8AC3E}">
+        <p14:creationId xmlns:p14="http://schemas.microsoft.com/office/powerpoint/2010/main" val="2842145168"/>
+      </p:ext>
+    </p:extLst>
+  </p:cSld>
+  <p:clrMapOvr>
+    <a:masterClrMapping/>
+  </p:clrMapOvr>
+</p:notes>
+</file>
+
+<file path=ppt/notesSlides/notesSlide5.xml><?xml version="1.0" encoding="utf-8"?>
+<p:notes xmlns:a="http://schemas.openxmlformats.org/drawingml/2006/main" xmlns:r="http://schemas.openxmlformats.org/officeDocument/2006/relationships" xmlns:p="http://schemas.openxmlformats.org/presentationml/2006/main">
+  <p:cSld>
+    <p:spTree>
+      <p:nvGrpSpPr>
+        <p:cNvPr id="1" name=""/>
+        <p:cNvGrpSpPr/>
+        <p:nvPr/>
+      </p:nvGrpSpPr>
+      <p:grpSpPr>
+        <a:xfrm>
+          <a:off x="0" y="0"/>
+          <a:ext cx="0" cy="0"/>
+          <a:chOff x="0" y="0"/>
+          <a:chExt cx="0" cy="0"/>
+        </a:xfrm>
+      </p:grpSpPr>
+      <p:sp>
+        <p:nvSpPr>
+          <p:cNvPr id="2" name="Slide Image Placeholder 1"/>
+          <p:cNvSpPr>
+            <a:spLocks noGrp="1" noRot="1" noChangeAspect="1"/>
+          </p:cNvSpPr>
+          <p:nvPr>
+            <p:ph type="sldImg"/>
+          </p:nvPr>
+        </p:nvSpPr>
+        <p:spPr/>
+      </p:sp>
+      <p:sp>
+        <p:nvSpPr>
+          <p:cNvPr id="3" name="Notes Placeholder 2"/>
+          <p:cNvSpPr>
+            <a:spLocks noGrp="1"/>
+          </p:cNvSpPr>
+          <p:nvPr>
+            <p:ph type="body" idx="1"/>
+          </p:nvPr>
+        </p:nvSpPr>
+        <p:spPr/>
+        <p:txBody>
+          <a:bodyPr/>
+          <a:lstStyle/>
+          <a:p>
+            <a:r>
+              <a:rPr lang="en-US" dirty="0" smtClean="0"/>
+              <a:t>Launch</a:t>
+            </a:r>
+            <a:r>
+              <a:rPr lang="en-US" baseline="0" dirty="0" smtClean="0"/>
+              <a:t> postman</a:t>
+            </a:r>
+          </a:p>
+          <a:p>
+            <a:r>
+              <a:rPr lang="en-US" baseline="0" dirty="0" smtClean="0"/>
+              <a:t>Launch mountebank</a:t>
+            </a:r>
+          </a:p>
+          <a:p>
+            <a:r>
+              <a:rPr lang="en-US" baseline="0" dirty="0" smtClean="0"/>
+              <a:t>Use postman to load it</a:t>
+            </a:r>
+          </a:p>
+          <a:p>
+            <a:r>
+              <a:rPr lang="en-US" baseline="0" dirty="0" smtClean="0"/>
+              <a:t>Use postman to test it</a:t>
+            </a:r>
+            <a:endParaRPr lang="en-US" dirty="0"/>
+          </a:p>
+        </p:txBody>
+      </p:sp>
+      <p:sp>
+        <p:nvSpPr>
+          <p:cNvPr id="4" name="Slide Number Placeholder 3"/>
+          <p:cNvSpPr>
+            <a:spLocks noGrp="1"/>
+          </p:cNvSpPr>
+          <p:nvPr>
+            <p:ph type="sldNum" sz="quarter" idx="10"/>
+          </p:nvPr>
+        </p:nvSpPr>
+        <p:spPr/>
+        <p:txBody>
+          <a:bodyPr/>
+          <a:lstStyle/>
+          <a:p>
+            <a:fld id="{B98EA67F-C197-E74D-9FDA-9E55EF59A78D}" type="slidenum">
+              <a:rPr lang="en-US" smtClean="0"/>
+              <a:t>9</a:t>
             </a:fld>
             <a:endParaRPr lang="en-US"/>
           </a:p>
@@ -1127,7 +1227,7 @@
           <a:p>
             <a:fld id="{D140825E-4A15-4D39-8176-1F07E904CB30}" type="datetimeFigureOut">
               <a:rPr lang="en-US" smtClean="0"/>
-              <a:t>1/3/16</a:t>
+              <a:t>1/4/16</a:t>
             </a:fld>
             <a:endParaRPr lang="en-US"/>
           </a:p>
@@ -1218,7 +1318,7 @@
           <a:p>
             <a:fld id="{D140825E-4A15-4D39-8176-1F07E904CB30}" type="datetimeFigureOut">
               <a:rPr lang="en-US" smtClean="0"/>
-              <a:t>1/3/16</a:t>
+              <a:t>1/4/16</a:t>
             </a:fld>
             <a:endParaRPr lang="en-US"/>
           </a:p>
@@ -1521,7 +1621,7 @@
           <a:p>
             <a:fld id="{D140825E-4A15-4D39-8176-1F07E904CB30}" type="datetimeFigureOut">
               <a:rPr lang="en-US" smtClean="0"/>
-              <a:t>1/3/16</a:t>
+              <a:t>1/4/16</a:t>
             </a:fld>
             <a:endParaRPr lang="en-US"/>
           </a:p>
@@ -1742,7 +1842,7 @@
           <a:p>
             <a:fld id="{D140825E-4A15-4D39-8176-1F07E904CB30}" type="datetimeFigureOut">
               <a:rPr lang="en-US" smtClean="0"/>
-              <a:t>1/3/16</a:t>
+              <a:t>1/4/16</a:t>
             </a:fld>
             <a:endParaRPr lang="en-US"/>
           </a:p>
@@ -2130,7 +2230,7 @@
           <a:p>
             <a:fld id="{D140825E-4A15-4D39-8176-1F07E904CB30}" type="datetimeFigureOut">
               <a:rPr lang="en-US" smtClean="0"/>
-              <a:t>1/3/16</a:t>
+              <a:t>1/4/16</a:t>
             </a:fld>
             <a:endParaRPr lang="en-US"/>
           </a:p>
@@ -2438,7 +2538,7 @@
           <a:p>
             <a:fld id="{D140825E-4A15-4D39-8176-1F07E904CB30}" type="datetimeFigureOut">
               <a:rPr lang="en-US" smtClean="0"/>
-              <a:t>1/3/16</a:t>
+              <a:t>1/4/16</a:t>
             </a:fld>
             <a:endParaRPr lang="en-US"/>
           </a:p>
@@ -2636,7 +2736,7 @@
           <a:p>
             <a:fld id="{D140825E-4A15-4D39-8176-1F07E904CB30}" type="datetimeFigureOut">
               <a:rPr lang="en-US" smtClean="0"/>
-              <a:t>1/3/16</a:t>
+              <a:t>1/4/16</a:t>
             </a:fld>
             <a:endParaRPr lang="en-US"/>
           </a:p>
@@ -2839,7 +2939,7 @@
           <a:p>
             <a:fld id="{D140825E-4A15-4D39-8176-1F07E904CB30}" type="datetimeFigureOut">
               <a:rPr lang="en-US" smtClean="0"/>
-              <a:t>1/3/16</a:t>
+              <a:t>1/4/16</a:t>
             </a:fld>
             <a:endParaRPr lang="en-US"/>
           </a:p>
@@ -3032,7 +3132,7 @@
           <a:p>
             <a:fld id="{D140825E-4A15-4D39-8176-1F07E904CB30}" type="datetimeFigureOut">
               <a:rPr lang="en-US" smtClean="0"/>
-              <a:t>1/3/16</a:t>
+              <a:t>1/4/16</a:t>
             </a:fld>
             <a:endParaRPr lang="en-US"/>
           </a:p>
@@ -3304,7 +3404,7 @@
           <a:p>
             <a:fld id="{D140825E-4A15-4D39-8176-1F07E904CB30}" type="datetimeFigureOut">
               <a:rPr lang="en-US" smtClean="0"/>
-              <a:t>1/3/16</a:t>
+              <a:t>1/4/16</a:t>
             </a:fld>
             <a:endParaRPr lang="en-US"/>
           </a:p>
@@ -3615,7 +3715,7 @@
           <a:p>
             <a:fld id="{D140825E-4A15-4D39-8176-1F07E904CB30}" type="datetimeFigureOut">
               <a:rPr lang="en-US" smtClean="0"/>
-              <a:t>1/3/16</a:t>
+              <a:t>1/4/16</a:t>
             </a:fld>
             <a:endParaRPr lang="en-US"/>
           </a:p>
@@ -4081,7 +4181,7 @@
           <a:p>
             <a:fld id="{D140825E-4A15-4D39-8176-1F07E904CB30}" type="datetimeFigureOut">
               <a:rPr lang="en-US" smtClean="0"/>
-              <a:t>1/3/16</a:t>
+              <a:t>1/4/16</a:t>
             </a:fld>
             <a:endParaRPr lang="en-US"/>
           </a:p>
@@ -4445,7 +4545,7 @@
           <a:p>
             <a:fld id="{D140825E-4A15-4D39-8176-1F07E904CB30}" type="datetimeFigureOut">
               <a:rPr lang="en-US" smtClean="0"/>
-              <a:t>1/3/16</a:t>
+              <a:t>1/4/16</a:t>
             </a:fld>
             <a:endParaRPr lang="en-US"/>
           </a:p>
@@ -4756,7 +4856,7 @@
           <a:p>
             <a:fld id="{D140825E-4A15-4D39-8176-1F07E904CB30}" type="datetimeFigureOut">
               <a:rPr lang="en-US" smtClean="0"/>
-              <a:t>1/3/16</a:t>
+              <a:t>1/4/16</a:t>
             </a:fld>
             <a:endParaRPr lang="en-US"/>
           </a:p>
@@ -5067,7 +5167,7 @@
           <a:p>
             <a:fld id="{D140825E-4A15-4D39-8176-1F07E904CB30}" type="datetimeFigureOut">
               <a:rPr lang="en-US" smtClean="0"/>
-              <a:t>1/3/16</a:t>
+              <a:t>1/4/16</a:t>
             </a:fld>
             <a:endParaRPr lang="en-US"/>
           </a:p>
@@ -5552,7 +5652,7 @@
           <a:p>
             <a:fld id="{D140825E-4A15-4D39-8176-1F07E904CB30}" type="datetimeFigureOut">
               <a:rPr lang="en-US" smtClean="0"/>
-              <a:t>1/3/16</a:t>
+              <a:t>1/4/16</a:t>
             </a:fld>
             <a:endParaRPr lang="en-US"/>
           </a:p>
@@ -5815,7 +5915,7 @@
           <a:p>
             <a:fld id="{D140825E-4A15-4D39-8176-1F07E904CB30}" type="datetimeFigureOut">
               <a:rPr lang="en-US" smtClean="0"/>
-              <a:t>1/3/16</a:t>
+              <a:t>1/4/16</a:t>
             </a:fld>
             <a:endParaRPr lang="en-US"/>
           </a:p>
@@ -6622,7 +6722,7 @@
           <a:p>
             <a:r>
               <a:rPr lang="en-US" dirty="0" smtClean="0"/>
-              <a:t>Mock Servers As A Solution</a:t>
+              <a:t>JS App Development</a:t>
             </a:r>
             <a:endParaRPr lang="en-US" dirty="0"/>
           </a:p>
@@ -6640,118 +6740,85 @@
         </p:nvSpPr>
         <p:spPr/>
         <p:txBody>
-          <a:bodyPr/>
+          <a:bodyPr>
+            <a:normAutofit/>
+          </a:bodyPr>
           <a:lstStyle/>
           <a:p>
             <a:r>
               <a:rPr lang="en-US" dirty="0" smtClean="0"/>
-              <a:t>Mock Servers</a:t>
+              <a:t>Documentation</a:t>
+            </a:r>
+          </a:p>
+          <a:p>
+            <a:pPr lvl="1"/>
+            <a:r>
+              <a:rPr lang="en-US" dirty="0" smtClean="0"/>
+              <a:t>May not be able to communicate </a:t>
+            </a:r>
+            <a:r>
+              <a:rPr lang="en-US" dirty="0" err="1" smtClean="0"/>
+              <a:t>subtlies</a:t>
+            </a:r>
+            <a:endParaRPr lang="en-US" dirty="0" smtClean="0"/>
+          </a:p>
+          <a:p>
+            <a:pPr lvl="2"/>
+            <a:r>
+              <a:rPr lang="en-US" dirty="0" smtClean="0"/>
+              <a:t>Switches (‘one of these needs to be supplied’)</a:t>
+            </a:r>
+          </a:p>
+          <a:p>
+            <a:pPr lvl="2"/>
+            <a:r>
+              <a:rPr lang="en-US" dirty="0" smtClean="0"/>
+              <a:t>Dependencies (‘if this field is … then use this)</a:t>
+            </a:r>
+          </a:p>
+          <a:p>
+            <a:pPr lvl="2"/>
+            <a:r>
+              <a:rPr lang="en-US" dirty="0" smtClean="0"/>
+              <a:t>Date formats</a:t>
+            </a:r>
+          </a:p>
+          <a:p>
+            <a:r>
+              <a:rPr lang="en-US" dirty="0" smtClean="0"/>
+              <a:t>Summary</a:t>
             </a:r>
             <a:endParaRPr lang="en-US" dirty="0"/>
           </a:p>
           <a:p>
             <a:pPr lvl="1"/>
             <a:r>
-              <a:rPr lang="en-US" dirty="0" err="1" smtClean="0"/>
-              <a:t>Wiremock</a:t>
-            </a:r>
-            <a:r>
               <a:rPr lang="en-US" dirty="0" smtClean="0"/>
-              <a:t> </a:t>
-            </a:r>
-            <a:r>
-              <a:rPr lang="en-US" dirty="0"/>
-              <a:t>(java http://</a:t>
-            </a:r>
-            <a:r>
-              <a:rPr lang="en-US" dirty="0" err="1"/>
-              <a:t>wiremock.org</a:t>
-            </a:r>
-            <a:r>
-              <a:rPr lang="en-US" dirty="0"/>
-              <a:t>/)</a:t>
-            </a:r>
-          </a:p>
-          <a:p>
-            <a:pPr lvl="1"/>
-            <a:r>
-              <a:rPr lang="en-US" dirty="0" smtClean="0"/>
-              <a:t>Mountebank (node </a:t>
-            </a:r>
-            <a:r>
-              <a:rPr lang="en-US" dirty="0">
-                <a:hlinkClick r:id="rId2"/>
-              </a:rPr>
-              <a:t>http://</a:t>
-            </a:r>
-            <a:r>
-              <a:rPr lang="en-US" dirty="0" smtClean="0">
-                <a:hlinkClick r:id="rId2"/>
-              </a:rPr>
-              <a:t>mbtest.org</a:t>
-            </a:r>
-            <a:r>
-              <a:rPr lang="en-US" dirty="0" smtClean="0"/>
-              <a:t>)</a:t>
-            </a:r>
-          </a:p>
-          <a:p>
-            <a:r>
-              <a:rPr lang="en-US" dirty="0" smtClean="0"/>
-              <a:t>What Mountebank does</a:t>
-            </a:r>
-          </a:p>
-          <a:p>
-            <a:pPr lvl="1"/>
-            <a:r>
-              <a:rPr lang="en-US" dirty="0" smtClean="0"/>
-              <a:t>Provides a server that can be programmed to simulate request/response (</a:t>
-            </a:r>
-            <a:r>
-              <a:rPr lang="en-US" dirty="0" err="1" smtClean="0"/>
-              <a:t>eg</a:t>
-            </a:r>
-            <a:r>
-              <a:rPr lang="en-US" dirty="0" smtClean="0"/>
-              <a:t> JSON REST service)</a:t>
-            </a:r>
-          </a:p>
-          <a:p>
-            <a:pPr lvl="1"/>
-            <a:r>
-              <a:rPr lang="en-US" dirty="0" smtClean="0"/>
-              <a:t>Programmable DSL for request/response (JSON)</a:t>
-            </a:r>
-          </a:p>
-          <a:p>
-            <a:pPr lvl="1"/>
-            <a:r>
-              <a:rPr lang="en-US" dirty="0" smtClean="0"/>
-              <a:t>Multiple protocols (http, https, </a:t>
-            </a:r>
-            <a:r>
-              <a:rPr lang="en-US" dirty="0" err="1" smtClean="0"/>
-              <a:t>smtp</a:t>
-            </a:r>
-            <a:r>
-              <a:rPr lang="en-US" dirty="0" smtClean="0"/>
-              <a:t>, </a:t>
-            </a:r>
-            <a:r>
-              <a:rPr lang="en-US" dirty="0" err="1" smtClean="0"/>
-              <a:t>tcp</a:t>
-            </a:r>
-            <a:r>
-              <a:rPr lang="en-US" dirty="0" smtClean="0"/>
-              <a:t>)</a:t>
-            </a:r>
+              <a:t>Issues with schema-less nature of JSON</a:t>
+            </a:r>
+            <a:endParaRPr lang="en-US" dirty="0"/>
+          </a:p>
+          <a:p>
+            <a:pPr marL="282575" lvl="1" indent="0">
+              <a:buNone/>
+            </a:pPr>
+            <a:endParaRPr lang="en-US" dirty="0" smtClean="0"/>
+          </a:p>
+          <a:p>
+            <a:endParaRPr lang="en-US" dirty="0"/>
+          </a:p>
+          <a:p>
+            <a:endParaRPr lang="en-US" dirty="0" smtClean="0"/>
+          </a:p>
+          <a:p>
+            <a:endParaRPr lang="en-US" dirty="0"/>
           </a:p>
         </p:txBody>
       </p:sp>
     </p:spTree>
     <p:extLst>
       <p:ext uri="{BB962C8B-B14F-4D97-AF65-F5344CB8AC3E}">
-        <p14:creationId xmlns:p14="http://schemas.microsoft.com/office/powerpoint/2010/main" val="2220906113"/>
+        <p14:creationId xmlns:p14="http://schemas.microsoft.com/office/powerpoint/2010/main" val="1955692651"/>
       </p:ext>
     </p:extLst>
   </p:cSld>
@@ -6802,7 +6869,7 @@
           <a:p>
             <a:r>
               <a:rPr lang="en-US" dirty="0" smtClean="0"/>
-              <a:t>Examples</a:t>
+              <a:t>Mock Servers As A Solution</a:t>
             </a:r>
             <a:endParaRPr lang="en-US" dirty="0"/>
           </a:p>
@@ -6825,70 +6892,113 @@
           <a:p>
             <a:r>
               <a:rPr lang="en-US" dirty="0" smtClean="0"/>
-              <a:t>Postman (chrome plugin)</a:t>
-            </a:r>
-          </a:p>
-          <a:p>
+              <a:t>Mock Servers</a:t>
+            </a:r>
+            <a:endParaRPr lang="en-US" dirty="0"/>
+          </a:p>
+          <a:p>
+            <a:pPr lvl="1"/>
+            <a:r>
+              <a:rPr lang="en-US" dirty="0" err="1" smtClean="0"/>
+              <a:t>Wiremock</a:t>
+            </a:r>
             <a:r>
               <a:rPr lang="en-US" dirty="0" smtClean="0"/>
-              <a:t>Mountebank</a:t>
-            </a:r>
-          </a:p>
-          <a:p>
+              <a:t> </a:t>
+            </a:r>
             <a:r>
               <a:rPr lang="en-US" dirty="0"/>
-              <a:t>Mountebank-UI </a:t>
-            </a:r>
+              <a:t>(java http://</a:t>
+            </a:r>
+            <a:r>
+              <a:rPr lang="en-US" dirty="0" err="1"/>
+              <a:t>wiremock.org</a:t>
+            </a:r>
+            <a:r>
+              <a:rPr lang="en-US" dirty="0"/>
+              <a:t>/)</a:t>
+            </a:r>
+          </a:p>
+          <a:p>
+            <a:pPr lvl="1"/>
             <a:r>
               <a:rPr lang="en-US" dirty="0" smtClean="0"/>
-              <a:t>(http</a:t>
-            </a:r>
-            <a:r>
-              <a:rPr lang="en-US" dirty="0"/>
-              <a:t>://</a:t>
-            </a:r>
-            <a:r>
-              <a:rPr lang="en-US" dirty="0" err="1"/>
-              <a:t>donhenton.github.io</a:t>
-            </a:r>
-            <a:r>
-              <a:rPr lang="en-US" dirty="0"/>
-              <a:t>/mountebank-UI/</a:t>
-            </a:r>
-            <a:r>
-              <a:rPr lang="en-US" dirty="0" err="1"/>
-              <a:t>public_html</a:t>
-            </a:r>
-            <a:r>
-              <a:rPr lang="en-US" dirty="0"/>
-              <a:t>/</a:t>
-            </a:r>
-            <a:r>
-              <a:rPr lang="en-US" dirty="0" err="1"/>
-              <a:t>index.html</a:t>
-            </a:r>
-            <a:r>
-              <a:rPr lang="en-US" dirty="0"/>
-              <a:t>#</a:t>
+              <a:t>Mountebank (node </a:t>
+            </a:r>
+            <a:r>
+              <a:rPr lang="en-US" dirty="0">
+                <a:hlinkClick r:id="rId2"/>
+              </a:rPr>
+              <a:t>http://</a:t>
+            </a:r>
+            <a:r>
+              <a:rPr lang="en-US" dirty="0" smtClean="0">
+                <a:hlinkClick r:id="rId2"/>
+              </a:rPr>
+              <a:t>mbtest.org</a:t>
             </a:r>
             <a:r>
               <a:rPr lang="en-US" dirty="0" smtClean="0"/>
-              <a:t>/)</a:t>
-            </a:r>
-            <a:endParaRPr lang="en-US" dirty="0"/>
-          </a:p>
-          <a:p>
-            <a:pPr marL="282575" lvl="1" indent="0">
-              <a:buNone/>
-            </a:pPr>
-            <a:endParaRPr lang="en-US" dirty="0" smtClean="0"/>
+              <a:t>)</a:t>
+            </a:r>
+          </a:p>
+          <a:p>
+            <a:r>
+              <a:rPr lang="en-US" dirty="0" smtClean="0"/>
+              <a:t>What Mountebank does</a:t>
+            </a:r>
+          </a:p>
+          <a:p>
+            <a:pPr lvl="1"/>
+            <a:r>
+              <a:rPr lang="en-US" dirty="0" smtClean="0"/>
+              <a:t>Provides a server that can be programmed to simulate request/response (</a:t>
+            </a:r>
+            <a:r>
+              <a:rPr lang="en-US" dirty="0" err="1" smtClean="0"/>
+              <a:t>eg</a:t>
+            </a:r>
+            <a:r>
+              <a:rPr lang="en-US" dirty="0" smtClean="0"/>
+              <a:t> JSON REST service)</a:t>
+            </a:r>
+          </a:p>
+          <a:p>
+            <a:pPr lvl="1"/>
+            <a:r>
+              <a:rPr lang="en-US" dirty="0" smtClean="0"/>
+              <a:t>Programmable DSL for request/response  programming (JSON)</a:t>
+            </a:r>
+          </a:p>
+          <a:p>
+            <a:pPr lvl="1"/>
+            <a:r>
+              <a:rPr lang="en-US" dirty="0" smtClean="0"/>
+              <a:t>Multiple protocols (http, https, </a:t>
+            </a:r>
+            <a:r>
+              <a:rPr lang="en-US" dirty="0" err="1" smtClean="0"/>
+              <a:t>smtp</a:t>
+            </a:r>
+            <a:r>
+              <a:rPr lang="en-US" dirty="0" smtClean="0"/>
+              <a:t>, </a:t>
+            </a:r>
+            <a:r>
+              <a:rPr lang="en-US" dirty="0" err="1" smtClean="0"/>
+              <a:t>tcp</a:t>
+            </a:r>
+            <a:r>
+              <a:rPr lang="en-US" dirty="0" smtClean="0"/>
+              <a:t>)</a:t>
+            </a:r>
           </a:p>
         </p:txBody>
       </p:sp>
     </p:spTree>
     <p:extLst>
       <p:ext uri="{BB962C8B-B14F-4D97-AF65-F5344CB8AC3E}">
-        <p14:creationId xmlns:p14="http://schemas.microsoft.com/office/powerpoint/2010/main" val="4142261974"/>
+        <p14:creationId xmlns:p14="http://schemas.microsoft.com/office/powerpoint/2010/main" val="2220906113"/>
       </p:ext>
     </p:extLst>
   </p:cSld>
@@ -6939,7 +7049,7 @@
           <a:p>
             <a:r>
               <a:rPr lang="en-US" dirty="0" smtClean="0"/>
-              <a:t>Mountebank Installation</a:t>
+              <a:t>Examples Software</a:t>
             </a:r>
             <a:endParaRPr lang="en-US" dirty="0"/>
           </a:p>
@@ -6978,39 +7088,42 @@
             </a:r>
             <a:r>
               <a:rPr lang="en-US" dirty="0" smtClean="0"/>
-              <a:t>(http</a:t>
-            </a:r>
-            <a:r>
-              <a:rPr lang="en-US" dirty="0"/>
-              <a:t>://</a:t>
-            </a:r>
-            <a:r>
-              <a:rPr lang="en-US" dirty="0" err="1"/>
-              <a:t>donhenton.github.io</a:t>
-            </a:r>
-            <a:r>
-              <a:rPr lang="en-US" dirty="0"/>
-              <a:t>/mountebank-UI/</a:t>
-            </a:r>
-            <a:r>
-              <a:rPr lang="en-US" dirty="0" err="1"/>
-              <a:t>public_html</a:t>
-            </a:r>
-            <a:r>
-              <a:rPr lang="en-US" dirty="0"/>
+              <a:t>(</a:t>
+            </a:r>
+            <a:r>
+              <a:rPr lang="en-US" dirty="0" smtClean="0">
+                <a:hlinkClick r:id="rId3"/>
+              </a:rPr>
+              <a:t>http</a:t>
+            </a:r>
+            <a:r>
+              <a:rPr lang="en-US" dirty="0">
+                <a:hlinkClick r:id="rId3"/>
+              </a:rPr>
+              <a:t>://donhenton.github.io/mountebank-UI/public_html/index.html#</a:t>
+            </a:r>
+            <a:r>
+              <a:rPr lang="en-US" dirty="0" smtClean="0">
+                <a:hlinkClick r:id="rId3"/>
+              </a:rPr>
               <a:t>/</a:t>
             </a:r>
             <a:r>
-              <a:rPr lang="en-US" dirty="0" err="1"/>
-              <a:t>index.html</a:t>
-            </a:r>
-            <a:r>
-              <a:rPr lang="en-US" dirty="0"/>
-              <a:t>#</a:t>
-            </a:r>
-            <a:r>
               <a:rPr lang="en-US" dirty="0" smtClean="0"/>
-              <a:t>/)</a:t>
+              <a:t>)</a:t>
+            </a:r>
+          </a:p>
+          <a:p>
+            <a:r>
+              <a:rPr lang="en-US" dirty="0" err="1" smtClean="0"/>
+              <a:t>Netbeans</a:t>
+            </a:r>
+            <a:endParaRPr lang="en-US" dirty="0" smtClean="0"/>
+          </a:p>
+          <a:p>
+            <a:r>
+              <a:rPr lang="en-US" dirty="0" smtClean="0"/>
+              <a:t>Node</a:t>
             </a:r>
             <a:endParaRPr lang="en-US" dirty="0"/>
           </a:p>
@@ -7025,7 +7138,7 @@
     </p:spTree>
     <p:extLst>
       <p:ext uri="{BB962C8B-B14F-4D97-AF65-F5344CB8AC3E}">
-        <p14:creationId xmlns:p14="http://schemas.microsoft.com/office/powerpoint/2010/main" val="1991744321"/>
+        <p14:creationId xmlns:p14="http://schemas.microsoft.com/office/powerpoint/2010/main" val="4142261974"/>
       </p:ext>
     </p:extLst>
   </p:cSld>
@@ -7076,7 +7189,7 @@
           <a:p>
             <a:r>
               <a:rPr lang="en-US" dirty="0" smtClean="0"/>
-              <a:t>Examples</a:t>
+              <a:t>Mountebank Installation</a:t>
             </a:r>
             <a:endParaRPr lang="en-US" dirty="0"/>
           </a:p>
@@ -7092,9 +7205,16 @@
             <p:ph idx="1"/>
           </p:nvPr>
         </p:nvSpPr>
-        <p:spPr/>
-        <p:txBody>
-          <a:bodyPr/>
+        <p:spPr>
+          <a:xfrm>
+            <a:off x="779463" y="1828799"/>
+            <a:ext cx="7583487" cy="4415023"/>
+          </a:xfrm>
+        </p:spPr>
+        <p:txBody>
+          <a:bodyPr>
+            <a:normAutofit/>
+          </a:bodyPr>
           <a:lstStyle/>
           <a:p>
             <a:r>
@@ -7103,48 +7223,78 @@
             </a:r>
           </a:p>
           <a:p>
+            <a:r>
+              <a:rPr lang="en-US" dirty="0" smtClean="0"/>
+              <a:t>Mountebank</a:t>
+            </a:r>
+          </a:p>
+          <a:p>
+            <a:r>
+              <a:rPr lang="en-US" dirty="0"/>
+              <a:t>Mountebank-UI </a:t>
+            </a:r>
+            <a:r>
+              <a:rPr lang="en-US" dirty="0" smtClean="0"/>
+              <a:t>(</a:t>
+            </a:r>
+            <a:r>
+              <a:rPr lang="en-US" dirty="0" smtClean="0">
+                <a:hlinkClick r:id="rId3"/>
+              </a:rPr>
+              <a:t>http</a:t>
+            </a:r>
             <a:r>
               <a:rPr lang="en-US" dirty="0">
                 <a:hlinkClick r:id="rId3"/>
               </a:rPr>
-              <a:t>http://www.mbtest.org/docs/</a:t>
+              <a:t>://donhenton.github.io/mountebank-UI/public_html/index.html#</a:t>
             </a:r>
             <a:r>
               <a:rPr lang="en-US" dirty="0" smtClean="0">
                 <a:hlinkClick r:id="rId3"/>
               </a:rPr>
-              <a:t>install</a:t>
-            </a:r>
-            <a:endParaRPr lang="en-US" dirty="0" smtClean="0"/>
+              <a:t>/</a:t>
+            </a:r>
+            <a:r>
+              <a:rPr lang="en-US" dirty="0" smtClean="0"/>
+              <a:t>)</a:t>
+            </a:r>
+          </a:p>
+          <a:p>
+            <a:r>
+              <a:rPr lang="en-US" dirty="0">
+                <a:hlinkClick r:id="rId4"/>
+              </a:rPr>
+              <a:t>http://www.mbtest.org/docs/install</a:t>
+            </a:r>
+            <a:endParaRPr lang="en-US" dirty="0"/>
           </a:p>
           <a:p>
             <a:pPr lvl="1"/>
             <a:r>
-              <a:rPr lang="en-US" dirty="0" smtClean="0"/>
+              <a:rPr lang="en-US" dirty="0"/>
               <a:t>Provides various options</a:t>
             </a:r>
           </a:p>
           <a:p>
             <a:pPr lvl="1"/>
             <a:r>
-              <a:rPr lang="en-US" dirty="0" err="1" smtClean="0"/>
+              <a:rPr lang="en-US" dirty="0" err="1"/>
               <a:t>npm</a:t>
             </a:r>
-            <a:endParaRPr lang="en-US" dirty="0" smtClean="0"/>
+            <a:endParaRPr lang="en-US" dirty="0"/>
           </a:p>
           <a:p>
             <a:r>
               <a:rPr lang="en-US" dirty="0" err="1"/>
-              <a:t>n</a:t>
-            </a:r>
-            <a:r>
-              <a:rPr lang="en-US" dirty="0" err="1" smtClean="0"/>
-              <a:t>pm</a:t>
-            </a:r>
-            <a:r>
-              <a:rPr lang="en-US" smtClean="0"/>
+              <a:t>npm</a:t>
+            </a:r>
+            <a:r>
+              <a:rPr lang="en-US" dirty="0"/>
               <a:t> mountebank -g</a:t>
             </a:r>
+          </a:p>
+          <a:p>
             <a:endParaRPr lang="en-US" dirty="0"/>
           </a:p>
           <a:p>
@@ -7152,6 +7302,392 @@
               <a:buNone/>
             </a:pPr>
             <a:endParaRPr lang="en-US" dirty="0" smtClean="0"/>
+          </a:p>
+        </p:txBody>
+      </p:sp>
+    </p:spTree>
+    <p:extLst>
+      <p:ext uri="{BB962C8B-B14F-4D97-AF65-F5344CB8AC3E}">
+        <p14:creationId xmlns:p14="http://schemas.microsoft.com/office/powerpoint/2010/main" val="1991744321"/>
+      </p:ext>
+    </p:extLst>
+  </p:cSld>
+  <p:clrMapOvr>
+    <a:masterClrMapping/>
+  </p:clrMapOvr>
+  <p:timing>
+    <p:tnLst>
+      <p:par>
+        <p:cTn xmlns:p14="http://schemas.microsoft.com/office/powerpoint/2010/main" id="1" dur="indefinite" restart="never" nodeType="tmRoot"/>
+      </p:par>
+    </p:tnLst>
+  </p:timing>
+</p:sld>
+</file>
+
+<file path=ppt/slides/slide8.xml><?xml version="1.0" encoding="utf-8"?>
+<p:sld xmlns:a="http://schemas.openxmlformats.org/drawingml/2006/main" xmlns:r="http://schemas.openxmlformats.org/officeDocument/2006/relationships" xmlns:p="http://schemas.openxmlformats.org/presentationml/2006/main">
+  <p:cSld>
+    <p:spTree>
+      <p:nvGrpSpPr>
+        <p:cNvPr id="1" name=""/>
+        <p:cNvGrpSpPr/>
+        <p:nvPr/>
+      </p:nvGrpSpPr>
+      <p:grpSpPr>
+        <a:xfrm>
+          <a:off x="0" y="0"/>
+          <a:ext cx="0" cy="0"/>
+          <a:chOff x="0" y="0"/>
+          <a:chExt cx="0" cy="0"/>
+        </a:xfrm>
+      </p:grpSpPr>
+      <p:sp>
+        <p:nvSpPr>
+          <p:cNvPr id="2" name="Title 1"/>
+          <p:cNvSpPr>
+            <a:spLocks noGrp="1"/>
+          </p:cNvSpPr>
+          <p:nvPr>
+            <p:ph type="title"/>
+          </p:nvPr>
+        </p:nvSpPr>
+        <p:spPr/>
+        <p:txBody>
+          <a:bodyPr/>
+          <a:lstStyle/>
+          <a:p>
+            <a:r>
+              <a:rPr lang="en-US" dirty="0" smtClean="0"/>
+              <a:t>Agenda For Examples</a:t>
+            </a:r>
+            <a:endParaRPr lang="en-US" dirty="0"/>
+          </a:p>
+        </p:txBody>
+      </p:sp>
+      <p:sp>
+        <p:nvSpPr>
+          <p:cNvPr id="3" name="Content Placeholder 2"/>
+          <p:cNvSpPr>
+            <a:spLocks noGrp="1"/>
+          </p:cNvSpPr>
+          <p:nvPr>
+            <p:ph idx="1"/>
+          </p:nvPr>
+        </p:nvSpPr>
+        <p:spPr>
+          <a:xfrm>
+            <a:off x="779463" y="1828799"/>
+            <a:ext cx="7583487" cy="4566205"/>
+          </a:xfrm>
+        </p:spPr>
+        <p:txBody>
+          <a:bodyPr>
+            <a:normAutofit/>
+          </a:bodyPr>
+          <a:lstStyle/>
+          <a:p>
+            <a:r>
+              <a:rPr lang="en-US" dirty="0" smtClean="0"/>
+              <a:t>Simple Service Using Postman</a:t>
+            </a:r>
+          </a:p>
+          <a:p>
+            <a:pPr lvl="1"/>
+            <a:r>
+              <a:rPr lang="en-US" dirty="0" smtClean="0"/>
+              <a:t>Adding the </a:t>
+            </a:r>
+            <a:r>
+              <a:rPr lang="en-US" dirty="0" smtClean="0"/>
+              <a:t>service </a:t>
+            </a:r>
+            <a:r>
+              <a:rPr lang="en-US" dirty="0" smtClean="0"/>
+              <a:t>to Mountebank</a:t>
+            </a:r>
+          </a:p>
+          <a:p>
+            <a:pPr lvl="1"/>
+            <a:r>
+              <a:rPr lang="en-US" dirty="0" smtClean="0"/>
+              <a:t>Testing that service</a:t>
+            </a:r>
+          </a:p>
+          <a:p>
+            <a:pPr lvl="1"/>
+            <a:r>
+              <a:rPr lang="en-US" dirty="0" smtClean="0"/>
+              <a:t>Listing Mountebank services</a:t>
+            </a:r>
+          </a:p>
+          <a:p>
+            <a:pPr lvl="1"/>
+            <a:r>
+              <a:rPr lang="en-US" dirty="0" smtClean="0"/>
+              <a:t>Listing the responses that are captured</a:t>
+            </a:r>
+          </a:p>
+          <a:p>
+            <a:r>
+              <a:rPr lang="en-US" dirty="0" smtClean="0"/>
+              <a:t>Full blown port of Swagger System</a:t>
+            </a:r>
+          </a:p>
+          <a:p>
+            <a:r>
+              <a:rPr lang="en-US" dirty="0" smtClean="0"/>
+              <a:t>Injection Demonstration (use of code for request/</a:t>
+            </a:r>
+            <a:r>
+              <a:rPr lang="en-US" dirty="0" smtClean="0"/>
+              <a:t>response)</a:t>
+            </a:r>
+          </a:p>
+          <a:p>
+            <a:r>
+              <a:rPr lang="en-US" dirty="0" smtClean="0"/>
+              <a:t>Use in Unit Tests</a:t>
+            </a:r>
+            <a:endParaRPr lang="en-US" dirty="0" smtClean="0"/>
+          </a:p>
+        </p:txBody>
+      </p:sp>
+    </p:spTree>
+    <p:extLst>
+      <p:ext uri="{BB962C8B-B14F-4D97-AF65-F5344CB8AC3E}">
+        <p14:creationId xmlns:p14="http://schemas.microsoft.com/office/powerpoint/2010/main" val="1991744321"/>
+      </p:ext>
+    </p:extLst>
+  </p:cSld>
+  <p:clrMapOvr>
+    <a:masterClrMapping/>
+  </p:clrMapOvr>
+  <p:timing>
+    <p:tnLst>
+      <p:par>
+        <p:cTn xmlns:p14="http://schemas.microsoft.com/office/powerpoint/2010/main" id="1" dur="indefinite" restart="never" nodeType="tmRoot"/>
+      </p:par>
+    </p:tnLst>
+  </p:timing>
+</p:sld>
+</file>
+
+<file path=ppt/slides/slide9.xml><?xml version="1.0" encoding="utf-8"?>
+<p:sld xmlns:a="http://schemas.openxmlformats.org/drawingml/2006/main" xmlns:r="http://schemas.openxmlformats.org/officeDocument/2006/relationships" xmlns:p="http://schemas.openxmlformats.org/presentationml/2006/main">
+  <p:cSld>
+    <p:spTree>
+      <p:nvGrpSpPr>
+        <p:cNvPr id="1" name=""/>
+        <p:cNvGrpSpPr/>
+        <p:nvPr/>
+      </p:nvGrpSpPr>
+      <p:grpSpPr>
+        <a:xfrm>
+          <a:off x="0" y="0"/>
+          <a:ext cx="0" cy="0"/>
+          <a:chOff x="0" y="0"/>
+          <a:chExt cx="0" cy="0"/>
+        </a:xfrm>
+      </p:grpSpPr>
+      <p:sp>
+        <p:nvSpPr>
+          <p:cNvPr id="2" name="Title 1"/>
+          <p:cNvSpPr>
+            <a:spLocks noGrp="1"/>
+          </p:cNvSpPr>
+          <p:nvPr>
+            <p:ph type="title"/>
+          </p:nvPr>
+        </p:nvSpPr>
+        <p:spPr/>
+        <p:txBody>
+          <a:bodyPr/>
+          <a:lstStyle/>
+          <a:p>
+            <a:r>
+              <a:rPr lang="en-US" dirty="0" smtClean="0"/>
+              <a:t>Simple Service</a:t>
+            </a:r>
+            <a:endParaRPr lang="en-US" dirty="0"/>
+          </a:p>
+        </p:txBody>
+      </p:sp>
+      <p:sp>
+        <p:nvSpPr>
+          <p:cNvPr id="3" name="Content Placeholder 2"/>
+          <p:cNvSpPr>
+            <a:spLocks noGrp="1"/>
+          </p:cNvSpPr>
+          <p:nvPr>
+            <p:ph idx="1"/>
+          </p:nvPr>
+        </p:nvSpPr>
+        <p:spPr>
+          <a:xfrm>
+            <a:off x="779463" y="1828799"/>
+            <a:ext cx="7583487" cy="4566205"/>
+          </a:xfrm>
+        </p:spPr>
+        <p:txBody>
+          <a:bodyPr>
+            <a:normAutofit/>
+          </a:bodyPr>
+          <a:lstStyle/>
+          <a:p>
+            <a:r>
+              <a:rPr lang="en-US" dirty="0"/>
+              <a:t>Start Mountebank</a:t>
+            </a:r>
+          </a:p>
+          <a:p>
+            <a:pPr lvl="1"/>
+            <a:r>
+              <a:rPr lang="en-US" b="1" dirty="0" err="1">
+                <a:solidFill>
+                  <a:schemeClr val="accent2">
+                    <a:lumMod val="60000"/>
+                    <a:lumOff val="40000"/>
+                  </a:schemeClr>
+                </a:solidFill>
+              </a:rPr>
+              <a:t>mb</a:t>
+            </a:r>
+            <a:r>
+              <a:rPr lang="en-US" b="1" dirty="0">
+                <a:solidFill>
+                  <a:schemeClr val="accent2">
+                    <a:lumMod val="60000"/>
+                    <a:lumOff val="40000"/>
+                  </a:schemeClr>
+                </a:solidFill>
+              </a:rPr>
+              <a:t>  --</a:t>
+            </a:r>
+            <a:r>
+              <a:rPr lang="en-US" b="1" dirty="0" err="1">
+                <a:solidFill>
+                  <a:schemeClr val="accent2">
+                    <a:lumMod val="60000"/>
+                    <a:lumOff val="40000"/>
+                  </a:schemeClr>
+                </a:solidFill>
+              </a:rPr>
+              <a:t>allowCORS</a:t>
+            </a:r>
+            <a:r>
+              <a:rPr lang="en-US" b="1" dirty="0">
+                <a:solidFill>
+                  <a:schemeClr val="accent2">
+                    <a:lumMod val="60000"/>
+                    <a:lumOff val="40000"/>
+                  </a:schemeClr>
+                </a:solidFill>
+              </a:rPr>
+              <a:t> –</a:t>
+            </a:r>
+            <a:r>
+              <a:rPr lang="en-US" b="1" dirty="0" err="1">
+                <a:solidFill>
+                  <a:schemeClr val="accent2">
+                    <a:lumMod val="60000"/>
+                    <a:lumOff val="40000"/>
+                  </a:schemeClr>
+                </a:solidFill>
+              </a:rPr>
+              <a:t>allowInjection</a:t>
+            </a:r>
+            <a:r>
+              <a:rPr lang="en-US" b="1" dirty="0">
+                <a:solidFill>
+                  <a:schemeClr val="accent2">
+                    <a:lumMod val="60000"/>
+                    <a:lumOff val="40000"/>
+                  </a:schemeClr>
+                </a:solidFill>
+              </a:rPr>
+              <a:t> </a:t>
+            </a:r>
+            <a:r>
+              <a:rPr lang="en-US" b="1" dirty="0" smtClean="0">
+                <a:solidFill>
+                  <a:schemeClr val="accent2">
+                    <a:lumMod val="60000"/>
+                    <a:lumOff val="40000"/>
+                  </a:schemeClr>
+                </a:solidFill>
+              </a:rPr>
+              <a:t>-–</a:t>
+            </a:r>
+            <a:r>
+              <a:rPr lang="en-US" b="1" dirty="0">
+                <a:solidFill>
+                  <a:schemeClr val="accent2">
+                    <a:lumMod val="60000"/>
+                    <a:lumOff val="40000"/>
+                  </a:schemeClr>
+                </a:solidFill>
+              </a:rPr>
+              <a:t>mock</a:t>
+            </a:r>
+          </a:p>
+          <a:p>
+            <a:pPr lvl="1"/>
+            <a:r>
+              <a:rPr lang="en-US" dirty="0" smtClean="0"/>
+              <a:t>Start parameters</a:t>
+            </a:r>
+          </a:p>
+          <a:p>
+            <a:pPr lvl="2"/>
+            <a:r>
+              <a:rPr lang="en-US" dirty="0" smtClean="0"/>
+              <a:t>CORS requests</a:t>
+            </a:r>
+          </a:p>
+          <a:p>
+            <a:pPr lvl="2"/>
+            <a:r>
+              <a:rPr lang="en-US" dirty="0" smtClean="0"/>
+              <a:t>Can use JavaScript functions for request/response</a:t>
+            </a:r>
+          </a:p>
+          <a:p>
+            <a:pPr lvl="2"/>
+            <a:r>
+              <a:rPr lang="en-US" dirty="0" smtClean="0"/>
+              <a:t>	Allows recording of requests that were </a:t>
+            </a:r>
+            <a:r>
+              <a:rPr lang="en-US" dirty="0" smtClean="0"/>
+              <a:t>made</a:t>
+            </a:r>
+          </a:p>
+          <a:p>
+            <a:pPr lvl="1"/>
+            <a:r>
+              <a:rPr lang="en-US" dirty="0" smtClean="0"/>
+              <a:t>Postman demonstration</a:t>
+            </a:r>
+          </a:p>
+          <a:p>
+            <a:pPr lvl="1"/>
+            <a:endParaRPr lang="en-US" dirty="0" smtClean="0"/>
+          </a:p>
+          <a:p>
+            <a:endParaRPr lang="en-US" dirty="0"/>
+          </a:p>
+          <a:p>
+            <a:endParaRPr lang="en-US" dirty="0"/>
+          </a:p>
+          <a:p>
+            <a:pPr marL="282575" lvl="1" indent="0">
+              <a:buNone/>
+            </a:pPr>
+            <a:r>
+              <a:rPr lang="en-US" dirty="0" smtClean="0"/>
+              <a:t>	</a:t>
+            </a:r>
           </a:p>
         </p:txBody>
       </p:sp>

</xml_diff>

<commit_message>
working on madjs presentation 5
</commit_message>
<xml_diff>
--- a/docs/madjs/MADJS-Mountebank.pptx
+++ b/docs/madjs/MADJS-Mountebank.pptx
@@ -5,7 +5,7 @@
     <p:sldMasterId id="2147483660" r:id="rId1"/>
   </p:sldMasterIdLst>
   <p:notesMasterIdLst>
-    <p:notesMasterId r:id="rId11"/>
+    <p:notesMasterId r:id="rId13"/>
   </p:notesMasterIdLst>
   <p:sldIdLst>
     <p:sldId id="256" r:id="rId2"/>
@@ -17,6 +17,8 @@
     <p:sldId id="261" r:id="rId8"/>
     <p:sldId id="262" r:id="rId9"/>
     <p:sldId id="264" r:id="rId10"/>
+    <p:sldId id="266" r:id="rId11"/>
+    <p:sldId id="267" r:id="rId12"/>
   </p:sldIdLst>
   <p:sldSz cx="9144000" cy="6858000" type="screen4x3"/>
   <p:notesSz cx="6858000" cy="9144000"/>
@@ -974,6 +976,226 @@
             <a:fld id="{B98EA67F-C197-E74D-9FDA-9E55EF59A78D}" type="slidenum">
               <a:rPr lang="en-US" smtClean="0"/>
               <a:t>9</a:t>
+            </a:fld>
+            <a:endParaRPr lang="en-US"/>
+          </a:p>
+        </p:txBody>
+      </p:sp>
+    </p:spTree>
+    <p:extLst>
+      <p:ext uri="{BB962C8B-B14F-4D97-AF65-F5344CB8AC3E}">
+        <p14:creationId xmlns:p14="http://schemas.microsoft.com/office/powerpoint/2010/main" val="2842145168"/>
+      </p:ext>
+    </p:extLst>
+  </p:cSld>
+  <p:clrMapOvr>
+    <a:masterClrMapping/>
+  </p:clrMapOvr>
+</p:notes>
+</file>
+
+<file path=ppt/notesSlides/notesSlide6.xml><?xml version="1.0" encoding="utf-8"?>
+<p:notes xmlns:a="http://schemas.openxmlformats.org/drawingml/2006/main" xmlns:r="http://schemas.openxmlformats.org/officeDocument/2006/relationships" xmlns:p="http://schemas.openxmlformats.org/presentationml/2006/main">
+  <p:cSld>
+    <p:spTree>
+      <p:nvGrpSpPr>
+        <p:cNvPr id="1" name=""/>
+        <p:cNvGrpSpPr/>
+        <p:nvPr/>
+      </p:nvGrpSpPr>
+      <p:grpSpPr>
+        <a:xfrm>
+          <a:off x="0" y="0"/>
+          <a:ext cx="0" cy="0"/>
+          <a:chOff x="0" y="0"/>
+          <a:chExt cx="0" cy="0"/>
+        </a:xfrm>
+      </p:grpSpPr>
+      <p:sp>
+        <p:nvSpPr>
+          <p:cNvPr id="2" name="Slide Image Placeholder 1"/>
+          <p:cNvSpPr>
+            <a:spLocks noGrp="1" noRot="1" noChangeAspect="1"/>
+          </p:cNvSpPr>
+          <p:nvPr>
+            <p:ph type="sldImg"/>
+          </p:nvPr>
+        </p:nvSpPr>
+        <p:spPr/>
+      </p:sp>
+      <p:sp>
+        <p:nvSpPr>
+          <p:cNvPr id="3" name="Notes Placeholder 2"/>
+          <p:cNvSpPr>
+            <a:spLocks noGrp="1"/>
+          </p:cNvSpPr>
+          <p:nvPr>
+            <p:ph type="body" idx="1"/>
+          </p:nvPr>
+        </p:nvSpPr>
+        <p:spPr/>
+        <p:txBody>
+          <a:bodyPr/>
+          <a:lstStyle/>
+          <a:p>
+            <a:r>
+              <a:rPr lang="en-US" dirty="0" smtClean="0"/>
+              <a:t>Launch</a:t>
+            </a:r>
+            <a:r>
+              <a:rPr lang="en-US" baseline="0" dirty="0" smtClean="0"/>
+              <a:t> postman</a:t>
+            </a:r>
+          </a:p>
+          <a:p>
+            <a:r>
+              <a:rPr lang="en-US" baseline="0" dirty="0" smtClean="0"/>
+              <a:t>Launch mountebank</a:t>
+            </a:r>
+          </a:p>
+          <a:p>
+            <a:r>
+              <a:rPr lang="en-US" baseline="0" dirty="0" smtClean="0"/>
+              <a:t>Use postman to load it</a:t>
+            </a:r>
+          </a:p>
+          <a:p>
+            <a:r>
+              <a:rPr lang="en-US" baseline="0" dirty="0" smtClean="0"/>
+              <a:t>Use postman to test it</a:t>
+            </a:r>
+            <a:endParaRPr lang="en-US" dirty="0"/>
+          </a:p>
+        </p:txBody>
+      </p:sp>
+      <p:sp>
+        <p:nvSpPr>
+          <p:cNvPr id="4" name="Slide Number Placeholder 3"/>
+          <p:cNvSpPr>
+            <a:spLocks noGrp="1"/>
+          </p:cNvSpPr>
+          <p:nvPr>
+            <p:ph type="sldNum" sz="quarter" idx="10"/>
+          </p:nvPr>
+        </p:nvSpPr>
+        <p:spPr/>
+        <p:txBody>
+          <a:bodyPr/>
+          <a:lstStyle/>
+          <a:p>
+            <a:fld id="{B98EA67F-C197-E74D-9FDA-9E55EF59A78D}" type="slidenum">
+              <a:rPr lang="en-US" smtClean="0"/>
+              <a:t>10</a:t>
+            </a:fld>
+            <a:endParaRPr lang="en-US"/>
+          </a:p>
+        </p:txBody>
+      </p:sp>
+    </p:spTree>
+    <p:extLst>
+      <p:ext uri="{BB962C8B-B14F-4D97-AF65-F5344CB8AC3E}">
+        <p14:creationId xmlns:p14="http://schemas.microsoft.com/office/powerpoint/2010/main" val="2842145168"/>
+      </p:ext>
+    </p:extLst>
+  </p:cSld>
+  <p:clrMapOvr>
+    <a:masterClrMapping/>
+  </p:clrMapOvr>
+</p:notes>
+</file>
+
+<file path=ppt/notesSlides/notesSlide7.xml><?xml version="1.0" encoding="utf-8"?>
+<p:notes xmlns:a="http://schemas.openxmlformats.org/drawingml/2006/main" xmlns:r="http://schemas.openxmlformats.org/officeDocument/2006/relationships" xmlns:p="http://schemas.openxmlformats.org/presentationml/2006/main">
+  <p:cSld>
+    <p:spTree>
+      <p:nvGrpSpPr>
+        <p:cNvPr id="1" name=""/>
+        <p:cNvGrpSpPr/>
+        <p:nvPr/>
+      </p:nvGrpSpPr>
+      <p:grpSpPr>
+        <a:xfrm>
+          <a:off x="0" y="0"/>
+          <a:ext cx="0" cy="0"/>
+          <a:chOff x="0" y="0"/>
+          <a:chExt cx="0" cy="0"/>
+        </a:xfrm>
+      </p:grpSpPr>
+      <p:sp>
+        <p:nvSpPr>
+          <p:cNvPr id="2" name="Slide Image Placeholder 1"/>
+          <p:cNvSpPr>
+            <a:spLocks noGrp="1" noRot="1" noChangeAspect="1"/>
+          </p:cNvSpPr>
+          <p:nvPr>
+            <p:ph type="sldImg"/>
+          </p:nvPr>
+        </p:nvSpPr>
+        <p:spPr/>
+      </p:sp>
+      <p:sp>
+        <p:nvSpPr>
+          <p:cNvPr id="3" name="Notes Placeholder 2"/>
+          <p:cNvSpPr>
+            <a:spLocks noGrp="1"/>
+          </p:cNvSpPr>
+          <p:nvPr>
+            <p:ph type="body" idx="1"/>
+          </p:nvPr>
+        </p:nvSpPr>
+        <p:spPr/>
+        <p:txBody>
+          <a:bodyPr/>
+          <a:lstStyle/>
+          <a:p>
+            <a:r>
+              <a:rPr lang="en-US" dirty="0" smtClean="0"/>
+              <a:t>Launch</a:t>
+            </a:r>
+            <a:r>
+              <a:rPr lang="en-US" baseline="0" dirty="0" smtClean="0"/>
+              <a:t> postman</a:t>
+            </a:r>
+          </a:p>
+          <a:p>
+            <a:r>
+              <a:rPr lang="en-US" baseline="0" dirty="0" smtClean="0"/>
+              <a:t>Launch mountebank</a:t>
+            </a:r>
+          </a:p>
+          <a:p>
+            <a:r>
+              <a:rPr lang="en-US" baseline="0" dirty="0" smtClean="0"/>
+              <a:t>Use postman to load it</a:t>
+            </a:r>
+          </a:p>
+          <a:p>
+            <a:r>
+              <a:rPr lang="en-US" baseline="0" dirty="0" smtClean="0"/>
+              <a:t>Use postman to test it</a:t>
+            </a:r>
+            <a:endParaRPr lang="en-US" dirty="0"/>
+          </a:p>
+        </p:txBody>
+      </p:sp>
+      <p:sp>
+        <p:nvSpPr>
+          <p:cNvPr id="4" name="Slide Number Placeholder 3"/>
+          <p:cNvSpPr>
+            <a:spLocks noGrp="1"/>
+          </p:cNvSpPr>
+          <p:nvPr>
+            <p:ph type="sldNum" sz="quarter" idx="10"/>
+          </p:nvPr>
+        </p:nvSpPr>
+        <p:spPr/>
+        <p:txBody>
+          <a:bodyPr/>
+          <a:lstStyle/>
+          <a:p>
+            <a:fld id="{B98EA67F-C197-E74D-9FDA-9E55EF59A78D}" type="slidenum">
+              <a:rPr lang="en-US" smtClean="0"/>
+              <a:t>11</a:t>
             </a:fld>
             <a:endParaRPr lang="en-US"/>
           </a:p>
@@ -6375,6 +6597,339 @@
 </p:sld>
 </file>
 
+<file path=ppt/slides/slide10.xml><?xml version="1.0" encoding="utf-8"?>
+<p:sld xmlns:a="http://schemas.openxmlformats.org/drawingml/2006/main" xmlns:r="http://schemas.openxmlformats.org/officeDocument/2006/relationships" xmlns:p="http://schemas.openxmlformats.org/presentationml/2006/main">
+  <p:cSld>
+    <p:spTree>
+      <p:nvGrpSpPr>
+        <p:cNvPr id="1" name=""/>
+        <p:cNvGrpSpPr/>
+        <p:nvPr/>
+      </p:nvGrpSpPr>
+      <p:grpSpPr>
+        <a:xfrm>
+          <a:off x="0" y="0"/>
+          <a:ext cx="0" cy="0"/>
+          <a:chOff x="0" y="0"/>
+          <a:chExt cx="0" cy="0"/>
+        </a:xfrm>
+      </p:grpSpPr>
+      <p:sp>
+        <p:nvSpPr>
+          <p:cNvPr id="2" name="Title 1"/>
+          <p:cNvSpPr>
+            <a:spLocks noGrp="1"/>
+          </p:cNvSpPr>
+          <p:nvPr>
+            <p:ph type="title"/>
+          </p:nvPr>
+        </p:nvSpPr>
+        <p:spPr/>
+        <p:txBody>
+          <a:bodyPr/>
+          <a:lstStyle/>
+          <a:p>
+            <a:r>
+              <a:rPr lang="en-US" dirty="0" smtClean="0"/>
+              <a:t>Simple Service</a:t>
+            </a:r>
+            <a:endParaRPr lang="en-US" dirty="0"/>
+          </a:p>
+        </p:txBody>
+      </p:sp>
+      <p:sp>
+        <p:nvSpPr>
+          <p:cNvPr id="3" name="Content Placeholder 2"/>
+          <p:cNvSpPr>
+            <a:spLocks noGrp="1"/>
+          </p:cNvSpPr>
+          <p:nvPr>
+            <p:ph idx="1"/>
+          </p:nvPr>
+        </p:nvSpPr>
+        <p:spPr>
+          <a:xfrm>
+            <a:off x="779463" y="1828799"/>
+            <a:ext cx="7583487" cy="4566205"/>
+          </a:xfrm>
+        </p:spPr>
+        <p:txBody>
+          <a:bodyPr>
+            <a:normAutofit fontScale="92500" lnSpcReduction="10000"/>
+          </a:bodyPr>
+          <a:lstStyle/>
+          <a:p>
+            <a:r>
+              <a:rPr lang="en-US" dirty="0" smtClean="0"/>
+              <a:t>Postman demonstration</a:t>
+            </a:r>
+          </a:p>
+          <a:p>
+            <a:pPr lvl="1"/>
+            <a:r>
+              <a:rPr lang="en-US" dirty="0"/>
+              <a:t>source </a:t>
+            </a:r>
+            <a:r>
+              <a:rPr lang="en-US" dirty="0">
+                <a:hlinkClick r:id="rId3"/>
+              </a:rPr>
+              <a:t>https://github.com/donhenton/mountebank-</a:t>
+            </a:r>
+            <a:r>
+              <a:rPr lang="en-US" dirty="0" smtClean="0">
+                <a:hlinkClick r:id="rId3"/>
+              </a:rPr>
+              <a:t>UI</a:t>
+            </a:r>
+            <a:endParaRPr lang="en-US" dirty="0" smtClean="0"/>
+          </a:p>
+          <a:p>
+            <a:pPr lvl="1"/>
+            <a:r>
+              <a:rPr lang="en-US" dirty="0" smtClean="0"/>
+              <a:t>docs/ mountebank-</a:t>
+            </a:r>
+            <a:r>
+              <a:rPr lang="en-US" dirty="0" err="1" smtClean="0"/>
+              <a:t>madjs.postman_collection</a:t>
+            </a:r>
+            <a:endParaRPr lang="en-US" dirty="0"/>
+          </a:p>
+          <a:p>
+            <a:r>
+              <a:rPr lang="en-US" dirty="0" smtClean="0"/>
+              <a:t>Mountebank UI file</a:t>
+            </a:r>
+          </a:p>
+          <a:p>
+            <a:pPr lvl="1"/>
+            <a:r>
+              <a:rPr lang="en-US" dirty="0" smtClean="0"/>
+              <a:t>docs/mountebank-UI-</a:t>
+            </a:r>
+            <a:r>
+              <a:rPr lang="en-US" dirty="0" err="1" smtClean="0"/>
+              <a:t>restaurant.json</a:t>
+            </a:r>
+            <a:r>
+              <a:rPr lang="en-US" dirty="0" smtClean="0"/>
+              <a:t> </a:t>
+            </a:r>
+            <a:endParaRPr lang="en-US" dirty="0" smtClean="0"/>
+          </a:p>
+          <a:p>
+            <a:pPr lvl="1"/>
+            <a:r>
+              <a:rPr lang="en-US" dirty="0" smtClean="0"/>
+              <a:t>this file contains all the entries used in this presentation</a:t>
+            </a:r>
+          </a:p>
+          <a:p>
+            <a:endParaRPr lang="en-US" dirty="0" smtClean="0"/>
+          </a:p>
+          <a:p>
+            <a:pPr lvl="1"/>
+            <a:endParaRPr lang="en-US" dirty="0" smtClean="0"/>
+          </a:p>
+          <a:p>
+            <a:endParaRPr lang="en-US" dirty="0"/>
+          </a:p>
+          <a:p>
+            <a:endParaRPr lang="en-US" dirty="0"/>
+          </a:p>
+          <a:p>
+            <a:pPr marL="282575" lvl="1" indent="0">
+              <a:buNone/>
+            </a:pPr>
+            <a:r>
+              <a:rPr lang="en-US" dirty="0" smtClean="0"/>
+              <a:t>	</a:t>
+            </a:r>
+          </a:p>
+        </p:txBody>
+      </p:sp>
+    </p:spTree>
+    <p:extLst>
+      <p:ext uri="{BB962C8B-B14F-4D97-AF65-F5344CB8AC3E}">
+        <p14:creationId xmlns:p14="http://schemas.microsoft.com/office/powerpoint/2010/main" val="563705421"/>
+      </p:ext>
+    </p:extLst>
+  </p:cSld>
+  <p:clrMapOvr>
+    <a:masterClrMapping/>
+  </p:clrMapOvr>
+  <p:timing>
+    <p:tnLst>
+      <p:par>
+        <p:cTn xmlns:p14="http://schemas.microsoft.com/office/powerpoint/2010/main" id="1" dur="indefinite" restart="never" nodeType="tmRoot"/>
+      </p:par>
+    </p:tnLst>
+  </p:timing>
+</p:sld>
+</file>
+
+<file path=ppt/slides/slide11.xml><?xml version="1.0" encoding="utf-8"?>
+<p:sld xmlns:a="http://schemas.openxmlformats.org/drawingml/2006/main" xmlns:r="http://schemas.openxmlformats.org/officeDocument/2006/relationships" xmlns:p="http://schemas.openxmlformats.org/presentationml/2006/main">
+  <p:cSld>
+    <p:spTree>
+      <p:nvGrpSpPr>
+        <p:cNvPr id="1" name=""/>
+        <p:cNvGrpSpPr/>
+        <p:nvPr/>
+      </p:nvGrpSpPr>
+      <p:grpSpPr>
+        <a:xfrm>
+          <a:off x="0" y="0"/>
+          <a:ext cx="0" cy="0"/>
+          <a:chOff x="0" y="0"/>
+          <a:chExt cx="0" cy="0"/>
+        </a:xfrm>
+      </p:grpSpPr>
+      <p:sp>
+        <p:nvSpPr>
+          <p:cNvPr id="2" name="Title 1"/>
+          <p:cNvSpPr>
+            <a:spLocks noGrp="1"/>
+          </p:cNvSpPr>
+          <p:nvPr>
+            <p:ph type="title"/>
+          </p:nvPr>
+        </p:nvSpPr>
+        <p:spPr/>
+        <p:txBody>
+          <a:bodyPr/>
+          <a:lstStyle/>
+          <a:p>
+            <a:r>
+              <a:rPr lang="en-US" dirty="0" smtClean="0"/>
+              <a:t>Restaurant Service</a:t>
+            </a:r>
+            <a:endParaRPr lang="en-US" dirty="0"/>
+          </a:p>
+        </p:txBody>
+      </p:sp>
+      <p:sp>
+        <p:nvSpPr>
+          <p:cNvPr id="3" name="Content Placeholder 2"/>
+          <p:cNvSpPr>
+            <a:spLocks noGrp="1"/>
+          </p:cNvSpPr>
+          <p:nvPr>
+            <p:ph idx="1"/>
+          </p:nvPr>
+        </p:nvSpPr>
+        <p:spPr>
+          <a:xfrm>
+            <a:off x="779463" y="1828799"/>
+            <a:ext cx="7583487" cy="4566205"/>
+          </a:xfrm>
+        </p:spPr>
+        <p:txBody>
+          <a:bodyPr>
+            <a:normAutofit fontScale="92500" lnSpcReduction="10000"/>
+          </a:bodyPr>
+          <a:lstStyle/>
+          <a:p>
+            <a:r>
+              <a:rPr lang="en-US" dirty="0" smtClean="0"/>
+              <a:t>Postman Documentation</a:t>
+            </a:r>
+          </a:p>
+          <a:p>
+            <a:pPr lvl="1"/>
+            <a:r>
+              <a:rPr lang="en-US" dirty="0" smtClean="0"/>
+              <a:t>source </a:t>
+            </a:r>
+            <a:r>
+              <a:rPr lang="en-US" dirty="0" smtClean="0">
+                <a:hlinkClick r:id="rId3"/>
+              </a:rPr>
+              <a:t>https://github.com/donhenton/mountebank-UI</a:t>
+            </a:r>
+            <a:endParaRPr lang="en-US" dirty="0" smtClean="0"/>
+          </a:p>
+          <a:p>
+            <a:pPr lvl="1"/>
+            <a:r>
+              <a:rPr lang="en-US" dirty="0" smtClean="0"/>
+              <a:t>docs/ mountebank-</a:t>
+            </a:r>
+            <a:r>
+              <a:rPr lang="en-US" dirty="0" err="1" smtClean="0"/>
+              <a:t>restaurant.postman_collection</a:t>
+            </a:r>
+            <a:endParaRPr lang="en-US" dirty="0" smtClean="0"/>
+          </a:p>
+          <a:p>
+            <a:r>
+              <a:rPr lang="en-US" dirty="0" smtClean="0"/>
+              <a:t>Swagger Documentation</a:t>
+            </a:r>
+          </a:p>
+          <a:p>
+            <a:pPr lvl="1"/>
+            <a:r>
+              <a:rPr lang="en-US" dirty="0">
+                <a:hlinkClick r:id="rId4"/>
+              </a:rPr>
+              <a:t>http://donhenton-springmvc3.herokuapp.com/app/swagger/sdoc</a:t>
+            </a:r>
+            <a:r>
+              <a:rPr lang="en-US"/>
+              <a:t> </a:t>
+            </a:r>
+            <a:r>
+              <a:rPr lang="en-US" smtClean="0"/>
+              <a:t> </a:t>
+            </a:r>
+            <a:endParaRPr lang="en-US" dirty="0" smtClean="0"/>
+          </a:p>
+          <a:p>
+            <a:endParaRPr lang="en-US" dirty="0" smtClean="0"/>
+          </a:p>
+          <a:p>
+            <a:pPr lvl="1"/>
+            <a:endParaRPr lang="en-US" dirty="0" smtClean="0"/>
+          </a:p>
+          <a:p>
+            <a:endParaRPr lang="en-US" dirty="0"/>
+          </a:p>
+          <a:p>
+            <a:endParaRPr lang="en-US" dirty="0"/>
+          </a:p>
+          <a:p>
+            <a:pPr marL="282575" lvl="1" indent="0">
+              <a:buNone/>
+            </a:pPr>
+            <a:r>
+              <a:rPr lang="en-US" dirty="0" smtClean="0"/>
+              <a:t>	</a:t>
+            </a:r>
+          </a:p>
+        </p:txBody>
+      </p:sp>
+    </p:spTree>
+    <p:extLst>
+      <p:ext uri="{BB962C8B-B14F-4D97-AF65-F5344CB8AC3E}">
+        <p14:creationId xmlns:p14="http://schemas.microsoft.com/office/powerpoint/2010/main" val="3777627379"/>
+      </p:ext>
+    </p:extLst>
+  </p:cSld>
+  <p:clrMapOvr>
+    <a:masterClrMapping/>
+  </p:clrMapOvr>
+  <p:timing>
+    <p:tnLst>
+      <p:par>
+        <p:cTn xmlns:p14="http://schemas.microsoft.com/office/powerpoint/2010/main" id="1" dur="indefinite" restart="never" nodeType="tmRoot"/>
+      </p:par>
+    </p:tnLst>
+  </p:timing>
+</p:sld>
+</file>
+
 <file path=ppt/slides/slide2.xml><?xml version="1.0" encoding="utf-8"?>
 <p:sld xmlns:a="http://schemas.openxmlformats.org/drawingml/2006/main" xmlns:r="http://schemas.openxmlformats.org/officeDocument/2006/relationships" xmlns:p="http://schemas.openxmlformats.org/presentationml/2006/main">
   <p:cSld>
@@ -6758,7 +7313,7 @@
             </a:r>
             <a:r>
               <a:rPr lang="en-US" dirty="0" err="1" smtClean="0"/>
-              <a:t>subtlies</a:t>
+              <a:t>subtleies</a:t>
             </a:r>
             <a:endParaRPr lang="en-US" dirty="0" smtClean="0"/>
           </a:p>
@@ -6795,6 +7350,17 @@
             <a:r>
               <a:rPr lang="en-US" dirty="0" smtClean="0"/>
               <a:t>Issues with schema-less nature of JSON</a:t>
+            </a:r>
+          </a:p>
+          <a:p>
+            <a:pPr lvl="1"/>
+            <a:r>
+              <a:rPr lang="en-US" dirty="0" smtClean="0"/>
+              <a:t>FE needs the details, but BE needs to get it working to find </a:t>
+            </a:r>
+            <a:r>
+              <a:rPr lang="en-US" smtClean="0"/>
+              <a:t>those details</a:t>
             </a:r>
             <a:endParaRPr lang="en-US" dirty="0"/>
           </a:p>
@@ -7396,15 +7962,7 @@
             <a:pPr lvl="1"/>
             <a:r>
               <a:rPr lang="en-US" dirty="0" smtClean="0"/>
-              <a:t>Adding the </a:t>
-            </a:r>
-            <a:r>
-              <a:rPr lang="en-US" dirty="0" smtClean="0"/>
-              <a:t>service </a:t>
-            </a:r>
-            <a:r>
-              <a:rPr lang="en-US" dirty="0" smtClean="0"/>
-              <a:t>to Mountebank</a:t>
+              <a:t>Adding the service to Mountebank</a:t>
             </a:r>
           </a:p>
           <a:p>
@@ -7431,17 +7989,18 @@
           <a:p>
             <a:r>
               <a:rPr lang="en-US" dirty="0" smtClean="0"/>
-              <a:t>Full blown port of Swagger System</a:t>
-            </a:r>
-          </a:p>
-          <a:p>
-            <a:r>
-              <a:rPr lang="en-US" dirty="0" smtClean="0"/>
-              <a:t>Injection Demonstration (use of code for request/</a:t>
-            </a:r>
-            <a:r>
-              <a:rPr lang="en-US" dirty="0" smtClean="0"/>
-              <a:t>response)</a:t>
+              <a:t>Full blown port of Swagger </a:t>
+            </a:r>
+            <a:r>
+              <a:rPr lang="en-US" dirty="0" smtClean="0"/>
+              <a:t>System Restaurant Service</a:t>
+            </a:r>
+            <a:endParaRPr lang="en-US" dirty="0" smtClean="0"/>
+          </a:p>
+          <a:p>
+            <a:r>
+              <a:rPr lang="en-US" dirty="0" smtClean="0"/>
+              <a:t>Injection Demonstration (use of code for request/response)</a:t>
             </a:r>
           </a:p>
           <a:p>
@@ -7449,7 +8008,6 @@
               <a:rPr lang="en-US" dirty="0" smtClean="0"/>
               <a:t>Use in Unit Tests</a:t>
             </a:r>
-            <a:endParaRPr lang="en-US" dirty="0" smtClean="0"/>
           </a:p>
         </p:txBody>
       </p:sp>
@@ -7664,14 +8222,9 @@
             </a:r>
           </a:p>
           <a:p>
-            <a:pPr lvl="1"/>
-            <a:r>
-              <a:rPr lang="en-US" dirty="0" smtClean="0"/>
-              <a:t>Postman demonstration</a:t>
-            </a:r>
-          </a:p>
-          <a:p>
-            <a:pPr lvl="1"/>
+            <a:pPr marL="282575" lvl="1" indent="0">
+              <a:buNone/>
+            </a:pPr>
             <a:endParaRPr lang="en-US" dirty="0" smtClean="0"/>
           </a:p>
           <a:p>

</xml_diff>

<commit_message>
working on madjs presentation 6
</commit_message>
<xml_diff>
--- a/docs/madjs/MADJS-Mountebank.pptx
+++ b/docs/madjs/MADJS-Mountebank.pptx
@@ -202,7 +202,7 @@
           <a:p>
             <a:fld id="{A40F087D-155A-CC49-803F-ADA5E87CC64A}" type="datetimeFigureOut">
               <a:rPr lang="en-US" smtClean="0"/>
-              <a:t>1/4/16</a:t>
+              <a:t>1/5/16</a:t>
             </a:fld>
             <a:endParaRPr lang="en-US"/>
           </a:p>
@@ -1449,7 +1449,7 @@
           <a:p>
             <a:fld id="{D140825E-4A15-4D39-8176-1F07E904CB30}" type="datetimeFigureOut">
               <a:rPr lang="en-US" smtClean="0"/>
-              <a:t>1/4/16</a:t>
+              <a:t>1/5/16</a:t>
             </a:fld>
             <a:endParaRPr lang="en-US"/>
           </a:p>
@@ -1540,7 +1540,7 @@
           <a:p>
             <a:fld id="{D140825E-4A15-4D39-8176-1F07E904CB30}" type="datetimeFigureOut">
               <a:rPr lang="en-US" smtClean="0"/>
-              <a:t>1/4/16</a:t>
+              <a:t>1/5/16</a:t>
             </a:fld>
             <a:endParaRPr lang="en-US"/>
           </a:p>
@@ -1843,7 +1843,7 @@
           <a:p>
             <a:fld id="{D140825E-4A15-4D39-8176-1F07E904CB30}" type="datetimeFigureOut">
               <a:rPr lang="en-US" smtClean="0"/>
-              <a:t>1/4/16</a:t>
+              <a:t>1/5/16</a:t>
             </a:fld>
             <a:endParaRPr lang="en-US"/>
           </a:p>
@@ -2064,7 +2064,7 @@
           <a:p>
             <a:fld id="{D140825E-4A15-4D39-8176-1F07E904CB30}" type="datetimeFigureOut">
               <a:rPr lang="en-US" smtClean="0"/>
-              <a:t>1/4/16</a:t>
+              <a:t>1/5/16</a:t>
             </a:fld>
             <a:endParaRPr lang="en-US"/>
           </a:p>
@@ -2452,7 +2452,7 @@
           <a:p>
             <a:fld id="{D140825E-4A15-4D39-8176-1F07E904CB30}" type="datetimeFigureOut">
               <a:rPr lang="en-US" smtClean="0"/>
-              <a:t>1/4/16</a:t>
+              <a:t>1/5/16</a:t>
             </a:fld>
             <a:endParaRPr lang="en-US"/>
           </a:p>
@@ -2760,7 +2760,7 @@
           <a:p>
             <a:fld id="{D140825E-4A15-4D39-8176-1F07E904CB30}" type="datetimeFigureOut">
               <a:rPr lang="en-US" smtClean="0"/>
-              <a:t>1/4/16</a:t>
+              <a:t>1/5/16</a:t>
             </a:fld>
             <a:endParaRPr lang="en-US"/>
           </a:p>
@@ -2958,7 +2958,7 @@
           <a:p>
             <a:fld id="{D140825E-4A15-4D39-8176-1F07E904CB30}" type="datetimeFigureOut">
               <a:rPr lang="en-US" smtClean="0"/>
-              <a:t>1/4/16</a:t>
+              <a:t>1/5/16</a:t>
             </a:fld>
             <a:endParaRPr lang="en-US"/>
           </a:p>
@@ -3161,7 +3161,7 @@
           <a:p>
             <a:fld id="{D140825E-4A15-4D39-8176-1F07E904CB30}" type="datetimeFigureOut">
               <a:rPr lang="en-US" smtClean="0"/>
-              <a:t>1/4/16</a:t>
+              <a:t>1/5/16</a:t>
             </a:fld>
             <a:endParaRPr lang="en-US"/>
           </a:p>
@@ -3354,7 +3354,7 @@
           <a:p>
             <a:fld id="{D140825E-4A15-4D39-8176-1F07E904CB30}" type="datetimeFigureOut">
               <a:rPr lang="en-US" smtClean="0"/>
-              <a:t>1/4/16</a:t>
+              <a:t>1/5/16</a:t>
             </a:fld>
             <a:endParaRPr lang="en-US"/>
           </a:p>
@@ -3626,7 +3626,7 @@
           <a:p>
             <a:fld id="{D140825E-4A15-4D39-8176-1F07E904CB30}" type="datetimeFigureOut">
               <a:rPr lang="en-US" smtClean="0"/>
-              <a:t>1/4/16</a:t>
+              <a:t>1/5/16</a:t>
             </a:fld>
             <a:endParaRPr lang="en-US"/>
           </a:p>
@@ -3937,7 +3937,7 @@
           <a:p>
             <a:fld id="{D140825E-4A15-4D39-8176-1F07E904CB30}" type="datetimeFigureOut">
               <a:rPr lang="en-US" smtClean="0"/>
-              <a:t>1/4/16</a:t>
+              <a:t>1/5/16</a:t>
             </a:fld>
             <a:endParaRPr lang="en-US"/>
           </a:p>
@@ -4403,7 +4403,7 @@
           <a:p>
             <a:fld id="{D140825E-4A15-4D39-8176-1F07E904CB30}" type="datetimeFigureOut">
               <a:rPr lang="en-US" smtClean="0"/>
-              <a:t>1/4/16</a:t>
+              <a:t>1/5/16</a:t>
             </a:fld>
             <a:endParaRPr lang="en-US"/>
           </a:p>
@@ -4767,7 +4767,7 @@
           <a:p>
             <a:fld id="{D140825E-4A15-4D39-8176-1F07E904CB30}" type="datetimeFigureOut">
               <a:rPr lang="en-US" smtClean="0"/>
-              <a:t>1/4/16</a:t>
+              <a:t>1/5/16</a:t>
             </a:fld>
             <a:endParaRPr lang="en-US"/>
           </a:p>
@@ -5078,7 +5078,7 @@
           <a:p>
             <a:fld id="{D140825E-4A15-4D39-8176-1F07E904CB30}" type="datetimeFigureOut">
               <a:rPr lang="en-US" smtClean="0"/>
-              <a:t>1/4/16</a:t>
+              <a:t>1/5/16</a:t>
             </a:fld>
             <a:endParaRPr lang="en-US"/>
           </a:p>
@@ -5389,7 +5389,7 @@
           <a:p>
             <a:fld id="{D140825E-4A15-4D39-8176-1F07E904CB30}" type="datetimeFigureOut">
               <a:rPr lang="en-US" smtClean="0"/>
-              <a:t>1/4/16</a:t>
+              <a:t>1/5/16</a:t>
             </a:fld>
             <a:endParaRPr lang="en-US"/>
           </a:p>
@@ -5874,7 +5874,7 @@
           <a:p>
             <a:fld id="{D140825E-4A15-4D39-8176-1F07E904CB30}" type="datetimeFigureOut">
               <a:rPr lang="en-US" smtClean="0"/>
-              <a:t>1/4/16</a:t>
+              <a:t>1/5/16</a:t>
             </a:fld>
             <a:endParaRPr lang="en-US"/>
           </a:p>
@@ -6137,7 +6137,7 @@
           <a:p>
             <a:fld id="{D140825E-4A15-4D39-8176-1F07E904CB30}" type="datetimeFigureOut">
               <a:rPr lang="en-US" smtClean="0"/>
-              <a:t>1/4/16</a:t>
+              <a:t>1/5/16</a:t>
             </a:fld>
             <a:endParaRPr lang="en-US"/>
           </a:p>
@@ -6716,7 +6716,6 @@
               <a:rPr lang="en-US" dirty="0" smtClean="0"/>
               <a:t> </a:t>
             </a:r>
-            <a:endParaRPr lang="en-US" dirty="0" smtClean="0"/>
           </a:p>
           <a:p>
             <a:pPr lvl="1"/>
@@ -6827,7 +6826,7 @@
         </p:spPr>
         <p:txBody>
           <a:bodyPr>
-            <a:normAutofit fontScale="92500" lnSpcReduction="10000"/>
+            <a:normAutofit fontScale="85000" lnSpcReduction="10000"/>
           </a:bodyPr>
           <a:lstStyle/>
           <a:p>
@@ -6877,12 +6876,19 @@
               <a:t>http://donhenton-springmvc3.herokuapp.com/app/swagger/sdoc</a:t>
             </a:r>
             <a:r>
-              <a:rPr lang="en-US"/>
+              <a:rPr lang="en-US" dirty="0"/>
               <a:t> </a:t>
             </a:r>
             <a:r>
-              <a:rPr lang="en-US" smtClean="0"/>
+              <a:rPr lang="en-US" dirty="0" smtClean="0"/>
               <a:t> </a:t>
+            </a:r>
+            <a:endParaRPr lang="en-US" dirty="0" smtClean="0"/>
+          </a:p>
+          <a:p>
+            <a:r>
+              <a:rPr lang="en-US" smtClean="0"/>
+              <a:t>Walk through</a:t>
             </a:r>
             <a:endParaRPr lang="en-US" dirty="0" smtClean="0"/>
           </a:p>
@@ -7989,13 +7995,8 @@
           <a:p>
             <a:r>
               <a:rPr lang="en-US" dirty="0" smtClean="0"/>
-              <a:t>Full blown port of Swagger </a:t>
-            </a:r>
-            <a:r>
-              <a:rPr lang="en-US" dirty="0" smtClean="0"/>
-              <a:t>System Restaurant Service</a:t>
-            </a:r>
-            <a:endParaRPr lang="en-US" dirty="0" smtClean="0"/>
+              <a:t>Full blown port of Swagger System Restaurant Service</a:t>
+            </a:r>
           </a:p>
           <a:p>
             <a:r>
@@ -8214,11 +8215,7 @@
             <a:pPr lvl="2"/>
             <a:r>
               <a:rPr lang="en-US" dirty="0" smtClean="0"/>
-              <a:t>	Allows recording of requests that were </a:t>
-            </a:r>
-            <a:r>
-              <a:rPr lang="en-US" dirty="0" smtClean="0"/>
-              <a:t>made</a:t>
+              <a:t>	Allows recording of requests that were made</a:t>
             </a:r>
           </a:p>
           <a:p>

</xml_diff>

<commit_message>
updating ppt presentation 2
</commit_message>
<xml_diff>
--- a/docs/madjs/MADJS-Mountebank.pptx
+++ b/docs/madjs/MADJS-Mountebank.pptx
@@ -5,21 +5,26 @@
     <p:sldMasterId id="2147483660" r:id="rId1"/>
   </p:sldMasterIdLst>
   <p:notesMasterIdLst>
-    <p:notesMasterId r:id="rId14"/>
+    <p:notesMasterId r:id="rId19"/>
   </p:notesMasterIdLst>
   <p:sldIdLst>
     <p:sldId id="256" r:id="rId2"/>
-    <p:sldId id="258" r:id="rId3"/>
-    <p:sldId id="260" r:id="rId4"/>
-    <p:sldId id="263" r:id="rId5"/>
-    <p:sldId id="268" r:id="rId6"/>
-    <p:sldId id="257" r:id="rId7"/>
-    <p:sldId id="259" r:id="rId8"/>
-    <p:sldId id="261" r:id="rId9"/>
-    <p:sldId id="262" r:id="rId10"/>
-    <p:sldId id="264" r:id="rId11"/>
-    <p:sldId id="266" r:id="rId12"/>
-    <p:sldId id="267" r:id="rId13"/>
+    <p:sldId id="269" r:id="rId3"/>
+    <p:sldId id="258" r:id="rId4"/>
+    <p:sldId id="260" r:id="rId5"/>
+    <p:sldId id="263" r:id="rId6"/>
+    <p:sldId id="268" r:id="rId7"/>
+    <p:sldId id="257" r:id="rId8"/>
+    <p:sldId id="259" r:id="rId9"/>
+    <p:sldId id="261" r:id="rId10"/>
+    <p:sldId id="262" r:id="rId11"/>
+    <p:sldId id="264" r:id="rId12"/>
+    <p:sldId id="266" r:id="rId13"/>
+    <p:sldId id="267" r:id="rId14"/>
+    <p:sldId id="270" r:id="rId15"/>
+    <p:sldId id="271" r:id="rId16"/>
+    <p:sldId id="272" r:id="rId17"/>
+    <p:sldId id="273" r:id="rId18"/>
   </p:sldIdLst>
   <p:sldSz cx="9144000" cy="6858000" type="screen4x3"/>
   <p:notesSz cx="6858000" cy="9144000"/>
@@ -219,7 +224,7 @@
           <a:p>
             <a:fld id="{A40F087D-155A-CC49-803F-ADA5E87CC64A}" type="datetimeFigureOut">
               <a:rPr lang="en-US" smtClean="0"/>
-              <a:t>1/23/16</a:t>
+              <a:t>2/5/16</a:t>
             </a:fld>
             <a:endParaRPr lang="en-US"/>
           </a:p>
@@ -561,7 +566,337 @@
     </p:spTree>
     <p:extLst>
       <p:ext uri="{BB962C8B-B14F-4D97-AF65-F5344CB8AC3E}">
-        <p14:creationId xmlns:p14="http://schemas.microsoft.com/office/powerpoint/2010/main" val="1367609395"/>
+        <p14:creationId xmlns:p14="http://schemas.microsoft.com/office/powerpoint/2010/main" val="344427146"/>
+      </p:ext>
+    </p:extLst>
+  </p:cSld>
+  <p:clrMapOvr>
+    <a:masterClrMapping/>
+  </p:clrMapOvr>
+</p:notes>
+</file>
+
+<file path=ppt/notesSlides/notesSlide10.xml><?xml version="1.0" encoding="utf-8"?>
+<p:notes xmlns:a="http://schemas.openxmlformats.org/drawingml/2006/main" xmlns:r="http://schemas.openxmlformats.org/officeDocument/2006/relationships" xmlns:p="http://schemas.openxmlformats.org/presentationml/2006/main">
+  <p:cSld>
+    <p:spTree>
+      <p:nvGrpSpPr>
+        <p:cNvPr id="1" name=""/>
+        <p:cNvGrpSpPr/>
+        <p:nvPr/>
+      </p:nvGrpSpPr>
+      <p:grpSpPr>
+        <a:xfrm>
+          <a:off x="0" y="0"/>
+          <a:ext cx="0" cy="0"/>
+          <a:chOff x="0" y="0"/>
+          <a:chExt cx="0" cy="0"/>
+        </a:xfrm>
+      </p:grpSpPr>
+      <p:sp>
+        <p:nvSpPr>
+          <p:cNvPr id="2" name="Slide Image Placeholder 1"/>
+          <p:cNvSpPr>
+            <a:spLocks noGrp="1" noRot="1" noChangeAspect="1"/>
+          </p:cNvSpPr>
+          <p:nvPr>
+            <p:ph type="sldImg"/>
+          </p:nvPr>
+        </p:nvSpPr>
+        <p:spPr/>
+      </p:sp>
+      <p:sp>
+        <p:nvSpPr>
+          <p:cNvPr id="3" name="Notes Placeholder 2"/>
+          <p:cNvSpPr>
+            <a:spLocks noGrp="1"/>
+          </p:cNvSpPr>
+          <p:nvPr>
+            <p:ph type="body" idx="1"/>
+          </p:nvPr>
+        </p:nvSpPr>
+        <p:spPr/>
+        <p:txBody>
+          <a:bodyPr/>
+          <a:lstStyle/>
+          <a:p>
+            <a:r>
+              <a:rPr lang="en-US" dirty="0" smtClean="0"/>
+              <a:t>Launch</a:t>
+            </a:r>
+            <a:r>
+              <a:rPr lang="en-US" baseline="0" dirty="0" smtClean="0"/>
+              <a:t> postman</a:t>
+            </a:r>
+          </a:p>
+          <a:p>
+            <a:r>
+              <a:rPr lang="en-US" baseline="0" dirty="0" smtClean="0"/>
+              <a:t>Launch mountebank</a:t>
+            </a:r>
+          </a:p>
+          <a:p>
+            <a:r>
+              <a:rPr lang="en-US" baseline="0" dirty="0" smtClean="0"/>
+              <a:t>Use postman to load it</a:t>
+            </a:r>
+          </a:p>
+          <a:p>
+            <a:r>
+              <a:rPr lang="en-US" baseline="0" dirty="0" smtClean="0"/>
+              <a:t>Use postman to test it</a:t>
+            </a:r>
+            <a:endParaRPr lang="en-US" dirty="0"/>
+          </a:p>
+        </p:txBody>
+      </p:sp>
+      <p:sp>
+        <p:nvSpPr>
+          <p:cNvPr id="4" name="Slide Number Placeholder 3"/>
+          <p:cNvSpPr>
+            <a:spLocks noGrp="1"/>
+          </p:cNvSpPr>
+          <p:nvPr>
+            <p:ph type="sldNum" sz="quarter" idx="10"/>
+          </p:nvPr>
+        </p:nvSpPr>
+        <p:spPr/>
+        <p:txBody>
+          <a:bodyPr/>
+          <a:lstStyle/>
+          <a:p>
+            <a:fld id="{B98EA67F-C197-E74D-9FDA-9E55EF59A78D}" type="slidenum">
+              <a:rPr lang="en-US" smtClean="0"/>
+              <a:t>15</a:t>
+            </a:fld>
+            <a:endParaRPr lang="en-US"/>
+          </a:p>
+        </p:txBody>
+      </p:sp>
+    </p:spTree>
+    <p:extLst>
+      <p:ext uri="{BB962C8B-B14F-4D97-AF65-F5344CB8AC3E}">
+        <p14:creationId xmlns:p14="http://schemas.microsoft.com/office/powerpoint/2010/main" val="1734882422"/>
+      </p:ext>
+    </p:extLst>
+  </p:cSld>
+  <p:clrMapOvr>
+    <a:masterClrMapping/>
+  </p:clrMapOvr>
+</p:notes>
+</file>
+
+<file path=ppt/notesSlides/notesSlide11.xml><?xml version="1.0" encoding="utf-8"?>
+<p:notes xmlns:a="http://schemas.openxmlformats.org/drawingml/2006/main" xmlns:r="http://schemas.openxmlformats.org/officeDocument/2006/relationships" xmlns:p="http://schemas.openxmlformats.org/presentationml/2006/main">
+  <p:cSld>
+    <p:spTree>
+      <p:nvGrpSpPr>
+        <p:cNvPr id="1" name=""/>
+        <p:cNvGrpSpPr/>
+        <p:nvPr/>
+      </p:nvGrpSpPr>
+      <p:grpSpPr>
+        <a:xfrm>
+          <a:off x="0" y="0"/>
+          <a:ext cx="0" cy="0"/>
+          <a:chOff x="0" y="0"/>
+          <a:chExt cx="0" cy="0"/>
+        </a:xfrm>
+      </p:grpSpPr>
+      <p:sp>
+        <p:nvSpPr>
+          <p:cNvPr id="2" name="Slide Image Placeholder 1"/>
+          <p:cNvSpPr>
+            <a:spLocks noGrp="1" noRot="1" noChangeAspect="1"/>
+          </p:cNvSpPr>
+          <p:nvPr>
+            <p:ph type="sldImg"/>
+          </p:nvPr>
+        </p:nvSpPr>
+        <p:spPr/>
+      </p:sp>
+      <p:sp>
+        <p:nvSpPr>
+          <p:cNvPr id="3" name="Notes Placeholder 2"/>
+          <p:cNvSpPr>
+            <a:spLocks noGrp="1"/>
+          </p:cNvSpPr>
+          <p:nvPr>
+            <p:ph type="body" idx="1"/>
+          </p:nvPr>
+        </p:nvSpPr>
+        <p:spPr/>
+        <p:txBody>
+          <a:bodyPr/>
+          <a:lstStyle/>
+          <a:p>
+            <a:r>
+              <a:rPr lang="en-US" dirty="0" smtClean="0"/>
+              <a:t>Launch</a:t>
+            </a:r>
+            <a:r>
+              <a:rPr lang="en-US" baseline="0" dirty="0" smtClean="0"/>
+              <a:t> postman</a:t>
+            </a:r>
+          </a:p>
+          <a:p>
+            <a:r>
+              <a:rPr lang="en-US" baseline="0" dirty="0" smtClean="0"/>
+              <a:t>Launch mountebank</a:t>
+            </a:r>
+          </a:p>
+          <a:p>
+            <a:r>
+              <a:rPr lang="en-US" baseline="0" dirty="0" smtClean="0"/>
+              <a:t>Use postman to load it</a:t>
+            </a:r>
+          </a:p>
+          <a:p>
+            <a:r>
+              <a:rPr lang="en-US" baseline="0" dirty="0" smtClean="0"/>
+              <a:t>Use postman to test it</a:t>
+            </a:r>
+            <a:endParaRPr lang="en-US" dirty="0"/>
+          </a:p>
+        </p:txBody>
+      </p:sp>
+      <p:sp>
+        <p:nvSpPr>
+          <p:cNvPr id="4" name="Slide Number Placeholder 3"/>
+          <p:cNvSpPr>
+            <a:spLocks noGrp="1"/>
+          </p:cNvSpPr>
+          <p:nvPr>
+            <p:ph type="sldNum" sz="quarter" idx="10"/>
+          </p:nvPr>
+        </p:nvSpPr>
+        <p:spPr/>
+        <p:txBody>
+          <a:bodyPr/>
+          <a:lstStyle/>
+          <a:p>
+            <a:fld id="{B98EA67F-C197-E74D-9FDA-9E55EF59A78D}" type="slidenum">
+              <a:rPr lang="en-US" smtClean="0"/>
+              <a:t>16</a:t>
+            </a:fld>
+            <a:endParaRPr lang="en-US"/>
+          </a:p>
+        </p:txBody>
+      </p:sp>
+    </p:spTree>
+    <p:extLst>
+      <p:ext uri="{BB962C8B-B14F-4D97-AF65-F5344CB8AC3E}">
+        <p14:creationId xmlns:p14="http://schemas.microsoft.com/office/powerpoint/2010/main" val="1406981770"/>
+      </p:ext>
+    </p:extLst>
+  </p:cSld>
+  <p:clrMapOvr>
+    <a:masterClrMapping/>
+  </p:clrMapOvr>
+</p:notes>
+</file>
+
+<file path=ppt/notesSlides/notesSlide12.xml><?xml version="1.0" encoding="utf-8"?>
+<p:notes xmlns:a="http://schemas.openxmlformats.org/drawingml/2006/main" xmlns:r="http://schemas.openxmlformats.org/officeDocument/2006/relationships" xmlns:p="http://schemas.openxmlformats.org/presentationml/2006/main">
+  <p:cSld>
+    <p:spTree>
+      <p:nvGrpSpPr>
+        <p:cNvPr id="1" name=""/>
+        <p:cNvGrpSpPr/>
+        <p:nvPr/>
+      </p:nvGrpSpPr>
+      <p:grpSpPr>
+        <a:xfrm>
+          <a:off x="0" y="0"/>
+          <a:ext cx="0" cy="0"/>
+          <a:chOff x="0" y="0"/>
+          <a:chExt cx="0" cy="0"/>
+        </a:xfrm>
+      </p:grpSpPr>
+      <p:sp>
+        <p:nvSpPr>
+          <p:cNvPr id="2" name="Slide Image Placeholder 1"/>
+          <p:cNvSpPr>
+            <a:spLocks noGrp="1" noRot="1" noChangeAspect="1"/>
+          </p:cNvSpPr>
+          <p:nvPr>
+            <p:ph type="sldImg"/>
+          </p:nvPr>
+        </p:nvSpPr>
+        <p:spPr/>
+      </p:sp>
+      <p:sp>
+        <p:nvSpPr>
+          <p:cNvPr id="3" name="Notes Placeholder 2"/>
+          <p:cNvSpPr>
+            <a:spLocks noGrp="1"/>
+          </p:cNvSpPr>
+          <p:nvPr>
+            <p:ph type="body" idx="1"/>
+          </p:nvPr>
+        </p:nvSpPr>
+        <p:spPr/>
+        <p:txBody>
+          <a:bodyPr/>
+          <a:lstStyle/>
+          <a:p>
+            <a:r>
+              <a:rPr lang="en-US" dirty="0" smtClean="0"/>
+              <a:t>Launch</a:t>
+            </a:r>
+            <a:r>
+              <a:rPr lang="en-US" baseline="0" dirty="0" smtClean="0"/>
+              <a:t> postman</a:t>
+            </a:r>
+          </a:p>
+          <a:p>
+            <a:r>
+              <a:rPr lang="en-US" baseline="0" dirty="0" smtClean="0"/>
+              <a:t>Launch mountebank</a:t>
+            </a:r>
+          </a:p>
+          <a:p>
+            <a:r>
+              <a:rPr lang="en-US" baseline="0" dirty="0" smtClean="0"/>
+              <a:t>Use postman to load it</a:t>
+            </a:r>
+          </a:p>
+          <a:p>
+            <a:r>
+              <a:rPr lang="en-US" baseline="0" dirty="0" smtClean="0"/>
+              <a:t>Use postman to test it</a:t>
+            </a:r>
+            <a:endParaRPr lang="en-US" dirty="0"/>
+          </a:p>
+        </p:txBody>
+      </p:sp>
+      <p:sp>
+        <p:nvSpPr>
+          <p:cNvPr id="4" name="Slide Number Placeholder 3"/>
+          <p:cNvSpPr>
+            <a:spLocks noGrp="1"/>
+          </p:cNvSpPr>
+          <p:nvPr>
+            <p:ph type="sldNum" sz="quarter" idx="10"/>
+          </p:nvPr>
+        </p:nvSpPr>
+        <p:spPr/>
+        <p:txBody>
+          <a:bodyPr/>
+          <a:lstStyle/>
+          <a:p>
+            <a:fld id="{B98EA67F-C197-E74D-9FDA-9E55EF59A78D}" type="slidenum">
+              <a:rPr lang="en-US" smtClean="0"/>
+              <a:t>17</a:t>
+            </a:fld>
+            <a:endParaRPr lang="en-US"/>
+          </a:p>
+        </p:txBody>
+      </p:sp>
+    </p:spTree>
+    <p:extLst>
+      <p:ext uri="{BB962C8B-B14F-4D97-AF65-F5344CB8AC3E}">
+        <p14:creationId xmlns:p14="http://schemas.microsoft.com/office/powerpoint/2010/main" val="1666930953"/>
       </p:ext>
     </p:extLst>
   </p:cSld>
@@ -615,32 +950,6 @@
           <a:bodyPr/>
           <a:lstStyle/>
           <a:p>
-            <a:r>
-              <a:rPr lang="en-US" dirty="0" smtClean="0"/>
-              <a:t>Launch</a:t>
-            </a:r>
-            <a:r>
-              <a:rPr lang="en-US" baseline="0" dirty="0" smtClean="0"/>
-              <a:t> postman</a:t>
-            </a:r>
-          </a:p>
-          <a:p>
-            <a:r>
-              <a:rPr lang="en-US" baseline="0" dirty="0" smtClean="0"/>
-              <a:t>Launch mountebank</a:t>
-            </a:r>
-          </a:p>
-          <a:p>
-            <a:r>
-              <a:rPr lang="en-US" baseline="0" dirty="0" smtClean="0"/>
-              <a:t>Use postman to load it</a:t>
-            </a:r>
-          </a:p>
-          <a:p>
-            <a:r>
-              <a:rPr lang="en-US" baseline="0" dirty="0" smtClean="0"/>
-              <a:t>Use postman to test it</a:t>
-            </a:r>
             <a:endParaRPr lang="en-US" dirty="0"/>
           </a:p>
         </p:txBody>
@@ -662,7 +971,7 @@
           <a:p>
             <a:fld id="{B98EA67F-C197-E74D-9FDA-9E55EF59A78D}" type="slidenum">
               <a:rPr lang="en-US" smtClean="0"/>
-              <a:t>7</a:t>
+              <a:t>3</a:t>
             </a:fld>
             <a:endParaRPr lang="en-US"/>
           </a:p>
@@ -671,7 +980,7 @@
     </p:spTree>
     <p:extLst>
       <p:ext uri="{BB962C8B-B14F-4D97-AF65-F5344CB8AC3E}">
-        <p14:creationId xmlns:p14="http://schemas.microsoft.com/office/powerpoint/2010/main" val="2842145168"/>
+        <p14:creationId xmlns:p14="http://schemas.microsoft.com/office/powerpoint/2010/main" val="1367609395"/>
       </p:ext>
     </p:extLst>
   </p:cSld>
@@ -1222,6 +1531,226 @@
     <p:extLst>
       <p:ext uri="{BB962C8B-B14F-4D97-AF65-F5344CB8AC3E}">
         <p14:creationId xmlns:p14="http://schemas.microsoft.com/office/powerpoint/2010/main" val="2842145168"/>
+      </p:ext>
+    </p:extLst>
+  </p:cSld>
+  <p:clrMapOvr>
+    <a:masterClrMapping/>
+  </p:clrMapOvr>
+</p:notes>
+</file>
+
+<file path=ppt/notesSlides/notesSlide8.xml><?xml version="1.0" encoding="utf-8"?>
+<p:notes xmlns:a="http://schemas.openxmlformats.org/drawingml/2006/main" xmlns:r="http://schemas.openxmlformats.org/officeDocument/2006/relationships" xmlns:p="http://schemas.openxmlformats.org/presentationml/2006/main">
+  <p:cSld>
+    <p:spTree>
+      <p:nvGrpSpPr>
+        <p:cNvPr id="1" name=""/>
+        <p:cNvGrpSpPr/>
+        <p:nvPr/>
+      </p:nvGrpSpPr>
+      <p:grpSpPr>
+        <a:xfrm>
+          <a:off x="0" y="0"/>
+          <a:ext cx="0" cy="0"/>
+          <a:chOff x="0" y="0"/>
+          <a:chExt cx="0" cy="0"/>
+        </a:xfrm>
+      </p:grpSpPr>
+      <p:sp>
+        <p:nvSpPr>
+          <p:cNvPr id="2" name="Slide Image Placeholder 1"/>
+          <p:cNvSpPr>
+            <a:spLocks noGrp="1" noRot="1" noChangeAspect="1"/>
+          </p:cNvSpPr>
+          <p:nvPr>
+            <p:ph type="sldImg"/>
+          </p:nvPr>
+        </p:nvSpPr>
+        <p:spPr/>
+      </p:sp>
+      <p:sp>
+        <p:nvSpPr>
+          <p:cNvPr id="3" name="Notes Placeholder 2"/>
+          <p:cNvSpPr>
+            <a:spLocks noGrp="1"/>
+          </p:cNvSpPr>
+          <p:nvPr>
+            <p:ph type="body" idx="1"/>
+          </p:nvPr>
+        </p:nvSpPr>
+        <p:spPr/>
+        <p:txBody>
+          <a:bodyPr/>
+          <a:lstStyle/>
+          <a:p>
+            <a:r>
+              <a:rPr lang="en-US" dirty="0" smtClean="0"/>
+              <a:t>Launch</a:t>
+            </a:r>
+            <a:r>
+              <a:rPr lang="en-US" baseline="0" dirty="0" smtClean="0"/>
+              <a:t> postman</a:t>
+            </a:r>
+          </a:p>
+          <a:p>
+            <a:r>
+              <a:rPr lang="en-US" baseline="0" dirty="0" smtClean="0"/>
+              <a:t>Launch mountebank</a:t>
+            </a:r>
+          </a:p>
+          <a:p>
+            <a:r>
+              <a:rPr lang="en-US" baseline="0" dirty="0" smtClean="0"/>
+              <a:t>Use postman to load it</a:t>
+            </a:r>
+          </a:p>
+          <a:p>
+            <a:r>
+              <a:rPr lang="en-US" baseline="0" dirty="0" smtClean="0"/>
+              <a:t>Use postman to test it</a:t>
+            </a:r>
+            <a:endParaRPr lang="en-US" dirty="0"/>
+          </a:p>
+        </p:txBody>
+      </p:sp>
+      <p:sp>
+        <p:nvSpPr>
+          <p:cNvPr id="4" name="Slide Number Placeholder 3"/>
+          <p:cNvSpPr>
+            <a:spLocks noGrp="1"/>
+          </p:cNvSpPr>
+          <p:nvPr>
+            <p:ph type="sldNum" sz="quarter" idx="10"/>
+          </p:nvPr>
+        </p:nvSpPr>
+        <p:spPr/>
+        <p:txBody>
+          <a:bodyPr/>
+          <a:lstStyle/>
+          <a:p>
+            <a:fld id="{B98EA67F-C197-E74D-9FDA-9E55EF59A78D}" type="slidenum">
+              <a:rPr lang="en-US" smtClean="0"/>
+              <a:t>13</a:t>
+            </a:fld>
+            <a:endParaRPr lang="en-US"/>
+          </a:p>
+        </p:txBody>
+      </p:sp>
+    </p:spTree>
+    <p:extLst>
+      <p:ext uri="{BB962C8B-B14F-4D97-AF65-F5344CB8AC3E}">
+        <p14:creationId xmlns:p14="http://schemas.microsoft.com/office/powerpoint/2010/main" val="2842145168"/>
+      </p:ext>
+    </p:extLst>
+  </p:cSld>
+  <p:clrMapOvr>
+    <a:masterClrMapping/>
+  </p:clrMapOvr>
+</p:notes>
+</file>
+
+<file path=ppt/notesSlides/notesSlide9.xml><?xml version="1.0" encoding="utf-8"?>
+<p:notes xmlns:a="http://schemas.openxmlformats.org/drawingml/2006/main" xmlns:r="http://schemas.openxmlformats.org/officeDocument/2006/relationships" xmlns:p="http://schemas.openxmlformats.org/presentationml/2006/main">
+  <p:cSld>
+    <p:spTree>
+      <p:nvGrpSpPr>
+        <p:cNvPr id="1" name=""/>
+        <p:cNvGrpSpPr/>
+        <p:nvPr/>
+      </p:nvGrpSpPr>
+      <p:grpSpPr>
+        <a:xfrm>
+          <a:off x="0" y="0"/>
+          <a:ext cx="0" cy="0"/>
+          <a:chOff x="0" y="0"/>
+          <a:chExt cx="0" cy="0"/>
+        </a:xfrm>
+      </p:grpSpPr>
+      <p:sp>
+        <p:nvSpPr>
+          <p:cNvPr id="2" name="Slide Image Placeholder 1"/>
+          <p:cNvSpPr>
+            <a:spLocks noGrp="1" noRot="1" noChangeAspect="1"/>
+          </p:cNvSpPr>
+          <p:nvPr>
+            <p:ph type="sldImg"/>
+          </p:nvPr>
+        </p:nvSpPr>
+        <p:spPr/>
+      </p:sp>
+      <p:sp>
+        <p:nvSpPr>
+          <p:cNvPr id="3" name="Notes Placeholder 2"/>
+          <p:cNvSpPr>
+            <a:spLocks noGrp="1"/>
+          </p:cNvSpPr>
+          <p:nvPr>
+            <p:ph type="body" idx="1"/>
+          </p:nvPr>
+        </p:nvSpPr>
+        <p:spPr/>
+        <p:txBody>
+          <a:bodyPr/>
+          <a:lstStyle/>
+          <a:p>
+            <a:r>
+              <a:rPr lang="en-US" dirty="0" smtClean="0"/>
+              <a:t>Launch</a:t>
+            </a:r>
+            <a:r>
+              <a:rPr lang="en-US" baseline="0" dirty="0" smtClean="0"/>
+              <a:t> postman</a:t>
+            </a:r>
+          </a:p>
+          <a:p>
+            <a:r>
+              <a:rPr lang="en-US" baseline="0" dirty="0" smtClean="0"/>
+              <a:t>Launch mountebank</a:t>
+            </a:r>
+          </a:p>
+          <a:p>
+            <a:r>
+              <a:rPr lang="en-US" baseline="0" dirty="0" smtClean="0"/>
+              <a:t>Use postman to load it</a:t>
+            </a:r>
+          </a:p>
+          <a:p>
+            <a:r>
+              <a:rPr lang="en-US" baseline="0" dirty="0" smtClean="0"/>
+              <a:t>Use postman to test it</a:t>
+            </a:r>
+            <a:endParaRPr lang="en-US" dirty="0"/>
+          </a:p>
+        </p:txBody>
+      </p:sp>
+      <p:sp>
+        <p:nvSpPr>
+          <p:cNvPr id="4" name="Slide Number Placeholder 3"/>
+          <p:cNvSpPr>
+            <a:spLocks noGrp="1"/>
+          </p:cNvSpPr>
+          <p:nvPr>
+            <p:ph type="sldNum" sz="quarter" idx="10"/>
+          </p:nvPr>
+        </p:nvSpPr>
+        <p:spPr/>
+        <p:txBody>
+          <a:bodyPr/>
+          <a:lstStyle/>
+          <a:p>
+            <a:fld id="{B98EA67F-C197-E74D-9FDA-9E55EF59A78D}" type="slidenum">
+              <a:rPr lang="en-US" smtClean="0"/>
+              <a:t>14</a:t>
+            </a:fld>
+            <a:endParaRPr lang="en-US"/>
+          </a:p>
+        </p:txBody>
+      </p:sp>
+    </p:spTree>
+    <p:extLst>
+      <p:ext uri="{BB962C8B-B14F-4D97-AF65-F5344CB8AC3E}">
+        <p14:creationId xmlns:p14="http://schemas.microsoft.com/office/powerpoint/2010/main" val="993046589"/>
       </p:ext>
     </p:extLst>
   </p:cSld>
@@ -1466,7 +1995,7 @@
           <a:p>
             <a:fld id="{D140825E-4A15-4D39-8176-1F07E904CB30}" type="datetimeFigureOut">
               <a:rPr lang="en-US" smtClean="0"/>
-              <a:t>1/23/16</a:t>
+              <a:t>2/5/16</a:t>
             </a:fld>
             <a:endParaRPr lang="en-US"/>
           </a:p>
@@ -1557,7 +2086,7 @@
           <a:p>
             <a:fld id="{D140825E-4A15-4D39-8176-1F07E904CB30}" type="datetimeFigureOut">
               <a:rPr lang="en-US" smtClean="0"/>
-              <a:t>1/23/16</a:t>
+              <a:t>2/5/16</a:t>
             </a:fld>
             <a:endParaRPr lang="en-US"/>
           </a:p>
@@ -1860,7 +2389,7 @@
           <a:p>
             <a:fld id="{D140825E-4A15-4D39-8176-1F07E904CB30}" type="datetimeFigureOut">
               <a:rPr lang="en-US" smtClean="0"/>
-              <a:t>1/23/16</a:t>
+              <a:t>2/5/16</a:t>
             </a:fld>
             <a:endParaRPr lang="en-US"/>
           </a:p>
@@ -2081,7 +2610,7 @@
           <a:p>
             <a:fld id="{D140825E-4A15-4D39-8176-1F07E904CB30}" type="datetimeFigureOut">
               <a:rPr lang="en-US" smtClean="0"/>
-              <a:t>1/23/16</a:t>
+              <a:t>2/5/16</a:t>
             </a:fld>
             <a:endParaRPr lang="en-US"/>
           </a:p>
@@ -2469,7 +2998,7 @@
           <a:p>
             <a:fld id="{D140825E-4A15-4D39-8176-1F07E904CB30}" type="datetimeFigureOut">
               <a:rPr lang="en-US" smtClean="0"/>
-              <a:t>1/23/16</a:t>
+              <a:t>2/5/16</a:t>
             </a:fld>
             <a:endParaRPr lang="en-US"/>
           </a:p>
@@ -2777,7 +3306,7 @@
           <a:p>
             <a:fld id="{D140825E-4A15-4D39-8176-1F07E904CB30}" type="datetimeFigureOut">
               <a:rPr lang="en-US" smtClean="0"/>
-              <a:t>1/23/16</a:t>
+              <a:t>2/5/16</a:t>
             </a:fld>
             <a:endParaRPr lang="en-US"/>
           </a:p>
@@ -2975,7 +3504,7 @@
           <a:p>
             <a:fld id="{D140825E-4A15-4D39-8176-1F07E904CB30}" type="datetimeFigureOut">
               <a:rPr lang="en-US" smtClean="0"/>
-              <a:t>1/23/16</a:t>
+              <a:t>2/5/16</a:t>
             </a:fld>
             <a:endParaRPr lang="en-US"/>
           </a:p>
@@ -3178,7 +3707,7 @@
           <a:p>
             <a:fld id="{D140825E-4A15-4D39-8176-1F07E904CB30}" type="datetimeFigureOut">
               <a:rPr lang="en-US" smtClean="0"/>
-              <a:t>1/23/16</a:t>
+              <a:t>2/5/16</a:t>
             </a:fld>
             <a:endParaRPr lang="en-US"/>
           </a:p>
@@ -3371,7 +3900,7 @@
           <a:p>
             <a:fld id="{D140825E-4A15-4D39-8176-1F07E904CB30}" type="datetimeFigureOut">
               <a:rPr lang="en-US" smtClean="0"/>
-              <a:t>1/23/16</a:t>
+              <a:t>2/5/16</a:t>
             </a:fld>
             <a:endParaRPr lang="en-US"/>
           </a:p>
@@ -3643,7 +4172,7 @@
           <a:p>
             <a:fld id="{D140825E-4A15-4D39-8176-1F07E904CB30}" type="datetimeFigureOut">
               <a:rPr lang="en-US" smtClean="0"/>
-              <a:t>1/23/16</a:t>
+              <a:t>2/5/16</a:t>
             </a:fld>
             <a:endParaRPr lang="en-US"/>
           </a:p>
@@ -3954,7 +4483,7 @@
           <a:p>
             <a:fld id="{D140825E-4A15-4D39-8176-1F07E904CB30}" type="datetimeFigureOut">
               <a:rPr lang="en-US" smtClean="0"/>
-              <a:t>1/23/16</a:t>
+              <a:t>2/5/16</a:t>
             </a:fld>
             <a:endParaRPr lang="en-US"/>
           </a:p>
@@ -4420,7 +4949,7 @@
           <a:p>
             <a:fld id="{D140825E-4A15-4D39-8176-1F07E904CB30}" type="datetimeFigureOut">
               <a:rPr lang="en-US" smtClean="0"/>
-              <a:t>1/23/16</a:t>
+              <a:t>2/5/16</a:t>
             </a:fld>
             <a:endParaRPr lang="en-US"/>
           </a:p>
@@ -4784,7 +5313,7 @@
           <a:p>
             <a:fld id="{D140825E-4A15-4D39-8176-1F07E904CB30}" type="datetimeFigureOut">
               <a:rPr lang="en-US" smtClean="0"/>
-              <a:t>1/23/16</a:t>
+              <a:t>2/5/16</a:t>
             </a:fld>
             <a:endParaRPr lang="en-US"/>
           </a:p>
@@ -5095,7 +5624,7 @@
           <a:p>
             <a:fld id="{D140825E-4A15-4D39-8176-1F07E904CB30}" type="datetimeFigureOut">
               <a:rPr lang="en-US" smtClean="0"/>
-              <a:t>1/23/16</a:t>
+              <a:t>2/5/16</a:t>
             </a:fld>
             <a:endParaRPr lang="en-US"/>
           </a:p>
@@ -5406,7 +5935,7 @@
           <a:p>
             <a:fld id="{D140825E-4A15-4D39-8176-1F07E904CB30}" type="datetimeFigureOut">
               <a:rPr lang="en-US" smtClean="0"/>
-              <a:t>1/23/16</a:t>
+              <a:t>2/5/16</a:t>
             </a:fld>
             <a:endParaRPr lang="en-US"/>
           </a:p>
@@ -5891,7 +6420,7 @@
           <a:p>
             <a:fld id="{D140825E-4A15-4D39-8176-1F07E904CB30}" type="datetimeFigureOut">
               <a:rPr lang="en-US" smtClean="0"/>
-              <a:t>1/23/16</a:t>
+              <a:t>2/5/16</a:t>
             </a:fld>
             <a:endParaRPr lang="en-US"/>
           </a:p>
@@ -6154,7 +6683,7 @@
           <a:p>
             <a:fld id="{D140825E-4A15-4D39-8176-1F07E904CB30}" type="datetimeFigureOut">
               <a:rPr lang="en-US" smtClean="0"/>
-              <a:t>1/23/16</a:t>
+              <a:t>2/5/16</a:t>
             </a:fld>
             <a:endParaRPr lang="en-US"/>
           </a:p>
@@ -6584,11 +7113,40 @@
             </a:r>
             <a:r>
               <a:rPr lang="en-US" dirty="0" err="1" smtClean="0"/>
-              <a:t>Feburary</a:t>
-            </a:r>
-            <a:r>
-              <a:rPr lang="en-US" dirty="0" smtClean="0"/>
-              <a:t> 8, 2016</a:t>
+              <a:t>Februrary</a:t>
+            </a:r>
+            <a:r>
+              <a:rPr lang="en-US" dirty="0" smtClean="0"/>
+              <a:t> </a:t>
+            </a:r>
+            <a:r>
+              <a:rPr lang="en-US" dirty="0" smtClean="0"/>
+              <a:t>8, </a:t>
+            </a:r>
+            <a:r>
+              <a:rPr lang="en-US" dirty="0" smtClean="0"/>
+              <a:t>2016</a:t>
+            </a:r>
+          </a:p>
+          <a:p>
+            <a:r>
+              <a:rPr lang="en-US" dirty="0" err="1" smtClean="0"/>
+              <a:t>Donaby</a:t>
+            </a:r>
+            <a:r>
+              <a:rPr lang="en-US" dirty="0" smtClean="0"/>
+              <a:t> </a:t>
+            </a:r>
+            <a:r>
+              <a:rPr lang="en-US" dirty="0" err="1" smtClean="0"/>
+              <a:t>Henton</a:t>
+            </a:r>
+            <a:endParaRPr lang="en-US" dirty="0" smtClean="0"/>
+          </a:p>
+          <a:p>
+            <a:r>
+              <a:rPr lang="en-US" dirty="0" smtClean="0"/>
+              <a:t>Networked Insights</a:t>
             </a:r>
             <a:endParaRPr lang="en-US" dirty="0"/>
           </a:p>
@@ -6648,7 +7206,7 @@
           <a:p>
             <a:r>
               <a:rPr lang="en-US" dirty="0" smtClean="0"/>
-              <a:t>Simple Service</a:t>
+              <a:t>Agenda For Examples</a:t>
             </a:r>
             <a:endParaRPr lang="en-US" dirty="0"/>
           </a:p>
@@ -6677,148 +7235,54 @@
           <a:lstStyle/>
           <a:p>
             <a:r>
-              <a:rPr lang="en-US" dirty="0"/>
-              <a:t>Start Mountebank</a:t>
+              <a:rPr lang="en-US" dirty="0" smtClean="0"/>
+              <a:t>Simple Service Using Postman</a:t>
             </a:r>
           </a:p>
           <a:p>
             <a:pPr lvl="1"/>
             <a:r>
-              <a:rPr lang="en-US" b="1" dirty="0" err="1">
-                <a:solidFill>
-                  <a:schemeClr val="accent2">
-                    <a:lumMod val="60000"/>
-                    <a:lumOff val="40000"/>
-                  </a:schemeClr>
-                </a:solidFill>
-              </a:rPr>
-              <a:t>mb</a:t>
-            </a:r>
-            <a:r>
-              <a:rPr lang="en-US" b="1" dirty="0">
-                <a:solidFill>
-                  <a:schemeClr val="accent2">
-                    <a:lumMod val="60000"/>
-                    <a:lumOff val="40000"/>
-                  </a:schemeClr>
-                </a:solidFill>
-              </a:rPr>
-              <a:t>  --</a:t>
-            </a:r>
-            <a:r>
-              <a:rPr lang="en-US" b="1" dirty="0" err="1">
-                <a:solidFill>
-                  <a:schemeClr val="accent2">
-                    <a:lumMod val="60000"/>
-                    <a:lumOff val="40000"/>
-                  </a:schemeClr>
-                </a:solidFill>
-              </a:rPr>
-              <a:t>allowCORS</a:t>
-            </a:r>
-            <a:r>
-              <a:rPr lang="en-US" b="1" dirty="0">
-                <a:solidFill>
-                  <a:schemeClr val="accent2">
-                    <a:lumMod val="60000"/>
-                    <a:lumOff val="40000"/>
-                  </a:schemeClr>
-                </a:solidFill>
-              </a:rPr>
-              <a:t> –</a:t>
-            </a:r>
-            <a:r>
-              <a:rPr lang="en-US" b="1" dirty="0" err="1">
-                <a:solidFill>
-                  <a:schemeClr val="accent2">
-                    <a:lumMod val="60000"/>
-                    <a:lumOff val="40000"/>
-                  </a:schemeClr>
-                </a:solidFill>
-              </a:rPr>
-              <a:t>allowInjection</a:t>
-            </a:r>
-            <a:r>
-              <a:rPr lang="en-US" b="1" dirty="0">
-                <a:solidFill>
-                  <a:schemeClr val="accent2">
-                    <a:lumMod val="60000"/>
-                    <a:lumOff val="40000"/>
-                  </a:schemeClr>
-                </a:solidFill>
-              </a:rPr>
-              <a:t> </a:t>
-            </a:r>
-            <a:r>
-              <a:rPr lang="en-US" b="1" dirty="0" smtClean="0">
-                <a:solidFill>
-                  <a:schemeClr val="accent2">
-                    <a:lumMod val="60000"/>
-                    <a:lumOff val="40000"/>
-                  </a:schemeClr>
-                </a:solidFill>
-              </a:rPr>
-              <a:t>-–</a:t>
-            </a:r>
-            <a:r>
-              <a:rPr lang="en-US" b="1" dirty="0">
-                <a:solidFill>
-                  <a:schemeClr val="accent2">
-                    <a:lumMod val="60000"/>
-                    <a:lumOff val="40000"/>
-                  </a:schemeClr>
-                </a:solidFill>
-              </a:rPr>
-              <a:t>mock</a:t>
+              <a:rPr lang="en-US" dirty="0" smtClean="0"/>
+              <a:t>Adding the service to Mountebank</a:t>
             </a:r>
           </a:p>
           <a:p>
             <a:pPr lvl="1"/>
             <a:r>
               <a:rPr lang="en-US" dirty="0" smtClean="0"/>
-              <a:t>Start parameters</a:t>
-            </a:r>
-          </a:p>
-          <a:p>
-            <a:pPr lvl="2"/>
-            <a:r>
-              <a:rPr lang="en-US" dirty="0" smtClean="0"/>
-              <a:t>CORS requests</a:t>
-            </a:r>
-          </a:p>
-          <a:p>
-            <a:pPr lvl="2"/>
-            <a:r>
-              <a:rPr lang="en-US" dirty="0" smtClean="0"/>
-              <a:t>Can use JavaScript functions for request/response</a:t>
-            </a:r>
-          </a:p>
-          <a:p>
-            <a:pPr lvl="2"/>
-            <a:r>
-              <a:rPr lang="en-US" dirty="0" smtClean="0"/>
-              <a:t>	Allows recording of requests that were made</a:t>
-            </a:r>
-          </a:p>
-          <a:p>
-            <a:pPr marL="282575" lvl="1" indent="0">
-              <a:buNone/>
-            </a:pPr>
-            <a:endParaRPr lang="en-US" dirty="0" smtClean="0"/>
-          </a:p>
-          <a:p>
-            <a:endParaRPr lang="en-US" dirty="0"/>
-          </a:p>
-          <a:p>
-            <a:endParaRPr lang="en-US" dirty="0"/>
-          </a:p>
-          <a:p>
-            <a:pPr marL="282575" lvl="1" indent="0">
-              <a:buNone/>
-            </a:pPr>
-            <a:r>
-              <a:rPr lang="en-US" dirty="0" smtClean="0"/>
-              <a:t>	</a:t>
+              <a:t>Testing that service</a:t>
+            </a:r>
+          </a:p>
+          <a:p>
+            <a:pPr lvl="1"/>
+            <a:r>
+              <a:rPr lang="en-US" dirty="0" smtClean="0"/>
+              <a:t>Listing Mountebank services</a:t>
+            </a:r>
+          </a:p>
+          <a:p>
+            <a:pPr lvl="1"/>
+            <a:r>
+              <a:rPr lang="en-US" dirty="0" smtClean="0"/>
+              <a:t>Listing the responses that are captured</a:t>
+            </a:r>
+          </a:p>
+          <a:p>
+            <a:r>
+              <a:rPr lang="en-US" dirty="0" smtClean="0"/>
+              <a:t>Full blown port of Swagger System Restaurant Service</a:t>
+            </a:r>
+          </a:p>
+          <a:p>
+            <a:r>
+              <a:rPr lang="en-US" dirty="0" smtClean="0"/>
+              <a:t>Injection Demonstration (use of code for request/response)</a:t>
+            </a:r>
+          </a:p>
+          <a:p>
+            <a:r>
+              <a:rPr lang="en-US" dirty="0" smtClean="0"/>
+              <a:t>Use in Unit Tests</a:t>
             </a:r>
           </a:p>
         </p:txBody>
@@ -6901,80 +7365,138 @@
         </p:spPr>
         <p:txBody>
           <a:bodyPr>
-            <a:normAutofit fontScale="92500" lnSpcReduction="10000"/>
+            <a:normAutofit/>
           </a:bodyPr>
           <a:lstStyle/>
           <a:p>
             <a:r>
-              <a:rPr lang="en-US" dirty="0" smtClean="0"/>
-              <a:t>Postman demonstration</a:t>
+              <a:rPr lang="en-US" dirty="0"/>
+              <a:t>Start Mountebank</a:t>
             </a:r>
           </a:p>
           <a:p>
             <a:pPr lvl="1"/>
             <a:r>
-              <a:rPr lang="en-US" dirty="0"/>
-              <a:t>source </a:t>
-            </a:r>
-            <a:r>
-              <a:rPr lang="en-US" dirty="0">
-                <a:hlinkClick r:id="rId3"/>
+              <a:rPr lang="en-US" b="1" dirty="0" err="1">
+                <a:solidFill>
+                  <a:schemeClr val="accent2">
+                    <a:lumMod val="60000"/>
+                    <a:lumOff val="40000"/>
+                  </a:schemeClr>
+                </a:solidFill>
               </a:rPr>
-              <a:t>https://github.com/donhenton/mountebank-</a:t>
-            </a:r>
-            <a:r>
-              <a:rPr lang="en-US" dirty="0" smtClean="0">
-                <a:hlinkClick r:id="rId3"/>
+              <a:t>mb</a:t>
+            </a:r>
+            <a:r>
+              <a:rPr lang="en-US" b="1" dirty="0">
+                <a:solidFill>
+                  <a:schemeClr val="accent2">
+                    <a:lumMod val="60000"/>
+                    <a:lumOff val="40000"/>
+                  </a:schemeClr>
+                </a:solidFill>
               </a:rPr>
-              <a:t>UI</a:t>
-            </a:r>
-            <a:endParaRPr lang="en-US" dirty="0" smtClean="0"/>
+              <a:t>  --</a:t>
+            </a:r>
+            <a:r>
+              <a:rPr lang="en-US" b="1" dirty="0" err="1">
+                <a:solidFill>
+                  <a:schemeClr val="accent2">
+                    <a:lumMod val="60000"/>
+                    <a:lumOff val="40000"/>
+                  </a:schemeClr>
+                </a:solidFill>
+              </a:rPr>
+              <a:t>allowCORS</a:t>
+            </a:r>
+            <a:r>
+              <a:rPr lang="en-US" b="1" dirty="0">
+                <a:solidFill>
+                  <a:schemeClr val="accent2">
+                    <a:lumMod val="60000"/>
+                    <a:lumOff val="40000"/>
+                  </a:schemeClr>
+                </a:solidFill>
+              </a:rPr>
+              <a:t> –</a:t>
+            </a:r>
+            <a:r>
+              <a:rPr lang="en-US" b="1" dirty="0" err="1">
+                <a:solidFill>
+                  <a:schemeClr val="accent2">
+                    <a:lumMod val="60000"/>
+                    <a:lumOff val="40000"/>
+                  </a:schemeClr>
+                </a:solidFill>
+              </a:rPr>
+              <a:t>allowInjection</a:t>
+            </a:r>
+            <a:r>
+              <a:rPr lang="en-US" b="1" dirty="0">
+                <a:solidFill>
+                  <a:schemeClr val="accent2">
+                    <a:lumMod val="60000"/>
+                    <a:lumOff val="40000"/>
+                  </a:schemeClr>
+                </a:solidFill>
+              </a:rPr>
+              <a:t> </a:t>
+            </a:r>
+            <a:r>
+              <a:rPr lang="en-US" b="1" dirty="0" smtClean="0">
+                <a:solidFill>
+                  <a:schemeClr val="accent2">
+                    <a:lumMod val="60000"/>
+                    <a:lumOff val="40000"/>
+                  </a:schemeClr>
+                </a:solidFill>
+              </a:rPr>
+              <a:t>-–</a:t>
+            </a:r>
+            <a:r>
+              <a:rPr lang="en-US" b="1" dirty="0">
+                <a:solidFill>
+                  <a:schemeClr val="accent2">
+                    <a:lumMod val="60000"/>
+                    <a:lumOff val="40000"/>
+                  </a:schemeClr>
+                </a:solidFill>
+              </a:rPr>
+              <a:t>mock</a:t>
+            </a:r>
           </a:p>
           <a:p>
             <a:pPr lvl="1"/>
             <a:r>
               <a:rPr lang="en-US" dirty="0" smtClean="0"/>
-              <a:t>docs/ mountebank-</a:t>
-            </a:r>
-            <a:r>
-              <a:rPr lang="en-US" dirty="0" err="1" smtClean="0"/>
-              <a:t>madjs.postman_collection</a:t>
-            </a:r>
-            <a:endParaRPr lang="en-US" dirty="0"/>
-          </a:p>
-          <a:p>
-            <a:r>
-              <a:rPr lang="en-US" dirty="0" smtClean="0"/>
-              <a:t>Mountebank UI file</a:t>
-            </a:r>
-          </a:p>
-          <a:p>
-            <a:pPr lvl="1"/>
-            <a:r>
-              <a:rPr lang="en-US" dirty="0" smtClean="0"/>
-              <a:t>docs/mountebank-UI-</a:t>
-            </a:r>
-            <a:r>
-              <a:rPr lang="en-US" dirty="0" err="1" smtClean="0"/>
-              <a:t>restaurant.json</a:t>
-            </a:r>
-            <a:r>
-              <a:rPr lang="en-US" dirty="0" smtClean="0"/>
-              <a:t> </a:t>
-            </a:r>
-          </a:p>
-          <a:p>
-            <a:pPr lvl="1"/>
-            <a:r>
-              <a:rPr lang="en-US" dirty="0" smtClean="0"/>
-              <a:t>this file contains all the entries used in this presentation</a:t>
-            </a:r>
-          </a:p>
-          <a:p>
-            <a:endParaRPr lang="en-US" dirty="0" smtClean="0"/>
-          </a:p>
-          <a:p>
-            <a:pPr lvl="1"/>
+              <a:t>Start parameters</a:t>
+            </a:r>
+          </a:p>
+          <a:p>
+            <a:pPr lvl="2"/>
+            <a:r>
+              <a:rPr lang="en-US" dirty="0" smtClean="0"/>
+              <a:t>CORS requests</a:t>
+            </a:r>
+          </a:p>
+          <a:p>
+            <a:pPr lvl="2"/>
+            <a:r>
+              <a:rPr lang="en-US" dirty="0" smtClean="0"/>
+              <a:t>Can use JavaScript functions for request/response</a:t>
+            </a:r>
+          </a:p>
+          <a:p>
+            <a:pPr lvl="2"/>
+            <a:r>
+              <a:rPr lang="en-US" dirty="0" smtClean="0"/>
+              <a:t>	Allows recording of requests that were made</a:t>
+            </a:r>
+          </a:p>
+          <a:p>
+            <a:pPr marL="282575" lvl="1" indent="0">
+              <a:buNone/>
+            </a:pPr>
             <a:endParaRPr lang="en-US" dirty="0" smtClean="0"/>
           </a:p>
           <a:p>
@@ -6997,7 +7519,7 @@
     </p:spTree>
     <p:extLst>
       <p:ext uri="{BB962C8B-B14F-4D97-AF65-F5344CB8AC3E}">
-        <p14:creationId xmlns:p14="http://schemas.microsoft.com/office/powerpoint/2010/main" val="563705421"/>
+        <p14:creationId xmlns:p14="http://schemas.microsoft.com/office/powerpoint/2010/main" val="1991744321"/>
       </p:ext>
     </p:extLst>
   </p:cSld>
@@ -7048,7 +7570,7 @@
           <a:p>
             <a:r>
               <a:rPr lang="en-US" dirty="0" smtClean="0"/>
-              <a:t>Restaurant Service</a:t>
+              <a:t>Simple Service</a:t>
             </a:r>
             <a:endParaRPr lang="en-US" dirty="0"/>
           </a:p>
@@ -7072,7 +7594,203 @@
         </p:spPr>
         <p:txBody>
           <a:bodyPr>
-            <a:normAutofit fontScale="85000" lnSpcReduction="10000"/>
+            <a:normAutofit fontScale="70000" lnSpcReduction="20000"/>
+          </a:bodyPr>
+          <a:lstStyle/>
+          <a:p>
+            <a:r>
+              <a:rPr lang="en-US" dirty="0" smtClean="0"/>
+              <a:t>Postman demonstration</a:t>
+            </a:r>
+          </a:p>
+          <a:p>
+            <a:pPr lvl="1"/>
+            <a:r>
+              <a:rPr lang="en-US" dirty="0"/>
+              <a:t>source </a:t>
+            </a:r>
+            <a:r>
+              <a:rPr lang="en-US" dirty="0">
+                <a:hlinkClick r:id="rId3"/>
+              </a:rPr>
+              <a:t>https://github.com/donhenton/mountebank-</a:t>
+            </a:r>
+            <a:r>
+              <a:rPr lang="en-US" dirty="0" smtClean="0">
+                <a:hlinkClick r:id="rId3"/>
+              </a:rPr>
+              <a:t>UI</a:t>
+            </a:r>
+            <a:endParaRPr lang="en-US" dirty="0" smtClean="0"/>
+          </a:p>
+          <a:p>
+            <a:pPr lvl="1"/>
+            <a:r>
+              <a:rPr lang="en-US" dirty="0" smtClean="0"/>
+              <a:t>docs/ mountebank-</a:t>
+            </a:r>
+            <a:r>
+              <a:rPr lang="en-US" dirty="0" err="1" smtClean="0"/>
+              <a:t>madjs.postman_collection</a:t>
+            </a:r>
+            <a:endParaRPr lang="en-US" dirty="0"/>
+          </a:p>
+          <a:p>
+            <a:r>
+              <a:rPr lang="en-US" dirty="0" smtClean="0"/>
+              <a:t>Mountebank UI file</a:t>
+            </a:r>
+          </a:p>
+          <a:p>
+            <a:pPr lvl="1"/>
+            <a:r>
+              <a:rPr lang="en-US" dirty="0" smtClean="0"/>
+              <a:t>docs/mountebank-UI-</a:t>
+            </a:r>
+            <a:r>
+              <a:rPr lang="en-US" dirty="0" err="1" smtClean="0"/>
+              <a:t>restaurant.json</a:t>
+            </a:r>
+            <a:r>
+              <a:rPr lang="en-US" dirty="0" smtClean="0"/>
+              <a:t> </a:t>
+            </a:r>
+          </a:p>
+          <a:p>
+            <a:pPr lvl="1"/>
+            <a:r>
+              <a:rPr lang="en-US" dirty="0" smtClean="0"/>
+              <a:t>this file contains all the entries used in this presentation</a:t>
+            </a:r>
+          </a:p>
+          <a:p>
+            <a:r>
+              <a:rPr lang="en-US" dirty="0" smtClean="0"/>
+              <a:t>Demonstration illustrates</a:t>
+            </a:r>
+          </a:p>
+          <a:p>
+            <a:pPr lvl="1"/>
+            <a:r>
+              <a:rPr lang="en-US" dirty="0" smtClean="0"/>
+              <a:t>Creating an imposter</a:t>
+            </a:r>
+          </a:p>
+          <a:p>
+            <a:pPr lvl="1"/>
+            <a:r>
+              <a:rPr lang="en-US" dirty="0" smtClean="0"/>
+              <a:t>Communicating with that imposter</a:t>
+            </a:r>
+          </a:p>
+          <a:p>
+            <a:pPr lvl="1"/>
+            <a:r>
+              <a:rPr lang="en-US" dirty="0" smtClean="0"/>
+              <a:t>Listing imposters on the server</a:t>
+            </a:r>
+            <a:endParaRPr lang="en-US" dirty="0" smtClean="0"/>
+          </a:p>
+          <a:p>
+            <a:pPr lvl="1"/>
+            <a:endParaRPr lang="en-US" dirty="0" smtClean="0"/>
+          </a:p>
+          <a:p>
+            <a:endParaRPr lang="en-US" dirty="0"/>
+          </a:p>
+          <a:p>
+            <a:endParaRPr lang="en-US" dirty="0"/>
+          </a:p>
+          <a:p>
+            <a:pPr marL="282575" lvl="1" indent="0">
+              <a:buNone/>
+            </a:pPr>
+            <a:r>
+              <a:rPr lang="en-US" dirty="0" smtClean="0"/>
+              <a:t>	</a:t>
+            </a:r>
+          </a:p>
+        </p:txBody>
+      </p:sp>
+    </p:spTree>
+    <p:extLst>
+      <p:ext uri="{BB962C8B-B14F-4D97-AF65-F5344CB8AC3E}">
+        <p14:creationId xmlns:p14="http://schemas.microsoft.com/office/powerpoint/2010/main" val="563705421"/>
+      </p:ext>
+    </p:extLst>
+  </p:cSld>
+  <p:clrMapOvr>
+    <a:masterClrMapping/>
+  </p:clrMapOvr>
+  <p:timing>
+    <p:tnLst>
+      <p:par>
+        <p:cTn id="1" dur="indefinite" restart="never" nodeType="tmRoot"/>
+      </p:par>
+    </p:tnLst>
+  </p:timing>
+</p:sld>
+</file>
+
+<file path=ppt/slides/slide13.xml><?xml version="1.0" encoding="utf-8"?>
+<p:sld xmlns:a="http://schemas.openxmlformats.org/drawingml/2006/main" xmlns:r="http://schemas.openxmlformats.org/officeDocument/2006/relationships" xmlns:p="http://schemas.openxmlformats.org/presentationml/2006/main">
+  <p:cSld>
+    <p:spTree>
+      <p:nvGrpSpPr>
+        <p:cNvPr id="1" name=""/>
+        <p:cNvGrpSpPr/>
+        <p:nvPr/>
+      </p:nvGrpSpPr>
+      <p:grpSpPr>
+        <a:xfrm>
+          <a:off x="0" y="0"/>
+          <a:ext cx="0" cy="0"/>
+          <a:chOff x="0" y="0"/>
+          <a:chExt cx="0" cy="0"/>
+        </a:xfrm>
+      </p:grpSpPr>
+      <p:sp>
+        <p:nvSpPr>
+          <p:cNvPr id="2" name="Title 1"/>
+          <p:cNvSpPr>
+            <a:spLocks noGrp="1"/>
+          </p:cNvSpPr>
+          <p:nvPr>
+            <p:ph type="title"/>
+          </p:nvPr>
+        </p:nvSpPr>
+        <p:spPr/>
+        <p:txBody>
+          <a:bodyPr/>
+          <a:lstStyle/>
+          <a:p>
+            <a:r>
+              <a:rPr lang="en-US" dirty="0" smtClean="0"/>
+              <a:t>Restaurant Service</a:t>
+            </a:r>
+            <a:endParaRPr lang="en-US" dirty="0"/>
+          </a:p>
+        </p:txBody>
+      </p:sp>
+      <p:sp>
+        <p:nvSpPr>
+          <p:cNvPr id="3" name="Content Placeholder 2"/>
+          <p:cNvSpPr>
+            <a:spLocks noGrp="1"/>
+          </p:cNvSpPr>
+          <p:nvPr>
+            <p:ph idx="1"/>
+          </p:nvPr>
+        </p:nvSpPr>
+        <p:spPr>
+          <a:xfrm>
+            <a:off x="779463" y="1828799"/>
+            <a:ext cx="7583487" cy="4566205"/>
+          </a:xfrm>
+        </p:spPr>
+        <p:txBody>
+          <a:bodyPr>
+            <a:noAutofit/>
           </a:bodyPr>
           <a:lstStyle/>
           <a:p>
@@ -7132,9 +7850,15 @@
           </a:p>
           <a:p>
             <a:r>
-              <a:rPr lang="en-US" smtClean="0"/>
-              <a:t>Walk through</a:t>
-            </a:r>
+              <a:rPr lang="en-US" dirty="0" smtClean="0"/>
+              <a:t>Walk </a:t>
+            </a:r>
+            <a:r>
+              <a:rPr lang="en-US" dirty="0" smtClean="0"/>
+              <a:t>through</a:t>
+            </a:r>
+          </a:p>
+          <a:p>
             <a:endParaRPr lang="en-US" dirty="0" smtClean="0"/>
           </a:p>
           <a:p>
@@ -7165,6 +7889,736 @@
     <p:extLst>
       <p:ext uri="{BB962C8B-B14F-4D97-AF65-F5344CB8AC3E}">
         <p14:creationId xmlns:p14="http://schemas.microsoft.com/office/powerpoint/2010/main" val="3777627379"/>
+      </p:ext>
+    </p:extLst>
+  </p:cSld>
+  <p:clrMapOvr>
+    <a:masterClrMapping/>
+  </p:clrMapOvr>
+  <p:timing>
+    <p:tnLst>
+      <p:par>
+        <p:cTn id="1" dur="indefinite" restart="never" nodeType="tmRoot"/>
+      </p:par>
+    </p:tnLst>
+  </p:timing>
+</p:sld>
+</file>
+
+<file path=ppt/slides/slide14.xml><?xml version="1.0" encoding="utf-8"?>
+<p:sld xmlns:a="http://schemas.openxmlformats.org/drawingml/2006/main" xmlns:r="http://schemas.openxmlformats.org/officeDocument/2006/relationships" xmlns:p="http://schemas.openxmlformats.org/presentationml/2006/main">
+  <p:cSld>
+    <p:spTree>
+      <p:nvGrpSpPr>
+        <p:cNvPr id="1" name=""/>
+        <p:cNvGrpSpPr/>
+        <p:nvPr/>
+      </p:nvGrpSpPr>
+      <p:grpSpPr>
+        <a:xfrm>
+          <a:off x="0" y="0"/>
+          <a:ext cx="0" cy="0"/>
+          <a:chOff x="0" y="0"/>
+          <a:chExt cx="0" cy="0"/>
+        </a:xfrm>
+      </p:grpSpPr>
+      <p:sp>
+        <p:nvSpPr>
+          <p:cNvPr id="2" name="Title 1"/>
+          <p:cNvSpPr>
+            <a:spLocks noGrp="1"/>
+          </p:cNvSpPr>
+          <p:nvPr>
+            <p:ph type="title"/>
+          </p:nvPr>
+        </p:nvSpPr>
+        <p:spPr/>
+        <p:txBody>
+          <a:bodyPr/>
+          <a:lstStyle/>
+          <a:p>
+            <a:r>
+              <a:rPr lang="en-US" dirty="0" smtClean="0"/>
+              <a:t>Injection Sample</a:t>
+            </a:r>
+            <a:endParaRPr lang="en-US" dirty="0"/>
+          </a:p>
+        </p:txBody>
+      </p:sp>
+      <p:sp>
+        <p:nvSpPr>
+          <p:cNvPr id="3" name="Content Placeholder 2"/>
+          <p:cNvSpPr>
+            <a:spLocks noGrp="1"/>
+          </p:cNvSpPr>
+          <p:nvPr>
+            <p:ph idx="1"/>
+          </p:nvPr>
+        </p:nvSpPr>
+        <p:spPr>
+          <a:xfrm>
+            <a:off x="779463" y="1828799"/>
+            <a:ext cx="7583487" cy="4566205"/>
+          </a:xfrm>
+        </p:spPr>
+        <p:txBody>
+          <a:bodyPr>
+            <a:noAutofit/>
+          </a:bodyPr>
+          <a:lstStyle/>
+          <a:p>
+            <a:r>
+              <a:rPr lang="en-US" sz="2000" dirty="0" smtClean="0"/>
+              <a:t>Postman Documentation</a:t>
+            </a:r>
+          </a:p>
+          <a:p>
+            <a:pPr lvl="1"/>
+            <a:r>
+              <a:rPr lang="en-US" dirty="0" smtClean="0"/>
+              <a:t>source </a:t>
+            </a:r>
+            <a:r>
+              <a:rPr lang="en-US" dirty="0" smtClean="0">
+                <a:hlinkClick r:id="rId3"/>
+              </a:rPr>
+              <a:t>https://github.com/donhenton/mountebank-UI</a:t>
+            </a:r>
+            <a:endParaRPr lang="en-US" dirty="0" smtClean="0"/>
+          </a:p>
+          <a:p>
+            <a:pPr lvl="1"/>
+            <a:r>
+              <a:rPr lang="en-US" dirty="0" smtClean="0"/>
+              <a:t>docs/ mountebank-</a:t>
+            </a:r>
+            <a:r>
+              <a:rPr lang="en-US" dirty="0" err="1" smtClean="0"/>
+              <a:t>restaurant.postman_collection</a:t>
+            </a:r>
+            <a:endParaRPr lang="en-US" dirty="0" smtClean="0"/>
+          </a:p>
+          <a:p>
+            <a:r>
+              <a:rPr lang="en-US" sz="2000" dirty="0" smtClean="0"/>
+              <a:t>Allow the use of </a:t>
+            </a:r>
+            <a:r>
+              <a:rPr lang="en-US" sz="2000" dirty="0" err="1" smtClean="0"/>
+              <a:t>javascript</a:t>
+            </a:r>
+            <a:r>
+              <a:rPr lang="en-US" sz="2000" dirty="0" smtClean="0"/>
+              <a:t> for request/responses</a:t>
+            </a:r>
+          </a:p>
+          <a:p>
+            <a:r>
+              <a:rPr lang="en-US" sz="2000" dirty="0" smtClean="0"/>
+              <a:t>Provides flexibility of programming</a:t>
+            </a:r>
+          </a:p>
+          <a:p>
+            <a:r>
+              <a:rPr lang="en-US" sz="2000" dirty="0" smtClean="0"/>
+              <a:t>Demo requires global </a:t>
+            </a:r>
+            <a:r>
+              <a:rPr lang="en-US" sz="2000" dirty="0" err="1" smtClean="0"/>
+              <a:t>npm</a:t>
+            </a:r>
+            <a:r>
+              <a:rPr lang="en-US" sz="2000" dirty="0" smtClean="0"/>
+              <a:t> installation of</a:t>
+            </a:r>
+          </a:p>
+          <a:p>
+            <a:pPr lvl="1"/>
+            <a:r>
+              <a:rPr lang="en-US" dirty="0" smtClean="0"/>
+              <a:t>Json3</a:t>
+            </a:r>
+          </a:p>
+          <a:p>
+            <a:pPr lvl="1"/>
+            <a:r>
+              <a:rPr lang="en-US" dirty="0" smtClean="0"/>
+              <a:t>handlebars</a:t>
+            </a:r>
+            <a:endParaRPr lang="en-US" dirty="0" smtClean="0"/>
+          </a:p>
+          <a:p>
+            <a:endParaRPr lang="en-US" dirty="0" smtClean="0"/>
+          </a:p>
+          <a:p>
+            <a:pPr lvl="1"/>
+            <a:endParaRPr lang="en-US" dirty="0" smtClean="0"/>
+          </a:p>
+          <a:p>
+            <a:endParaRPr lang="en-US" dirty="0"/>
+          </a:p>
+          <a:p>
+            <a:endParaRPr lang="en-US" dirty="0"/>
+          </a:p>
+          <a:p>
+            <a:pPr marL="282575" lvl="1" indent="0">
+              <a:buNone/>
+            </a:pPr>
+            <a:r>
+              <a:rPr lang="en-US" dirty="0" smtClean="0"/>
+              <a:t>	</a:t>
+            </a:r>
+          </a:p>
+        </p:txBody>
+      </p:sp>
+    </p:spTree>
+    <p:extLst>
+      <p:ext uri="{BB962C8B-B14F-4D97-AF65-F5344CB8AC3E}">
+        <p14:creationId xmlns:p14="http://schemas.microsoft.com/office/powerpoint/2010/main" val="1225020454"/>
+      </p:ext>
+    </p:extLst>
+  </p:cSld>
+  <p:clrMapOvr>
+    <a:masterClrMapping/>
+  </p:clrMapOvr>
+  <p:timing>
+    <p:tnLst>
+      <p:par>
+        <p:cTn id="1" dur="indefinite" restart="never" nodeType="tmRoot"/>
+      </p:par>
+    </p:tnLst>
+  </p:timing>
+</p:sld>
+</file>
+
+<file path=ppt/slides/slide15.xml><?xml version="1.0" encoding="utf-8"?>
+<p:sld xmlns:a="http://schemas.openxmlformats.org/drawingml/2006/main" xmlns:r="http://schemas.openxmlformats.org/officeDocument/2006/relationships" xmlns:p="http://schemas.openxmlformats.org/presentationml/2006/main">
+  <p:cSld>
+    <p:spTree>
+      <p:nvGrpSpPr>
+        <p:cNvPr id="1" name=""/>
+        <p:cNvGrpSpPr/>
+        <p:nvPr/>
+      </p:nvGrpSpPr>
+      <p:grpSpPr>
+        <a:xfrm>
+          <a:off x="0" y="0"/>
+          <a:ext cx="0" cy="0"/>
+          <a:chOff x="0" y="0"/>
+          <a:chExt cx="0" cy="0"/>
+        </a:xfrm>
+      </p:grpSpPr>
+      <p:sp>
+        <p:nvSpPr>
+          <p:cNvPr id="2" name="Title 1"/>
+          <p:cNvSpPr>
+            <a:spLocks noGrp="1"/>
+          </p:cNvSpPr>
+          <p:nvPr>
+            <p:ph type="title"/>
+          </p:nvPr>
+        </p:nvSpPr>
+        <p:spPr/>
+        <p:txBody>
+          <a:bodyPr/>
+          <a:lstStyle/>
+          <a:p>
+            <a:r>
+              <a:rPr lang="en-US" dirty="0" smtClean="0"/>
+              <a:t>Injection Sample</a:t>
+            </a:r>
+            <a:endParaRPr lang="en-US" dirty="0"/>
+          </a:p>
+        </p:txBody>
+      </p:sp>
+      <p:sp>
+        <p:nvSpPr>
+          <p:cNvPr id="3" name="Content Placeholder 2"/>
+          <p:cNvSpPr>
+            <a:spLocks noGrp="1"/>
+          </p:cNvSpPr>
+          <p:nvPr>
+            <p:ph idx="1"/>
+          </p:nvPr>
+        </p:nvSpPr>
+        <p:spPr>
+          <a:xfrm>
+            <a:off x="779463" y="1828799"/>
+            <a:ext cx="7583487" cy="4566205"/>
+          </a:xfrm>
+        </p:spPr>
+        <p:txBody>
+          <a:bodyPr>
+            <a:noAutofit/>
+          </a:bodyPr>
+          <a:lstStyle/>
+          <a:p>
+            <a:r>
+              <a:rPr lang="en-US" sz="2000" dirty="0" smtClean="0"/>
+              <a:t>Postman Documentation</a:t>
+            </a:r>
+          </a:p>
+          <a:p>
+            <a:pPr lvl="1"/>
+            <a:r>
+              <a:rPr lang="en-US" dirty="0" smtClean="0"/>
+              <a:t>source </a:t>
+            </a:r>
+            <a:r>
+              <a:rPr lang="en-US" dirty="0" smtClean="0">
+                <a:hlinkClick r:id="rId3"/>
+              </a:rPr>
+              <a:t>https://github.com/donhenton/mountebank-UI</a:t>
+            </a:r>
+            <a:endParaRPr lang="en-US" dirty="0" smtClean="0"/>
+          </a:p>
+          <a:p>
+            <a:pPr lvl="1"/>
+            <a:r>
+              <a:rPr lang="en-US" dirty="0" smtClean="0"/>
+              <a:t>docs/ mountebank-</a:t>
+            </a:r>
+            <a:r>
+              <a:rPr lang="en-US" dirty="0" err="1" smtClean="0"/>
+              <a:t>restaurant.postman_collection</a:t>
+            </a:r>
+            <a:endParaRPr lang="en-US" dirty="0" smtClean="0"/>
+          </a:p>
+          <a:p>
+            <a:r>
+              <a:rPr lang="en-US" sz="2000" dirty="0" smtClean="0"/>
+              <a:t>Allow the use of </a:t>
+            </a:r>
+            <a:r>
+              <a:rPr lang="en-US" sz="2000" dirty="0" err="1" smtClean="0"/>
+              <a:t>javascript</a:t>
+            </a:r>
+            <a:r>
+              <a:rPr lang="en-US" sz="2000" dirty="0" smtClean="0"/>
+              <a:t> for request/responses</a:t>
+            </a:r>
+          </a:p>
+          <a:p>
+            <a:r>
+              <a:rPr lang="en-US" sz="2000" dirty="0" smtClean="0"/>
+              <a:t>Provides flexibility of programming</a:t>
+            </a:r>
+          </a:p>
+          <a:p>
+            <a:r>
+              <a:rPr lang="en-US" sz="2000" dirty="0" smtClean="0"/>
+              <a:t>Demo requires global </a:t>
+            </a:r>
+            <a:r>
+              <a:rPr lang="en-US" sz="2000" dirty="0" err="1" smtClean="0"/>
+              <a:t>npm</a:t>
+            </a:r>
+            <a:r>
+              <a:rPr lang="en-US" sz="2000" dirty="0" smtClean="0"/>
+              <a:t> installation of</a:t>
+            </a:r>
+          </a:p>
+          <a:p>
+            <a:pPr lvl="1"/>
+            <a:r>
+              <a:rPr lang="en-US" dirty="0" smtClean="0"/>
+              <a:t>Json3</a:t>
+            </a:r>
+          </a:p>
+          <a:p>
+            <a:pPr lvl="1"/>
+            <a:r>
+              <a:rPr lang="en-US" dirty="0" smtClean="0"/>
+              <a:t>Handlebars</a:t>
+            </a:r>
+          </a:p>
+          <a:p>
+            <a:r>
+              <a:rPr lang="en-US" sz="2000" dirty="0" smtClean="0"/>
+              <a:t>View formatted code in Mountebank-UI </a:t>
+            </a:r>
+            <a:endParaRPr lang="en-US" sz="2000" dirty="0" smtClean="0"/>
+          </a:p>
+          <a:p>
+            <a:endParaRPr lang="en-US" dirty="0" smtClean="0"/>
+          </a:p>
+          <a:p>
+            <a:pPr lvl="1"/>
+            <a:endParaRPr lang="en-US" dirty="0" smtClean="0"/>
+          </a:p>
+          <a:p>
+            <a:endParaRPr lang="en-US" dirty="0"/>
+          </a:p>
+          <a:p>
+            <a:endParaRPr lang="en-US" dirty="0"/>
+          </a:p>
+          <a:p>
+            <a:pPr marL="282575" lvl="1" indent="0">
+              <a:buNone/>
+            </a:pPr>
+            <a:r>
+              <a:rPr lang="en-US" dirty="0" smtClean="0"/>
+              <a:t>	</a:t>
+            </a:r>
+          </a:p>
+        </p:txBody>
+      </p:sp>
+    </p:spTree>
+    <p:extLst>
+      <p:ext uri="{BB962C8B-B14F-4D97-AF65-F5344CB8AC3E}">
+        <p14:creationId xmlns:p14="http://schemas.microsoft.com/office/powerpoint/2010/main" val="1491982742"/>
+      </p:ext>
+    </p:extLst>
+  </p:cSld>
+  <p:clrMapOvr>
+    <a:masterClrMapping/>
+  </p:clrMapOvr>
+  <p:timing>
+    <p:tnLst>
+      <p:par>
+        <p:cTn id="1" dur="indefinite" restart="never" nodeType="tmRoot"/>
+      </p:par>
+    </p:tnLst>
+  </p:timing>
+</p:sld>
+</file>
+
+<file path=ppt/slides/slide16.xml><?xml version="1.0" encoding="utf-8"?>
+<p:sld xmlns:a="http://schemas.openxmlformats.org/drawingml/2006/main" xmlns:r="http://schemas.openxmlformats.org/officeDocument/2006/relationships" xmlns:p="http://schemas.openxmlformats.org/presentationml/2006/main">
+  <p:cSld>
+    <p:spTree>
+      <p:nvGrpSpPr>
+        <p:cNvPr id="1" name=""/>
+        <p:cNvGrpSpPr/>
+        <p:nvPr/>
+      </p:nvGrpSpPr>
+      <p:grpSpPr>
+        <a:xfrm>
+          <a:off x="0" y="0"/>
+          <a:ext cx="0" cy="0"/>
+          <a:chOff x="0" y="0"/>
+          <a:chExt cx="0" cy="0"/>
+        </a:xfrm>
+      </p:grpSpPr>
+      <p:sp>
+        <p:nvSpPr>
+          <p:cNvPr id="2" name="Title 1"/>
+          <p:cNvSpPr>
+            <a:spLocks noGrp="1"/>
+          </p:cNvSpPr>
+          <p:nvPr>
+            <p:ph type="title"/>
+          </p:nvPr>
+        </p:nvSpPr>
+        <p:spPr/>
+        <p:txBody>
+          <a:bodyPr/>
+          <a:lstStyle/>
+          <a:p>
+            <a:r>
+              <a:rPr lang="en-US" dirty="0" smtClean="0"/>
+              <a:t>Mountebank and Unit Tests</a:t>
+            </a:r>
+            <a:endParaRPr lang="en-US" dirty="0"/>
+          </a:p>
+        </p:txBody>
+      </p:sp>
+      <p:sp>
+        <p:nvSpPr>
+          <p:cNvPr id="3" name="Content Placeholder 2"/>
+          <p:cNvSpPr>
+            <a:spLocks noGrp="1"/>
+          </p:cNvSpPr>
+          <p:nvPr>
+            <p:ph idx="1"/>
+          </p:nvPr>
+        </p:nvSpPr>
+        <p:spPr>
+          <a:xfrm>
+            <a:off x="779463" y="1695795"/>
+            <a:ext cx="7583487" cy="4566205"/>
+          </a:xfrm>
+        </p:spPr>
+        <p:txBody>
+          <a:bodyPr>
+            <a:noAutofit/>
+          </a:bodyPr>
+          <a:lstStyle/>
+          <a:p>
+            <a:r>
+              <a:rPr lang="en-US" sz="2000" dirty="0"/>
+              <a:t>Grunt file for </a:t>
+            </a:r>
+            <a:r>
+              <a:rPr lang="en-US" sz="2000" dirty="0" smtClean="0"/>
+              <a:t>Mountebank-UI</a:t>
+            </a:r>
+          </a:p>
+          <a:p>
+            <a:pPr lvl="1"/>
+            <a:r>
+              <a:rPr lang="en-US" sz="1800" dirty="0" smtClean="0"/>
+              <a:t>Start server</a:t>
+            </a:r>
+          </a:p>
+          <a:p>
+            <a:pPr lvl="1"/>
+            <a:r>
+              <a:rPr lang="en-US" sz="1800" dirty="0" smtClean="0"/>
+              <a:t>Stop server</a:t>
+            </a:r>
+          </a:p>
+          <a:p>
+            <a:r>
+              <a:rPr lang="en-US" sz="2000" dirty="0" smtClean="0"/>
+              <a:t>Tests that contact the server</a:t>
+            </a:r>
+          </a:p>
+          <a:p>
+            <a:pPr lvl="1"/>
+            <a:r>
+              <a:rPr lang="en-US" sz="1800" dirty="0"/>
+              <a:t>grunt wire-tests-internal</a:t>
+            </a:r>
+            <a:endParaRPr lang="en-US" sz="1800" dirty="0" smtClean="0"/>
+          </a:p>
+          <a:p>
+            <a:r>
+              <a:rPr lang="en-US" sz="2000" dirty="0" err="1" smtClean="0"/>
+              <a:t>wire_tests.js</a:t>
+            </a:r>
+            <a:endParaRPr lang="en-US" sz="2000" dirty="0" smtClean="0"/>
+          </a:p>
+          <a:p>
+            <a:pPr lvl="1"/>
+            <a:r>
+              <a:rPr lang="en-US" dirty="0" smtClean="0"/>
+              <a:t>Set the imposter up (before Test)</a:t>
+            </a:r>
+          </a:p>
+          <a:p>
+            <a:pPr lvl="1"/>
+            <a:r>
+              <a:rPr lang="en-US" dirty="0" smtClean="0"/>
+              <a:t>Run test</a:t>
+            </a:r>
+          </a:p>
+          <a:p>
+            <a:pPr lvl="1"/>
+            <a:r>
+              <a:rPr lang="en-US" dirty="0" smtClean="0"/>
+              <a:t>Remove Imposter</a:t>
+            </a:r>
+          </a:p>
+          <a:p>
+            <a:pPr lvl="1"/>
+            <a:endParaRPr lang="en-US" dirty="0" smtClean="0"/>
+          </a:p>
+          <a:p>
+            <a:endParaRPr lang="en-US" dirty="0" smtClean="0"/>
+          </a:p>
+          <a:p>
+            <a:pPr lvl="1"/>
+            <a:endParaRPr lang="en-US" dirty="0" smtClean="0"/>
+          </a:p>
+          <a:p>
+            <a:endParaRPr lang="en-US" dirty="0"/>
+          </a:p>
+          <a:p>
+            <a:endParaRPr lang="en-US" dirty="0"/>
+          </a:p>
+          <a:p>
+            <a:pPr marL="282575" lvl="1" indent="0">
+              <a:buNone/>
+            </a:pPr>
+            <a:r>
+              <a:rPr lang="en-US" dirty="0" smtClean="0"/>
+              <a:t>	</a:t>
+            </a:r>
+          </a:p>
+        </p:txBody>
+      </p:sp>
+    </p:spTree>
+    <p:extLst>
+      <p:ext uri="{BB962C8B-B14F-4D97-AF65-F5344CB8AC3E}">
+        <p14:creationId xmlns:p14="http://schemas.microsoft.com/office/powerpoint/2010/main" val="2032443736"/>
+      </p:ext>
+    </p:extLst>
+  </p:cSld>
+  <p:clrMapOvr>
+    <a:masterClrMapping/>
+  </p:clrMapOvr>
+  <p:timing>
+    <p:tnLst>
+      <p:par>
+        <p:cTn id="1" dur="indefinite" restart="never" nodeType="tmRoot"/>
+      </p:par>
+    </p:tnLst>
+  </p:timing>
+</p:sld>
+</file>
+
+<file path=ppt/slides/slide17.xml><?xml version="1.0" encoding="utf-8"?>
+<p:sld xmlns:a="http://schemas.openxmlformats.org/drawingml/2006/main" xmlns:r="http://schemas.openxmlformats.org/officeDocument/2006/relationships" xmlns:p="http://schemas.openxmlformats.org/presentationml/2006/main">
+  <p:cSld>
+    <p:spTree>
+      <p:nvGrpSpPr>
+        <p:cNvPr id="1" name=""/>
+        <p:cNvGrpSpPr/>
+        <p:nvPr/>
+      </p:nvGrpSpPr>
+      <p:grpSpPr>
+        <a:xfrm>
+          <a:off x="0" y="0"/>
+          <a:ext cx="0" cy="0"/>
+          <a:chOff x="0" y="0"/>
+          <a:chExt cx="0" cy="0"/>
+        </a:xfrm>
+      </p:grpSpPr>
+      <p:sp>
+        <p:nvSpPr>
+          <p:cNvPr id="2" name="Title 1"/>
+          <p:cNvSpPr>
+            <a:spLocks noGrp="1"/>
+          </p:cNvSpPr>
+          <p:nvPr>
+            <p:ph type="title"/>
+          </p:nvPr>
+        </p:nvSpPr>
+        <p:spPr>
+          <a:xfrm>
+            <a:off x="779463" y="381000"/>
+            <a:ext cx="7583487" cy="666404"/>
+          </a:xfrm>
+        </p:spPr>
+        <p:txBody>
+          <a:bodyPr/>
+          <a:lstStyle/>
+          <a:p>
+            <a:r>
+              <a:rPr lang="en-US" smtClean="0"/>
+              <a:t>Summary</a:t>
+            </a:r>
+            <a:endParaRPr lang="en-US" dirty="0"/>
+          </a:p>
+        </p:txBody>
+      </p:sp>
+      <p:sp>
+        <p:nvSpPr>
+          <p:cNvPr id="3" name="Content Placeholder 2"/>
+          <p:cNvSpPr>
+            <a:spLocks noGrp="1"/>
+          </p:cNvSpPr>
+          <p:nvPr>
+            <p:ph idx="1"/>
+          </p:nvPr>
+        </p:nvSpPr>
+        <p:spPr>
+          <a:xfrm>
+            <a:off x="779462" y="1047404"/>
+            <a:ext cx="7583487" cy="4566205"/>
+          </a:xfrm>
+        </p:spPr>
+        <p:txBody>
+          <a:bodyPr>
+            <a:noAutofit/>
+          </a:bodyPr>
+          <a:lstStyle/>
+          <a:p>
+            <a:r>
+              <a:rPr lang="en-US" dirty="0" smtClean="0"/>
+              <a:t>Mock servers assist in</a:t>
+            </a:r>
+          </a:p>
+          <a:p>
+            <a:pPr lvl="1"/>
+            <a:r>
+              <a:rPr lang="en-US" dirty="0" smtClean="0"/>
+              <a:t>Developing FE systems with external dependencies</a:t>
+            </a:r>
+          </a:p>
+          <a:p>
+            <a:pPr lvl="1"/>
+            <a:r>
+              <a:rPr lang="en-US" dirty="0" smtClean="0"/>
+              <a:t>Unit Testing</a:t>
+            </a:r>
+          </a:p>
+          <a:p>
+            <a:pPr lvl="1"/>
+            <a:r>
+              <a:rPr lang="en-US" dirty="0" smtClean="0"/>
+              <a:t>Simulating hard to repeat situations (error conditions)</a:t>
+            </a:r>
+            <a:endParaRPr lang="en-US" dirty="0" smtClean="0"/>
+          </a:p>
+          <a:p>
+            <a:r>
+              <a:rPr lang="en-US" dirty="0" smtClean="0"/>
+              <a:t>Mountebank allows for </a:t>
+            </a:r>
+          </a:p>
+          <a:p>
+            <a:pPr lvl="1"/>
+            <a:r>
+              <a:rPr lang="en-US" dirty="0" smtClean="0"/>
+              <a:t>Detailed simulation of internal and external REST services</a:t>
+            </a:r>
+          </a:p>
+          <a:p>
+            <a:pPr lvl="1"/>
+            <a:r>
+              <a:rPr lang="en-US" dirty="0" smtClean="0"/>
+              <a:t>CORS simulation</a:t>
+            </a:r>
+          </a:p>
+          <a:p>
+            <a:pPr lvl="1"/>
+            <a:r>
+              <a:rPr lang="en-US" dirty="0" err="1" smtClean="0"/>
+              <a:t>Javascript</a:t>
+            </a:r>
+            <a:r>
+              <a:rPr lang="en-US" dirty="0" smtClean="0"/>
+              <a:t> for request/response generation</a:t>
+            </a:r>
+            <a:endParaRPr lang="en-US" dirty="0" smtClean="0"/>
+          </a:p>
+          <a:p>
+            <a:pPr lvl="1"/>
+            <a:endParaRPr lang="en-US" dirty="0" smtClean="0"/>
+          </a:p>
+          <a:p>
+            <a:endParaRPr lang="en-US" dirty="0" smtClean="0"/>
+          </a:p>
+          <a:p>
+            <a:endParaRPr lang="en-US" dirty="0" smtClean="0"/>
+          </a:p>
+          <a:p>
+            <a:pPr lvl="1"/>
+            <a:endParaRPr lang="en-US" dirty="0" smtClean="0"/>
+          </a:p>
+          <a:p>
+            <a:endParaRPr lang="en-US" dirty="0"/>
+          </a:p>
+          <a:p>
+            <a:endParaRPr lang="en-US" dirty="0"/>
+          </a:p>
+          <a:p>
+            <a:pPr marL="282575" lvl="1" indent="0">
+              <a:buNone/>
+            </a:pPr>
+            <a:r>
+              <a:rPr lang="en-US" dirty="0" smtClean="0"/>
+              <a:t>	</a:t>
+            </a:r>
+          </a:p>
+        </p:txBody>
+      </p:sp>
+    </p:spTree>
+    <p:extLst>
+      <p:ext uri="{BB962C8B-B14F-4D97-AF65-F5344CB8AC3E}">
+        <p14:creationId xmlns:p14="http://schemas.microsoft.com/office/powerpoint/2010/main" val="580317140"/>
       </p:ext>
     </p:extLst>
   </p:cSld>
@@ -7238,72 +8692,28 @@
           <a:p>
             <a:r>
               <a:rPr lang="en-US" dirty="0" smtClean="0"/>
-              <a:t>Data comes from somewhere</a:t>
-            </a:r>
-          </a:p>
-          <a:p>
-            <a:pPr lvl="1"/>
-            <a:r>
-              <a:rPr lang="en-US" dirty="0" smtClean="0"/>
-              <a:t>AJAX</a:t>
-            </a:r>
-          </a:p>
-          <a:p>
-            <a:pPr lvl="1"/>
+              <a:t>REST Services are the norm</a:t>
+            </a:r>
+            <a:endParaRPr lang="en-US" dirty="0"/>
+          </a:p>
+          <a:p>
             <a:r>
               <a:rPr lang="en-US" dirty="0" err="1" smtClean="0"/>
-              <a:t>Websockets</a:t>
-            </a:r>
-            <a:r>
-              <a:rPr lang="en-US" dirty="0"/>
-              <a:t> </a:t>
-            </a:r>
-            <a:r>
-              <a:rPr lang="en-US" dirty="0" smtClean="0"/>
-              <a:t>(?)</a:t>
-            </a:r>
-          </a:p>
-          <a:p>
-            <a:r>
-              <a:rPr lang="en-US" dirty="0" smtClean="0"/>
-              <a:t>During development service may not be available yet</a:t>
-            </a:r>
-          </a:p>
-          <a:p>
-            <a:pPr lvl="1"/>
-            <a:r>
-              <a:rPr lang="en-US" dirty="0" smtClean="0"/>
-              <a:t>Backend developers may be developing it as you speak</a:t>
-            </a:r>
-          </a:p>
-          <a:p>
-            <a:pPr lvl="1"/>
-            <a:r>
-              <a:rPr lang="en-US" dirty="0" smtClean="0"/>
-              <a:t>Not unusual for Front-end ‘to wait for’ service</a:t>
-            </a:r>
-          </a:p>
-          <a:p>
-            <a:r>
-              <a:rPr lang="en-US" dirty="0" smtClean="0"/>
-              <a:t>Would like to have parallel development</a:t>
-            </a:r>
-          </a:p>
-          <a:p>
-            <a:pPr lvl="1"/>
-            <a:r>
-              <a:rPr lang="en-US" dirty="0" smtClean="0"/>
-              <a:t>FE and BE working simultaneously</a:t>
-            </a:r>
-          </a:p>
-          <a:p>
-            <a:pPr lvl="1"/>
-            <a:r>
-              <a:rPr lang="en-US" dirty="0" smtClean="0"/>
-              <a:t>How to get that to happen?</a:t>
-            </a:r>
-          </a:p>
-          <a:p>
+              <a:t>Microrservices</a:t>
+            </a:r>
+            <a:endParaRPr lang="en-US" dirty="0" smtClean="0"/>
+          </a:p>
+          <a:p>
+            <a:r>
+              <a:rPr lang="en-US" dirty="0" smtClean="0"/>
+              <a:t>Often times FE Development and Service Development are separated</a:t>
+            </a:r>
+          </a:p>
+          <a:p>
+            <a:r>
+              <a:rPr lang="en-US" dirty="0" smtClean="0"/>
+              <a:t>The concept of the interface or API interface becomes important</a:t>
+            </a:r>
             <a:endParaRPr lang="en-US" dirty="0"/>
           </a:p>
           <a:p>
@@ -7317,7 +8727,7 @@
     </p:spTree>
     <p:extLst>
       <p:ext uri="{BB962C8B-B14F-4D97-AF65-F5344CB8AC3E}">
-        <p14:creationId xmlns:p14="http://schemas.microsoft.com/office/powerpoint/2010/main" val="1538354957"/>
+        <p14:creationId xmlns:p14="http://schemas.microsoft.com/office/powerpoint/2010/main" val="1875602837"/>
       </p:ext>
     </p:extLst>
   </p:cSld>
@@ -7391,77 +8801,70 @@
           <a:p>
             <a:r>
               <a:rPr lang="en-US" dirty="0" smtClean="0"/>
-              <a:t>One approach: documentation</a:t>
+              <a:t>Data comes from somewhere</a:t>
             </a:r>
           </a:p>
           <a:p>
             <a:pPr lvl="1"/>
             <a:r>
               <a:rPr lang="en-US" dirty="0" smtClean="0"/>
-              <a:t>Backend provides sample JSON</a:t>
+              <a:t>AJAX</a:t>
             </a:r>
           </a:p>
           <a:p>
             <a:pPr lvl="1"/>
             <a:r>
-              <a:rPr lang="en-US" dirty="0" smtClean="0"/>
-              <a:t>Documentation of requests, responses, error codes</a:t>
-            </a:r>
-          </a:p>
-          <a:p>
-            <a:r>
-              <a:rPr lang="en-US" dirty="0"/>
-              <a:t>Swagger </a:t>
-            </a:r>
-            <a:r>
-              <a:rPr lang="en-US" dirty="0" smtClean="0"/>
-              <a:t> </a:t>
-            </a:r>
-          </a:p>
-          <a:p>
-            <a:pPr lvl="1"/>
-            <a:r>
-              <a:rPr lang="en-US" dirty="0">
-                <a:hlinkClick r:id="rId2"/>
-              </a:rPr>
-              <a:t>http://donhenton-springmvc3.herokuapp.com/app/swagger/sdoc</a:t>
+              <a:rPr lang="en-US" dirty="0" err="1" smtClean="0"/>
+              <a:t>Websockets</a:t>
             </a:r>
             <a:r>
               <a:rPr lang="en-US" dirty="0"/>
               <a:t> </a:t>
             </a:r>
-            <a:endParaRPr lang="en-US" dirty="0" smtClean="0"/>
-          </a:p>
-          <a:p>
-            <a:r>
-              <a:rPr lang="en-US" dirty="0" smtClean="0"/>
-              <a:t>Summary</a:t>
-            </a:r>
-            <a:endParaRPr lang="en-US" dirty="0"/>
+            <a:r>
+              <a:rPr lang="en-US" dirty="0" smtClean="0"/>
+              <a:t>(?)</a:t>
+            </a:r>
+          </a:p>
+          <a:p>
+            <a:r>
+              <a:rPr lang="en-US" dirty="0" smtClean="0"/>
+              <a:t>During development service may not be available yet</a:t>
+            </a:r>
           </a:p>
           <a:p>
             <a:pPr lvl="1"/>
             <a:r>
               <a:rPr lang="en-US" dirty="0" smtClean="0"/>
-              <a:t>Need to communicate the service to FE </a:t>
-            </a:r>
-            <a:r>
-              <a:rPr lang="en-US" dirty="0" err="1" smtClean="0"/>
-              <a:t>devs</a:t>
-            </a:r>
-            <a:endParaRPr lang="en-US" dirty="0"/>
+              <a:t>Backend developers may be developing it as you speak</a:t>
+            </a:r>
           </a:p>
           <a:p>
             <a:pPr lvl="1"/>
             <a:r>
               <a:rPr lang="en-US" dirty="0" smtClean="0"/>
-              <a:t>But don’t want to spend forever, supposed to be coding it</a:t>
-            </a:r>
-            <a:endParaRPr lang="en-US" dirty="0"/>
+              <a:t>Not unusual for Front-end ‘to wait for’ service</a:t>
+            </a:r>
+          </a:p>
+          <a:p>
+            <a:r>
+              <a:rPr lang="en-US" dirty="0" smtClean="0"/>
+              <a:t>Would like to have parallel development</a:t>
+            </a:r>
           </a:p>
           <a:p>
             <a:pPr lvl="1"/>
-            <a:endParaRPr lang="en-US" dirty="0" smtClean="0"/>
+            <a:r>
+              <a:rPr lang="en-US" dirty="0" smtClean="0"/>
+              <a:t>FE and BE working simultaneously</a:t>
+            </a:r>
+          </a:p>
+          <a:p>
+            <a:pPr lvl="1"/>
+            <a:r>
+              <a:rPr lang="en-US" dirty="0" smtClean="0"/>
+              <a:t>How to get that to happen?</a:t>
+            </a:r>
           </a:p>
           <a:p>
             <a:endParaRPr lang="en-US" dirty="0"/>
@@ -7477,7 +8880,7 @@
     </p:spTree>
     <p:extLst>
       <p:ext uri="{BB962C8B-B14F-4D97-AF65-F5344CB8AC3E}">
-        <p14:creationId xmlns:p14="http://schemas.microsoft.com/office/powerpoint/2010/main" val="2382870566"/>
+        <p14:creationId xmlns:p14="http://schemas.microsoft.com/office/powerpoint/2010/main" val="1538354957"/>
       </p:ext>
     </p:extLst>
   </p:cSld>
@@ -7546,53 +8949,68 @@
         </p:nvSpPr>
         <p:spPr/>
         <p:txBody>
-          <a:bodyPr>
-            <a:normAutofit/>
-          </a:bodyPr>
-          <a:lstStyle/>
-          <a:p>
-            <a:r>
-              <a:rPr lang="en-US" dirty="0" smtClean="0"/>
-              <a:t>Documentation</a:t>
+          <a:bodyPr/>
+          <a:lstStyle/>
+          <a:p>
+            <a:r>
+              <a:rPr lang="en-US" dirty="0" smtClean="0"/>
+              <a:t>One approach: documentation</a:t>
             </a:r>
           </a:p>
           <a:p>
             <a:pPr lvl="1"/>
             <a:r>
               <a:rPr lang="en-US" dirty="0" smtClean="0"/>
-              <a:t>May not be able to communicate </a:t>
+              <a:t>Backend provides sample JSON</a:t>
+            </a:r>
+          </a:p>
+          <a:p>
+            <a:pPr lvl="1"/>
+            <a:r>
+              <a:rPr lang="en-US" dirty="0" smtClean="0"/>
+              <a:t>Documentation of requests, responses, error codes</a:t>
+            </a:r>
+          </a:p>
+          <a:p>
+            <a:r>
+              <a:rPr lang="en-US" dirty="0"/>
+              <a:t>Swagger </a:t>
+            </a:r>
+            <a:r>
+              <a:rPr lang="en-US" dirty="0" smtClean="0"/>
+              <a:t> </a:t>
+            </a:r>
+          </a:p>
+          <a:p>
+            <a:pPr lvl="1"/>
+            <a:r>
+              <a:rPr lang="en-US" dirty="0">
+                <a:hlinkClick r:id="rId2"/>
+              </a:rPr>
+              <a:t>http://donhenton-springmvc3.herokuapp.com/app/swagger/sdoc</a:t>
+            </a:r>
+            <a:r>
+              <a:rPr lang="en-US" dirty="0"/>
+              <a:t> </a:t>
+            </a:r>
+            <a:endParaRPr lang="en-US" dirty="0" smtClean="0"/>
+          </a:p>
+          <a:p>
+            <a:r>
+              <a:rPr lang="en-US" dirty="0" smtClean="0"/>
+              <a:t>Summary</a:t>
+            </a:r>
+            <a:endParaRPr lang="en-US" dirty="0"/>
+          </a:p>
+          <a:p>
+            <a:pPr lvl="1"/>
+            <a:r>
+              <a:rPr lang="en-US" dirty="0" smtClean="0"/>
+              <a:t>Need to communicate the service to FE </a:t>
             </a:r>
             <a:r>
               <a:rPr lang="en-US" dirty="0" err="1" smtClean="0"/>
-              <a:t>subtleies</a:t>
-            </a:r>
-            <a:endParaRPr lang="en-US" dirty="0" smtClean="0"/>
-          </a:p>
-          <a:p>
-            <a:pPr lvl="2"/>
-            <a:r>
-              <a:rPr lang="en-US" dirty="0" smtClean="0"/>
-              <a:t>Switches (‘one of these needs to be supplied’)</a:t>
-            </a:r>
-          </a:p>
-          <a:p>
-            <a:pPr lvl="2"/>
-            <a:r>
-              <a:rPr lang="en-US" dirty="0" smtClean="0"/>
-              <a:t>Dependencies (‘if this field is … then use this)</a:t>
-            </a:r>
-          </a:p>
-          <a:p>
-            <a:pPr lvl="2"/>
-            <a:r>
-              <a:rPr lang="en-US" dirty="0" smtClean="0"/>
-              <a:t>Date formats</a:t>
-            </a:r>
-          </a:p>
-          <a:p>
-            <a:r>
-              <a:rPr lang="en-US" dirty="0" smtClean="0"/>
-              <a:t>Summary</a:t>
+              <a:t>devs</a:t>
             </a:r>
             <a:endParaRPr lang="en-US" dirty="0"/>
           </a:p>
@@ -7600,25 +9018,12 @@
             <a:pPr lvl="1"/>
             <a:r>
               <a:rPr lang="en-US" dirty="0" smtClean="0"/>
-              <a:t>Issues with schema-less nature of JSON</a:t>
-            </a:r>
+              <a:t>But don’t want to spend forever, supposed to be coding it</a:t>
+            </a:r>
+            <a:endParaRPr lang="en-US" dirty="0"/>
           </a:p>
           <a:p>
             <a:pPr lvl="1"/>
-            <a:r>
-              <a:rPr lang="en-US" dirty="0" smtClean="0"/>
-              <a:t>FE needs the details, but BE needs to get it working to find </a:t>
-            </a:r>
-            <a:r>
-              <a:rPr lang="en-US" smtClean="0"/>
-              <a:t>those details</a:t>
-            </a:r>
-            <a:endParaRPr lang="en-US" dirty="0"/>
-          </a:p>
-          <a:p>
-            <a:pPr marL="282575" lvl="1" indent="0">
-              <a:buNone/>
-            </a:pPr>
             <a:endParaRPr lang="en-US" dirty="0" smtClean="0"/>
           </a:p>
           <a:p>
@@ -7635,7 +9040,7 @@
     </p:spTree>
     <p:extLst>
       <p:ext uri="{BB962C8B-B14F-4D97-AF65-F5344CB8AC3E}">
-        <p14:creationId xmlns:p14="http://schemas.microsoft.com/office/powerpoint/2010/main" val="1955692651"/>
+        <p14:creationId xmlns:p14="http://schemas.microsoft.com/office/powerpoint/2010/main" val="2382870566"/>
       </p:ext>
     </p:extLst>
   </p:cSld>
@@ -7711,37 +9116,68 @@
           <a:p>
             <a:r>
               <a:rPr lang="en-US" dirty="0" smtClean="0"/>
-              <a:t>Other Issues</a:t>
+              <a:t>Documentation</a:t>
             </a:r>
           </a:p>
           <a:p>
             <a:pPr lvl="1"/>
             <a:r>
               <a:rPr lang="en-US" dirty="0" smtClean="0"/>
-              <a:t>Application may work with external API (Facebook, </a:t>
-            </a:r>
-            <a:r>
-              <a:rPr lang="en-US" dirty="0" err="1" smtClean="0"/>
-              <a:t>Imgur</a:t>
-            </a:r>
-            <a:r>
-              <a:rPr lang="en-US" dirty="0" smtClean="0"/>
-              <a:t>)</a:t>
-            </a:r>
+              <a:t>May not be able to communicate </a:t>
+            </a:r>
+            <a:r>
+              <a:rPr lang="en-US" dirty="0" smtClean="0"/>
+              <a:t>subtleties</a:t>
+            </a:r>
+            <a:endParaRPr lang="en-US" dirty="0" smtClean="0"/>
+          </a:p>
+          <a:p>
+            <a:pPr lvl="2"/>
+            <a:r>
+              <a:rPr lang="en-US" dirty="0" smtClean="0"/>
+              <a:t>Switches (‘one of these needs to be supplied’)</a:t>
+            </a:r>
+          </a:p>
+          <a:p>
+            <a:pPr lvl="2"/>
+            <a:r>
+              <a:rPr lang="en-US" dirty="0" smtClean="0"/>
+              <a:t>Dependencies (‘if this field is … then use this)</a:t>
+            </a:r>
+          </a:p>
+          <a:p>
+            <a:pPr lvl="2"/>
+            <a:r>
+              <a:rPr lang="en-US" dirty="0" smtClean="0"/>
+              <a:t>Date formats</a:t>
+            </a:r>
+          </a:p>
+          <a:p>
+            <a:r>
+              <a:rPr lang="en-US" dirty="0" smtClean="0"/>
+              <a:t>Summary</a:t>
+            </a:r>
+            <a:endParaRPr lang="en-US" dirty="0"/>
           </a:p>
           <a:p>
             <a:pPr lvl="1"/>
             <a:r>
               <a:rPr lang="en-US" dirty="0" smtClean="0"/>
-              <a:t>May need to simulate this application but its outside of programmer control</a:t>
+              <a:t>Issues with schema-less nature of JSON</a:t>
             </a:r>
           </a:p>
           <a:p>
             <a:pPr lvl="1"/>
             <a:r>
               <a:rPr lang="en-US" dirty="0" smtClean="0"/>
-              <a:t>Need to know how to handle error conditions, special cases</a:t>
-            </a:r>
+              <a:t>FE needs the details, but BE needs to get it working to find those details</a:t>
+            </a:r>
+            <a:endParaRPr lang="en-US" dirty="0"/>
+          </a:p>
+          <a:p>
+            <a:pPr marL="282575" lvl="1" indent="0">
+              <a:buNone/>
+            </a:pPr>
             <a:endParaRPr lang="en-US" dirty="0" smtClean="0"/>
           </a:p>
           <a:p>
@@ -7758,7 +9194,7 @@
     </p:spTree>
     <p:extLst>
       <p:ext uri="{BB962C8B-B14F-4D97-AF65-F5344CB8AC3E}">
-        <p14:creationId xmlns:p14="http://schemas.microsoft.com/office/powerpoint/2010/main" val="1160757730"/>
+        <p14:creationId xmlns:p14="http://schemas.microsoft.com/office/powerpoint/2010/main" val="1955692651"/>
       </p:ext>
     </p:extLst>
   </p:cSld>
@@ -7809,7 +9245,7 @@
           <a:p>
             <a:r>
               <a:rPr lang="en-US" dirty="0" smtClean="0"/>
-              <a:t>Mock Servers As A Solution</a:t>
+              <a:t>JS App Development</a:t>
             </a:r>
             <a:endParaRPr lang="en-US" dirty="0"/>
           </a:p>
@@ -7827,118 +9263,60 @@
         </p:nvSpPr>
         <p:spPr/>
         <p:txBody>
-          <a:bodyPr/>
-          <a:lstStyle/>
-          <a:p>
-            <a:r>
-              <a:rPr lang="en-US" dirty="0" smtClean="0"/>
-              <a:t>Mock Servers</a:t>
-            </a:r>
+          <a:bodyPr>
+            <a:normAutofit/>
+          </a:bodyPr>
+          <a:lstStyle/>
+          <a:p>
+            <a:r>
+              <a:rPr lang="en-US" dirty="0" smtClean="0"/>
+              <a:t>Other Issues</a:t>
+            </a:r>
+          </a:p>
+          <a:p>
+            <a:pPr lvl="1"/>
+            <a:r>
+              <a:rPr lang="en-US" dirty="0" smtClean="0"/>
+              <a:t>Application may work with external API (Facebook, </a:t>
+            </a:r>
+            <a:r>
+              <a:rPr lang="en-US" dirty="0" err="1" smtClean="0"/>
+              <a:t>Imgur</a:t>
+            </a:r>
+            <a:r>
+              <a:rPr lang="en-US" dirty="0" smtClean="0"/>
+              <a:t>)</a:t>
+            </a:r>
+          </a:p>
+          <a:p>
+            <a:pPr lvl="1"/>
+            <a:r>
+              <a:rPr lang="en-US" dirty="0" smtClean="0"/>
+              <a:t>May need to simulate this application but its outside of programmer control</a:t>
+            </a:r>
+          </a:p>
+          <a:p>
+            <a:pPr lvl="1"/>
+            <a:r>
+              <a:rPr lang="en-US" dirty="0" smtClean="0"/>
+              <a:t>Need to know how to handle error conditions, special cases</a:t>
+            </a:r>
+          </a:p>
+          <a:p>
             <a:endParaRPr lang="en-US" dirty="0"/>
           </a:p>
           <a:p>
-            <a:pPr lvl="1"/>
-            <a:r>
-              <a:rPr lang="en-US" dirty="0" err="1" smtClean="0"/>
-              <a:t>Wiremock</a:t>
-            </a:r>
-            <a:r>
-              <a:rPr lang="en-US" dirty="0" smtClean="0"/>
-              <a:t> </a:t>
-            </a:r>
-            <a:r>
-              <a:rPr lang="en-US" dirty="0"/>
-              <a:t>(java http://</a:t>
-            </a:r>
-            <a:r>
-              <a:rPr lang="en-US" dirty="0" err="1"/>
-              <a:t>wiremock.org</a:t>
-            </a:r>
-            <a:r>
-              <a:rPr lang="en-US" dirty="0"/>
-              <a:t>/)</a:t>
-            </a:r>
-          </a:p>
-          <a:p>
-            <a:pPr lvl="1"/>
-            <a:r>
-              <a:rPr lang="en-US" dirty="0" smtClean="0"/>
-              <a:t>Mountebank (node </a:t>
-            </a:r>
-            <a:r>
-              <a:rPr lang="en-US" dirty="0">
-                <a:hlinkClick r:id="rId2"/>
-              </a:rPr>
-              <a:t>http://</a:t>
-            </a:r>
-            <a:r>
-              <a:rPr lang="en-US" dirty="0" smtClean="0">
-                <a:hlinkClick r:id="rId2"/>
-              </a:rPr>
-              <a:t>mbtest.org</a:t>
-            </a:r>
-            <a:r>
-              <a:rPr lang="en-US" dirty="0" smtClean="0"/>
-              <a:t>)</a:t>
-            </a:r>
-          </a:p>
-          <a:p>
-            <a:r>
-              <a:rPr lang="en-US" dirty="0" smtClean="0"/>
-              <a:t>What Mountebank does</a:t>
-            </a:r>
-          </a:p>
-          <a:p>
-            <a:pPr lvl="1"/>
-            <a:r>
-              <a:rPr lang="en-US" dirty="0" smtClean="0"/>
-              <a:t>Provides a server that can be programmed to simulate request/response (</a:t>
-            </a:r>
-            <a:r>
-              <a:rPr lang="en-US" dirty="0" err="1" smtClean="0"/>
-              <a:t>eg</a:t>
-            </a:r>
-            <a:r>
-              <a:rPr lang="en-US" dirty="0" smtClean="0"/>
-              <a:t> JSON REST service)</a:t>
-            </a:r>
-          </a:p>
-          <a:p>
-            <a:pPr lvl="1"/>
-            <a:r>
-              <a:rPr lang="en-US" dirty="0" smtClean="0"/>
-              <a:t>Programmable DSL for request/response  programming (JSON)</a:t>
-            </a:r>
-          </a:p>
-          <a:p>
-            <a:pPr lvl="1"/>
-            <a:r>
-              <a:rPr lang="en-US" dirty="0" smtClean="0"/>
-              <a:t>Multiple protocols (http, https, </a:t>
-            </a:r>
-            <a:r>
-              <a:rPr lang="en-US" dirty="0" err="1" smtClean="0"/>
-              <a:t>smtp</a:t>
-            </a:r>
-            <a:r>
-              <a:rPr lang="en-US" dirty="0" smtClean="0"/>
-              <a:t>, </a:t>
-            </a:r>
-            <a:r>
-              <a:rPr lang="en-US" dirty="0" err="1" smtClean="0"/>
-              <a:t>tcp</a:t>
-            </a:r>
-            <a:r>
-              <a:rPr lang="en-US" dirty="0" smtClean="0"/>
-              <a:t>)</a:t>
-            </a:r>
+            <a:endParaRPr lang="en-US" dirty="0" smtClean="0"/>
+          </a:p>
+          <a:p>
+            <a:endParaRPr lang="en-US" dirty="0"/>
           </a:p>
         </p:txBody>
       </p:sp>
     </p:spTree>
     <p:extLst>
       <p:ext uri="{BB962C8B-B14F-4D97-AF65-F5344CB8AC3E}">
-        <p14:creationId xmlns:p14="http://schemas.microsoft.com/office/powerpoint/2010/main" val="2220906113"/>
+        <p14:creationId xmlns:p14="http://schemas.microsoft.com/office/powerpoint/2010/main" val="1160757730"/>
       </p:ext>
     </p:extLst>
   </p:cSld>
@@ -7989,7 +9367,7 @@
           <a:p>
             <a:r>
               <a:rPr lang="en-US" dirty="0" smtClean="0"/>
-              <a:t>Examples Software</a:t>
+              <a:t>Mock Servers As A Solution</a:t>
             </a:r>
             <a:endParaRPr lang="en-US" dirty="0"/>
           </a:p>
@@ -8012,41 +9390,50 @@
           <a:p>
             <a:r>
               <a:rPr lang="en-US" dirty="0" smtClean="0"/>
-              <a:t>Postman (chrome plugin)</a:t>
-            </a:r>
-          </a:p>
-          <a:p>
-            <a:r>
-              <a:rPr lang="en-US" dirty="0" smtClean="0"/>
-              <a:t>Mountebank</a:t>
-            </a:r>
-          </a:p>
-          <a:p>
+              <a:t>Mock Servers</a:t>
+            </a:r>
+            <a:endParaRPr lang="en-US" dirty="0"/>
+          </a:p>
+          <a:p>
+            <a:pPr lvl="1"/>
+            <a:r>
+              <a:rPr lang="en-US" dirty="0" err="1" smtClean="0"/>
+              <a:t>Wiremock</a:t>
+            </a:r>
+            <a:r>
+              <a:rPr lang="en-US" dirty="0" smtClean="0"/>
+              <a:t> </a:t>
+            </a:r>
             <a:r>
               <a:rPr lang="en-US" dirty="0"/>
-              <a:t>Mountebank-UI </a:t>
-            </a:r>
-            <a:r>
-              <a:rPr lang="en-US" dirty="0" smtClean="0"/>
-              <a:t>(</a:t>
+              <a:t>(java http://</a:t>
+            </a:r>
+            <a:r>
+              <a:rPr lang="en-US" dirty="0" err="1"/>
+              <a:t>wiremock.org</a:t>
+            </a:r>
+            <a:r>
+              <a:rPr lang="en-US" dirty="0"/>
+              <a:t>/)</a:t>
+            </a:r>
+          </a:p>
+          <a:p>
+            <a:pPr lvl="1"/>
+            <a:r>
+              <a:rPr lang="en-US" dirty="0" smtClean="0"/>
+              <a:t>Mountebank (node </a:t>
+            </a:r>
+            <a:r>
+              <a:rPr lang="en-US" dirty="0">
+                <a:hlinkClick r:id="rId2"/>
+              </a:rPr>
+              <a:t>http://</a:t>
             </a:r>
             <a:r>
               <a:rPr lang="en-US" dirty="0" smtClean="0">
-                <a:hlinkClick r:id="rId3"/>
+                <a:hlinkClick r:id="rId2"/>
               </a:rPr>
-              <a:t>http</a:t>
-            </a:r>
-            <a:r>
-              <a:rPr lang="en-US" dirty="0">
-                <a:hlinkClick r:id="rId3"/>
-              </a:rPr>
-              <a:t>://donhenton.github.io/mountebank-UI/public_html/index.html#</a:t>
-            </a:r>
-            <a:r>
-              <a:rPr lang="en-US" dirty="0" smtClean="0">
-                <a:hlinkClick r:id="rId3"/>
-              </a:rPr>
-              <a:t>/</a:t>
+              <a:t>mbtest.org</a:t>
             </a:r>
             <a:r>
               <a:rPr lang="en-US" dirty="0" smtClean="0"/>
@@ -8055,30 +9442,61 @@
           </a:p>
           <a:p>
             <a:r>
+              <a:rPr lang="en-US" dirty="0" smtClean="0"/>
+              <a:t>What Mountebank does</a:t>
+            </a:r>
+          </a:p>
+          <a:p>
+            <a:pPr lvl="1"/>
+            <a:r>
+              <a:rPr lang="en-US" dirty="0" smtClean="0"/>
+              <a:t>Provides a server that can be programmed to simulate request/response (</a:t>
+            </a:r>
+            <a:r>
               <a:rPr lang="en-US" dirty="0" err="1" smtClean="0"/>
-              <a:t>Netbeans</a:t>
-            </a:r>
-            <a:endParaRPr lang="en-US" dirty="0" smtClean="0"/>
-          </a:p>
-          <a:p>
-            <a:r>
-              <a:rPr lang="en-US" dirty="0" smtClean="0"/>
-              <a:t>Node</a:t>
-            </a:r>
-            <a:endParaRPr lang="en-US" dirty="0"/>
-          </a:p>
-          <a:p>
-            <a:pPr marL="282575" lvl="1" indent="0">
-              <a:buNone/>
-            </a:pPr>
-            <a:endParaRPr lang="en-US" dirty="0" smtClean="0"/>
+              <a:t>eg</a:t>
+            </a:r>
+            <a:r>
+              <a:rPr lang="en-US" dirty="0" smtClean="0"/>
+              <a:t> JSON REST service)</a:t>
+            </a:r>
+          </a:p>
+          <a:p>
+            <a:pPr lvl="1"/>
+            <a:r>
+              <a:rPr lang="en-US" dirty="0" smtClean="0"/>
+              <a:t>Programmable DSL for request/response  programming (JSON)</a:t>
+            </a:r>
+          </a:p>
+          <a:p>
+            <a:pPr lvl="1"/>
+            <a:r>
+              <a:rPr lang="en-US" dirty="0" smtClean="0"/>
+              <a:t>Multiple protocols (http, https, </a:t>
+            </a:r>
+            <a:r>
+              <a:rPr lang="en-US" dirty="0" err="1" smtClean="0"/>
+              <a:t>smtp</a:t>
+            </a:r>
+            <a:r>
+              <a:rPr lang="en-US" dirty="0" smtClean="0"/>
+              <a:t>, </a:t>
+            </a:r>
+            <a:r>
+              <a:rPr lang="en-US" dirty="0" err="1" smtClean="0"/>
+              <a:t>tcp</a:t>
+            </a:r>
+            <a:r>
+              <a:rPr lang="en-US" dirty="0" smtClean="0"/>
+              <a:t>)</a:t>
+            </a:r>
           </a:p>
         </p:txBody>
       </p:sp>
     </p:spTree>
     <p:extLst>
       <p:ext uri="{BB962C8B-B14F-4D97-AF65-F5344CB8AC3E}">
-        <p14:creationId xmlns:p14="http://schemas.microsoft.com/office/powerpoint/2010/main" val="4142261974"/>
+        <p14:creationId xmlns:p14="http://schemas.microsoft.com/office/powerpoint/2010/main" val="2220906113"/>
       </p:ext>
     </p:extLst>
   </p:cSld>
@@ -8129,7 +9547,7 @@
           <a:p>
             <a:r>
               <a:rPr lang="en-US" dirty="0" smtClean="0"/>
-              <a:t>Mountebank Installation</a:t>
+              <a:t>Examples Software</a:t>
             </a:r>
             <a:endParaRPr lang="en-US" dirty="0"/>
           </a:p>
@@ -8145,16 +9563,9 @@
             <p:ph idx="1"/>
           </p:nvPr>
         </p:nvSpPr>
-        <p:spPr>
-          <a:xfrm>
-            <a:off x="779463" y="1828799"/>
-            <a:ext cx="7583487" cy="4415023"/>
-          </a:xfrm>
-        </p:spPr>
-        <p:txBody>
-          <a:bodyPr>
-            <a:normAutofit/>
-          </a:bodyPr>
+        <p:spPr/>
+        <p:txBody>
+          <a:bodyPr/>
           <a:lstStyle/>
           <a:p>
             <a:r>
@@ -8202,39 +9613,16 @@
           </a:p>
           <a:p>
             <a:r>
-              <a:rPr lang="en-US" dirty="0">
-                <a:hlinkClick r:id="rId4"/>
-              </a:rPr>
-              <a:t>http://www.mbtest.org/docs/install</a:t>
-            </a:r>
-            <a:endParaRPr lang="en-US" dirty="0"/>
-          </a:p>
-          <a:p>
-            <a:pPr lvl="1"/>
-            <a:r>
-              <a:rPr lang="en-US" dirty="0"/>
-              <a:t>Provides various options</a:t>
-            </a:r>
-          </a:p>
-          <a:p>
-            <a:pPr lvl="1"/>
-            <a:r>
-              <a:rPr lang="en-US" dirty="0" err="1"/>
-              <a:t>npm</a:t>
-            </a:r>
-            <a:endParaRPr lang="en-US" dirty="0"/>
-          </a:p>
-          <a:p>
-            <a:r>
-              <a:rPr lang="en-US" dirty="0" err="1"/>
-              <a:t>npm</a:t>
-            </a:r>
-            <a:r>
-              <a:rPr lang="en-US" dirty="0"/>
-              <a:t> mountebank -g</a:t>
-            </a:r>
-          </a:p>
-          <a:p>
+              <a:rPr lang="en-US" dirty="0" err="1" smtClean="0"/>
+              <a:t>Netbeans</a:t>
+            </a:r>
+            <a:endParaRPr lang="en-US" dirty="0" smtClean="0"/>
+          </a:p>
+          <a:p>
+            <a:r>
+              <a:rPr lang="en-US" dirty="0" smtClean="0"/>
+              <a:t>Node</a:t>
+            </a:r>
             <a:endParaRPr lang="en-US" dirty="0"/>
           </a:p>
           <a:p>
@@ -8248,7 +9636,7 @@
     </p:spTree>
     <p:extLst>
       <p:ext uri="{BB962C8B-B14F-4D97-AF65-F5344CB8AC3E}">
-        <p14:creationId xmlns:p14="http://schemas.microsoft.com/office/powerpoint/2010/main" val="1991744321"/>
+        <p14:creationId xmlns:p14="http://schemas.microsoft.com/office/powerpoint/2010/main" val="4142261974"/>
       </p:ext>
     </p:extLst>
   </p:cSld>
@@ -8299,7 +9687,7 @@
           <a:p>
             <a:r>
               <a:rPr lang="en-US" dirty="0" smtClean="0"/>
-              <a:t>Agenda For Examples</a:t>
+              <a:t>Mountebank Installation</a:t>
             </a:r>
             <a:endParaRPr lang="en-US" dirty="0"/>
           </a:p>
@@ -8318,7 +9706,7 @@
         <p:spPr>
           <a:xfrm>
             <a:off x="779463" y="1828799"/>
-            <a:ext cx="7583487" cy="4566205"/>
+            <a:ext cx="7583487" cy="4415023"/>
           </a:xfrm>
         </p:spPr>
         <p:txBody>
@@ -8329,54 +9717,89 @@
           <a:p>
             <a:r>
               <a:rPr lang="en-US" dirty="0" smtClean="0"/>
-              <a:t>Simple Service Using Postman</a:t>
-            </a:r>
+              <a:t>Postman (chrome plugin)</a:t>
+            </a:r>
+          </a:p>
+          <a:p>
+            <a:r>
+              <a:rPr lang="en-US" dirty="0" smtClean="0"/>
+              <a:t>Mountebank</a:t>
+            </a:r>
+          </a:p>
+          <a:p>
+            <a:r>
+              <a:rPr lang="en-US" dirty="0"/>
+              <a:t>Mountebank-UI </a:t>
+            </a:r>
+            <a:r>
+              <a:rPr lang="en-US" dirty="0" smtClean="0"/>
+              <a:t>(</a:t>
+            </a:r>
+            <a:r>
+              <a:rPr lang="en-US" dirty="0" smtClean="0">
+                <a:hlinkClick r:id="rId3"/>
+              </a:rPr>
+              <a:t>http</a:t>
+            </a:r>
+            <a:r>
+              <a:rPr lang="en-US" dirty="0">
+                <a:hlinkClick r:id="rId3"/>
+              </a:rPr>
+              <a:t>://donhenton.github.io/mountebank-UI/public_html/index.html#</a:t>
+            </a:r>
+            <a:r>
+              <a:rPr lang="en-US" dirty="0" smtClean="0">
+                <a:hlinkClick r:id="rId3"/>
+              </a:rPr>
+              <a:t>/</a:t>
+            </a:r>
+            <a:r>
+              <a:rPr lang="en-US" dirty="0" smtClean="0"/>
+              <a:t>)</a:t>
+            </a:r>
+          </a:p>
+          <a:p>
+            <a:r>
+              <a:rPr lang="en-US" dirty="0">
+                <a:hlinkClick r:id="rId4"/>
+              </a:rPr>
+              <a:t>http://www.mbtest.org/docs/install</a:t>
+            </a:r>
+            <a:endParaRPr lang="en-US" dirty="0"/>
           </a:p>
           <a:p>
             <a:pPr lvl="1"/>
             <a:r>
-              <a:rPr lang="en-US" dirty="0" smtClean="0"/>
-              <a:t>Adding the service to Mountebank</a:t>
+              <a:rPr lang="en-US" dirty="0"/>
+              <a:t>Provides various options</a:t>
             </a:r>
           </a:p>
           <a:p>
             <a:pPr lvl="1"/>
             <a:r>
-              <a:rPr lang="en-US" dirty="0" smtClean="0"/>
-              <a:t>Testing that service</a:t>
-            </a:r>
-          </a:p>
-          <a:p>
-            <a:pPr lvl="1"/>
-            <a:r>
-              <a:rPr lang="en-US" dirty="0" smtClean="0"/>
-              <a:t>Listing Mountebank services</a:t>
-            </a:r>
-          </a:p>
-          <a:p>
-            <a:pPr lvl="1"/>
-            <a:r>
-              <a:rPr lang="en-US" dirty="0" smtClean="0"/>
-              <a:t>Listing the responses that are captured</a:t>
-            </a:r>
-          </a:p>
-          <a:p>
-            <a:r>
-              <a:rPr lang="en-US" dirty="0" smtClean="0"/>
-              <a:t>Full blown port of Swagger System Restaurant Service</a:t>
-            </a:r>
-          </a:p>
-          <a:p>
-            <a:r>
-              <a:rPr lang="en-US" dirty="0" smtClean="0"/>
-              <a:t>Injection Demonstration (use of code for request/response)</a:t>
-            </a:r>
-          </a:p>
-          <a:p>
-            <a:r>
-              <a:rPr lang="en-US" dirty="0" smtClean="0"/>
-              <a:t>Use in Unit Tests</a:t>
-            </a:r>
+              <a:rPr lang="en-US" dirty="0" err="1"/>
+              <a:t>npm</a:t>
+            </a:r>
+            <a:endParaRPr lang="en-US" dirty="0"/>
+          </a:p>
+          <a:p>
+            <a:r>
+              <a:rPr lang="en-US" dirty="0" err="1"/>
+              <a:t>npm</a:t>
+            </a:r>
+            <a:r>
+              <a:rPr lang="en-US" dirty="0"/>
+              <a:t> mountebank -g</a:t>
+            </a:r>
+          </a:p>
+          <a:p>
+            <a:endParaRPr lang="en-US" dirty="0"/>
+          </a:p>
+          <a:p>
+            <a:pPr marL="282575" lvl="1" indent="0">
+              <a:buNone/>
+            </a:pPr>
+            <a:endParaRPr lang="en-US" dirty="0" smtClean="0"/>
           </a:p>
         </p:txBody>
       </p:sp>

</xml_diff>